<commit_message>
feat(flows): add names to each cards in ppt
</commit_message>
<xml_diff>
--- a/01 - Plan & Ideate/03 - User Flow/user_flows.pptx
+++ b/01 - Plan & Ideate/03 - User Flow/user_flows.pptx
@@ -4,9 +4,13 @@
   <p:sldMasterIdLst>
     <p:sldMasterId id="2147483648" r:id="rId1"/>
   </p:sldMasterIdLst>
+  <p:notesMasterIdLst>
+    <p:notesMasterId r:id="rId5"/>
+  </p:notesMasterIdLst>
   <p:sldIdLst>
     <p:sldId id="256" r:id="rId2"/>
     <p:sldId id="257" r:id="rId3"/>
+    <p:sldId id="258" r:id="rId4"/>
   </p:sldIdLst>
   <p:sldSz cx="12192000" cy="6858000"/>
   <p:notesSz cx="6858000" cy="9144000"/>
@@ -105,7 +109,446 @@
       </a:defRPr>
     </a:lvl9pPr>
   </p:defaultTextStyle>
+  <p:extLst>
+    <p:ext uri="{EFAFB233-063F-42B5-8137-9DF3F51BA10A}">
+      <p15:sldGuideLst xmlns:p15="http://schemas.microsoft.com/office/powerpoint/2012/main"/>
+    </p:ext>
+  </p:extLst>
 </p:presentation>
+</file>
+
+<file path=ppt/notesMasters/notesMaster1.xml><?xml version="1.0" encoding="utf-8"?>
+<p:notesMaster xmlns:a="http://schemas.openxmlformats.org/drawingml/2006/main" xmlns:r="http://schemas.openxmlformats.org/officeDocument/2006/relationships" xmlns:p="http://schemas.openxmlformats.org/presentationml/2006/main">
+  <p:cSld>
+    <p:bg>
+      <p:bgRef idx="1001">
+        <a:schemeClr val="bg1"/>
+      </p:bgRef>
+    </p:bg>
+    <p:spTree>
+      <p:nvGrpSpPr>
+        <p:cNvPr id="1" name=""/>
+        <p:cNvGrpSpPr/>
+        <p:nvPr/>
+      </p:nvGrpSpPr>
+      <p:grpSpPr>
+        <a:xfrm>
+          <a:off x="0" y="0"/>
+          <a:ext cx="0" cy="0"/>
+          <a:chOff x="0" y="0"/>
+          <a:chExt cx="0" cy="0"/>
+        </a:xfrm>
+      </p:grpSpPr>
+      <p:sp>
+        <p:nvSpPr>
+          <p:cNvPr id="2" name="Header Placeholder 1"/>
+          <p:cNvSpPr>
+            <a:spLocks noGrp="1"/>
+          </p:cNvSpPr>
+          <p:nvPr>
+            <p:ph type="hdr" sz="quarter"/>
+          </p:nvPr>
+        </p:nvSpPr>
+        <p:spPr>
+          <a:xfrm>
+            <a:off x="0" y="0"/>
+            <a:ext cx="2971800" cy="458788"/>
+          </a:xfrm>
+          <a:prstGeom prst="rect">
+            <a:avLst/>
+          </a:prstGeom>
+        </p:spPr>
+        <p:txBody>
+          <a:bodyPr vert="horz" lIns="91440" tIns="45720" rIns="91440" bIns="45720" rtlCol="0"/>
+          <a:lstStyle>
+            <a:lvl1pPr algn="l">
+              <a:defRPr sz="1200"/>
+            </a:lvl1pPr>
+          </a:lstStyle>
+          <a:p>
+            <a:endParaRPr lang="fr-FR"/>
+          </a:p>
+        </p:txBody>
+      </p:sp>
+      <p:sp>
+        <p:nvSpPr>
+          <p:cNvPr id="3" name="Date Placeholder 2"/>
+          <p:cNvSpPr>
+            <a:spLocks noGrp="1"/>
+          </p:cNvSpPr>
+          <p:nvPr>
+            <p:ph type="dt" idx="1"/>
+          </p:nvPr>
+        </p:nvSpPr>
+        <p:spPr>
+          <a:xfrm>
+            <a:off x="3884613" y="0"/>
+            <a:ext cx="2971800" cy="458788"/>
+          </a:xfrm>
+          <a:prstGeom prst="rect">
+            <a:avLst/>
+          </a:prstGeom>
+        </p:spPr>
+        <p:txBody>
+          <a:bodyPr vert="horz" lIns="91440" tIns="45720" rIns="91440" bIns="45720" rtlCol="0"/>
+          <a:lstStyle>
+            <a:lvl1pPr algn="r">
+              <a:defRPr sz="1200"/>
+            </a:lvl1pPr>
+          </a:lstStyle>
+          <a:p>
+            <a:fld id="{5EADFFCF-004F-A44E-8FA0-367663537F64}" type="datetimeFigureOut">
+              <a:rPr lang="fr-FR" smtClean="0"/>
+              <a:t>17/04/2020</a:t>
+            </a:fld>
+            <a:endParaRPr lang="fr-FR"/>
+          </a:p>
+        </p:txBody>
+      </p:sp>
+      <p:sp>
+        <p:nvSpPr>
+          <p:cNvPr id="4" name="Slide Image Placeholder 3"/>
+          <p:cNvSpPr>
+            <a:spLocks noGrp="1" noRot="1" noChangeAspect="1"/>
+          </p:cNvSpPr>
+          <p:nvPr>
+            <p:ph type="sldImg" idx="2"/>
+          </p:nvPr>
+        </p:nvSpPr>
+        <p:spPr>
+          <a:xfrm>
+            <a:off x="685800" y="1143000"/>
+            <a:ext cx="5486400" cy="3086100"/>
+          </a:xfrm>
+          <a:prstGeom prst="rect">
+            <a:avLst/>
+          </a:prstGeom>
+          <a:noFill/>
+          <a:ln w="12700">
+            <a:solidFill>
+              <a:prstClr val="black"/>
+            </a:solidFill>
+          </a:ln>
+        </p:spPr>
+        <p:txBody>
+          <a:bodyPr vert="horz" lIns="91440" tIns="45720" rIns="91440" bIns="45720" rtlCol="0" anchor="ctr"/>
+          <a:lstStyle/>
+          <a:p>
+            <a:endParaRPr lang="fr-FR"/>
+          </a:p>
+        </p:txBody>
+      </p:sp>
+      <p:sp>
+        <p:nvSpPr>
+          <p:cNvPr id="5" name="Notes Placeholder 4"/>
+          <p:cNvSpPr>
+            <a:spLocks noGrp="1"/>
+          </p:cNvSpPr>
+          <p:nvPr>
+            <p:ph type="body" sz="quarter" idx="3"/>
+          </p:nvPr>
+        </p:nvSpPr>
+        <p:spPr>
+          <a:xfrm>
+            <a:off x="685800" y="4400550"/>
+            <a:ext cx="5486400" cy="3600450"/>
+          </a:xfrm>
+          <a:prstGeom prst="rect">
+            <a:avLst/>
+          </a:prstGeom>
+        </p:spPr>
+        <p:txBody>
+          <a:bodyPr vert="horz" lIns="91440" tIns="45720" rIns="91440" bIns="45720" rtlCol="0"/>
+          <a:lstStyle/>
+          <a:p>
+            <a:pPr lvl="0"/>
+            <a:r>
+              <a:rPr lang="en-US"/>
+              <a:t>Edit Master text styles</a:t>
+            </a:r>
+          </a:p>
+          <a:p>
+            <a:pPr lvl="1"/>
+            <a:r>
+              <a:rPr lang="en-US"/>
+              <a:t>Second level</a:t>
+            </a:r>
+          </a:p>
+          <a:p>
+            <a:pPr lvl="2"/>
+            <a:r>
+              <a:rPr lang="en-US"/>
+              <a:t>Third level</a:t>
+            </a:r>
+          </a:p>
+          <a:p>
+            <a:pPr lvl="3"/>
+            <a:r>
+              <a:rPr lang="en-US"/>
+              <a:t>Fourth level</a:t>
+            </a:r>
+          </a:p>
+          <a:p>
+            <a:pPr lvl="4"/>
+            <a:r>
+              <a:rPr lang="en-US"/>
+              <a:t>Fifth level</a:t>
+            </a:r>
+            <a:endParaRPr lang="fr-FR"/>
+          </a:p>
+        </p:txBody>
+      </p:sp>
+      <p:sp>
+        <p:nvSpPr>
+          <p:cNvPr id="6" name="Footer Placeholder 5"/>
+          <p:cNvSpPr>
+            <a:spLocks noGrp="1"/>
+          </p:cNvSpPr>
+          <p:nvPr>
+            <p:ph type="ftr" sz="quarter" idx="4"/>
+          </p:nvPr>
+        </p:nvSpPr>
+        <p:spPr>
+          <a:xfrm>
+            <a:off x="0" y="8685213"/>
+            <a:ext cx="2971800" cy="458787"/>
+          </a:xfrm>
+          <a:prstGeom prst="rect">
+            <a:avLst/>
+          </a:prstGeom>
+        </p:spPr>
+        <p:txBody>
+          <a:bodyPr vert="horz" lIns="91440" tIns="45720" rIns="91440" bIns="45720" rtlCol="0" anchor="b"/>
+          <a:lstStyle>
+            <a:lvl1pPr algn="l">
+              <a:defRPr sz="1200"/>
+            </a:lvl1pPr>
+          </a:lstStyle>
+          <a:p>
+            <a:endParaRPr lang="fr-FR"/>
+          </a:p>
+        </p:txBody>
+      </p:sp>
+      <p:sp>
+        <p:nvSpPr>
+          <p:cNvPr id="7" name="Slide Number Placeholder 6"/>
+          <p:cNvSpPr>
+            <a:spLocks noGrp="1"/>
+          </p:cNvSpPr>
+          <p:nvPr>
+            <p:ph type="sldNum" sz="quarter" idx="5"/>
+          </p:nvPr>
+        </p:nvSpPr>
+        <p:spPr>
+          <a:xfrm>
+            <a:off x="3884613" y="8685213"/>
+            <a:ext cx="2971800" cy="458787"/>
+          </a:xfrm>
+          <a:prstGeom prst="rect">
+            <a:avLst/>
+          </a:prstGeom>
+        </p:spPr>
+        <p:txBody>
+          <a:bodyPr vert="horz" lIns="91440" tIns="45720" rIns="91440" bIns="45720" rtlCol="0" anchor="b"/>
+          <a:lstStyle>
+            <a:lvl1pPr algn="r">
+              <a:defRPr sz="1200"/>
+            </a:lvl1pPr>
+          </a:lstStyle>
+          <a:p>
+            <a:fld id="{0F19A71E-30D6-E84B-B90F-7209948FA413}" type="slidenum">
+              <a:rPr lang="fr-FR" smtClean="0"/>
+              <a:t>‹#›</a:t>
+            </a:fld>
+            <a:endParaRPr lang="fr-FR"/>
+          </a:p>
+        </p:txBody>
+      </p:sp>
+    </p:spTree>
+    <p:extLst>
+      <p:ext uri="{BB962C8B-B14F-4D97-AF65-F5344CB8AC3E}">
+        <p14:creationId xmlns:p14="http://schemas.microsoft.com/office/powerpoint/2010/main" val="639420403"/>
+      </p:ext>
+    </p:extLst>
+  </p:cSld>
+  <p:clrMap bg1="lt1" tx1="dk1" bg2="lt2" tx2="dk2" accent1="accent1" accent2="accent2" accent3="accent3" accent4="accent4" accent5="accent5" accent6="accent6" hlink="hlink" folHlink="folHlink"/>
+  <p:notesStyle>
+    <a:lvl1pPr marL="0" algn="l" defTabSz="914400" rtl="0" eaLnBrk="1" latinLnBrk="0" hangingPunct="1">
+      <a:defRPr sz="1200" kern="1200">
+        <a:solidFill>
+          <a:schemeClr val="tx1"/>
+        </a:solidFill>
+        <a:latin typeface="+mn-lt"/>
+        <a:ea typeface="+mn-ea"/>
+        <a:cs typeface="+mn-cs"/>
+      </a:defRPr>
+    </a:lvl1pPr>
+    <a:lvl2pPr marL="457200" algn="l" defTabSz="914400" rtl="0" eaLnBrk="1" latinLnBrk="0" hangingPunct="1">
+      <a:defRPr sz="1200" kern="1200">
+        <a:solidFill>
+          <a:schemeClr val="tx1"/>
+        </a:solidFill>
+        <a:latin typeface="+mn-lt"/>
+        <a:ea typeface="+mn-ea"/>
+        <a:cs typeface="+mn-cs"/>
+      </a:defRPr>
+    </a:lvl2pPr>
+    <a:lvl3pPr marL="914400" algn="l" defTabSz="914400" rtl="0" eaLnBrk="1" latinLnBrk="0" hangingPunct="1">
+      <a:defRPr sz="1200" kern="1200">
+        <a:solidFill>
+          <a:schemeClr val="tx1"/>
+        </a:solidFill>
+        <a:latin typeface="+mn-lt"/>
+        <a:ea typeface="+mn-ea"/>
+        <a:cs typeface="+mn-cs"/>
+      </a:defRPr>
+    </a:lvl3pPr>
+    <a:lvl4pPr marL="1371600" algn="l" defTabSz="914400" rtl="0" eaLnBrk="1" latinLnBrk="0" hangingPunct="1">
+      <a:defRPr sz="1200" kern="1200">
+        <a:solidFill>
+          <a:schemeClr val="tx1"/>
+        </a:solidFill>
+        <a:latin typeface="+mn-lt"/>
+        <a:ea typeface="+mn-ea"/>
+        <a:cs typeface="+mn-cs"/>
+      </a:defRPr>
+    </a:lvl4pPr>
+    <a:lvl5pPr marL="1828800" algn="l" defTabSz="914400" rtl="0" eaLnBrk="1" latinLnBrk="0" hangingPunct="1">
+      <a:defRPr sz="1200" kern="1200">
+        <a:solidFill>
+          <a:schemeClr val="tx1"/>
+        </a:solidFill>
+        <a:latin typeface="+mn-lt"/>
+        <a:ea typeface="+mn-ea"/>
+        <a:cs typeface="+mn-cs"/>
+      </a:defRPr>
+    </a:lvl5pPr>
+    <a:lvl6pPr marL="2286000" algn="l" defTabSz="914400" rtl="0" eaLnBrk="1" latinLnBrk="0" hangingPunct="1">
+      <a:defRPr sz="1200" kern="1200">
+        <a:solidFill>
+          <a:schemeClr val="tx1"/>
+        </a:solidFill>
+        <a:latin typeface="+mn-lt"/>
+        <a:ea typeface="+mn-ea"/>
+        <a:cs typeface="+mn-cs"/>
+      </a:defRPr>
+    </a:lvl6pPr>
+    <a:lvl7pPr marL="2743200" algn="l" defTabSz="914400" rtl="0" eaLnBrk="1" latinLnBrk="0" hangingPunct="1">
+      <a:defRPr sz="1200" kern="1200">
+        <a:solidFill>
+          <a:schemeClr val="tx1"/>
+        </a:solidFill>
+        <a:latin typeface="+mn-lt"/>
+        <a:ea typeface="+mn-ea"/>
+        <a:cs typeface="+mn-cs"/>
+      </a:defRPr>
+    </a:lvl7pPr>
+    <a:lvl8pPr marL="3200400" algn="l" defTabSz="914400" rtl="0" eaLnBrk="1" latinLnBrk="0" hangingPunct="1">
+      <a:defRPr sz="1200" kern="1200">
+        <a:solidFill>
+          <a:schemeClr val="tx1"/>
+        </a:solidFill>
+        <a:latin typeface="+mn-lt"/>
+        <a:ea typeface="+mn-ea"/>
+        <a:cs typeface="+mn-cs"/>
+      </a:defRPr>
+    </a:lvl8pPr>
+    <a:lvl9pPr marL="3657600" algn="l" defTabSz="914400" rtl="0" eaLnBrk="1" latinLnBrk="0" hangingPunct="1">
+      <a:defRPr sz="1200" kern="1200">
+        <a:solidFill>
+          <a:schemeClr val="tx1"/>
+        </a:solidFill>
+        <a:latin typeface="+mn-lt"/>
+        <a:ea typeface="+mn-ea"/>
+        <a:cs typeface="+mn-cs"/>
+      </a:defRPr>
+    </a:lvl9pPr>
+  </p:notesStyle>
+</p:notesMaster>
+</file>
+
+<file path=ppt/notesSlides/notesSlide1.xml><?xml version="1.0" encoding="utf-8"?>
+<p:notes xmlns:a="http://schemas.openxmlformats.org/drawingml/2006/main" xmlns:r="http://schemas.openxmlformats.org/officeDocument/2006/relationships" xmlns:p="http://schemas.openxmlformats.org/presentationml/2006/main">
+  <p:cSld>
+    <p:spTree>
+      <p:nvGrpSpPr>
+        <p:cNvPr id="1" name=""/>
+        <p:cNvGrpSpPr/>
+        <p:nvPr/>
+      </p:nvGrpSpPr>
+      <p:grpSpPr>
+        <a:xfrm>
+          <a:off x="0" y="0"/>
+          <a:ext cx="0" cy="0"/>
+          <a:chOff x="0" y="0"/>
+          <a:chExt cx="0" cy="0"/>
+        </a:xfrm>
+      </p:grpSpPr>
+      <p:sp>
+        <p:nvSpPr>
+          <p:cNvPr id="2" name="Slide Image Placeholder 1"/>
+          <p:cNvSpPr>
+            <a:spLocks noGrp="1" noRot="1" noChangeAspect="1"/>
+          </p:cNvSpPr>
+          <p:nvPr>
+            <p:ph type="sldImg"/>
+          </p:nvPr>
+        </p:nvSpPr>
+        <p:spPr/>
+      </p:sp>
+      <p:sp>
+        <p:nvSpPr>
+          <p:cNvPr id="3" name="Notes Placeholder 2"/>
+          <p:cNvSpPr>
+            <a:spLocks noGrp="1"/>
+          </p:cNvSpPr>
+          <p:nvPr>
+            <p:ph type="body" idx="1"/>
+          </p:nvPr>
+        </p:nvSpPr>
+        <p:spPr/>
+        <p:txBody>
+          <a:bodyPr/>
+          <a:lstStyle/>
+          <a:p>
+            <a:endParaRPr lang="fr-FR" dirty="0"/>
+          </a:p>
+        </p:txBody>
+      </p:sp>
+      <p:sp>
+        <p:nvSpPr>
+          <p:cNvPr id="4" name="Slide Number Placeholder 3"/>
+          <p:cNvSpPr>
+            <a:spLocks noGrp="1"/>
+          </p:cNvSpPr>
+          <p:nvPr>
+            <p:ph type="sldNum" sz="quarter" idx="5"/>
+          </p:nvPr>
+        </p:nvSpPr>
+        <p:spPr/>
+        <p:txBody>
+          <a:bodyPr/>
+          <a:lstStyle/>
+          <a:p>
+            <a:fld id="{0F19A71E-30D6-E84B-B90F-7209948FA413}" type="slidenum">
+              <a:rPr lang="fr-FR" smtClean="0"/>
+              <a:t>2</a:t>
+            </a:fld>
+            <a:endParaRPr lang="fr-FR"/>
+          </a:p>
+        </p:txBody>
+      </p:sp>
+    </p:spTree>
+    <p:extLst>
+      <p:ext uri="{BB962C8B-B14F-4D97-AF65-F5344CB8AC3E}">
+        <p14:creationId xmlns:p14="http://schemas.microsoft.com/office/powerpoint/2010/main" val="2878683558"/>
+      </p:ext>
+    </p:extLst>
+  </p:cSld>
+  <p:clrMapOvr>
+    <a:masterClrMapping/>
+  </p:clrMapOvr>
+</p:notes>
 </file>
 
 <file path=ppt/slideLayouts/slideLayout1.xml><?xml version="1.0" encoding="utf-8"?>
@@ -3371,7 +3814,7 @@
         </p:blipFill>
         <p:spPr>
           <a:xfrm>
-            <a:off x="5154502" y="2449007"/>
+            <a:off x="5154502" y="3610745"/>
             <a:ext cx="1905000" cy="1905000"/>
           </a:xfrm>
           <a:prstGeom prst="rect">
@@ -3407,7 +3850,7 @@
         </p:blipFill>
         <p:spPr>
           <a:xfrm>
-            <a:off x="7153772" y="2449007"/>
+            <a:off x="7153772" y="3610745"/>
             <a:ext cx="1905000" cy="1905000"/>
           </a:xfrm>
           <a:prstGeom prst="rect">
@@ -3417,10 +3860,10 @@
       </p:pic>
       <p:pic>
         <p:nvPicPr>
-          <p:cNvPr id="29" name="Graphic 28">
-            <a:extLst>
-              <a:ext uri="{FF2B5EF4-FFF2-40B4-BE49-F238E27FC236}">
-                <a16:creationId xmlns:a16="http://schemas.microsoft.com/office/drawing/2014/main" id="{4FC4AFF0-762C-4843-BF7F-23C60DF4B335}"/>
+          <p:cNvPr id="33" name="Graphic 32">
+            <a:extLst>
+              <a:ext uri="{FF2B5EF4-FFF2-40B4-BE49-F238E27FC236}">
+                <a16:creationId xmlns:a16="http://schemas.microsoft.com/office/drawing/2014/main" id="{56CDF75E-E85C-994A-B9D8-8C4748C2F5BE}"/>
               </a:ext>
             </a:extLst>
           </p:cNvPr>
@@ -3443,7 +3886,7 @@
         </p:blipFill>
         <p:spPr>
           <a:xfrm>
-            <a:off x="7153772" y="4448277"/>
+            <a:off x="9153042" y="3610745"/>
             <a:ext cx="1905000" cy="1905000"/>
           </a:xfrm>
           <a:prstGeom prst="rect">
@@ -3453,10 +3896,10 @@
       </p:pic>
       <p:pic>
         <p:nvPicPr>
-          <p:cNvPr id="31" name="Graphic 30">
-            <a:extLst>
-              <a:ext uri="{FF2B5EF4-FFF2-40B4-BE49-F238E27FC236}">
-                <a16:creationId xmlns:a16="http://schemas.microsoft.com/office/drawing/2014/main" id="{85172344-94F8-7A42-8448-68D22C551BD3}"/>
+          <p:cNvPr id="41" name="Graphic 40">
+            <a:extLst>
+              <a:ext uri="{FF2B5EF4-FFF2-40B4-BE49-F238E27FC236}">
+                <a16:creationId xmlns:a16="http://schemas.microsoft.com/office/drawing/2014/main" id="{878B9608-D4C2-4447-B7E6-E79410D996D7}"/>
               </a:ext>
             </a:extLst>
           </p:cNvPr>
@@ -3479,7 +3922,7 @@
         </p:blipFill>
         <p:spPr>
           <a:xfrm>
-            <a:off x="9153042" y="4447495"/>
+            <a:off x="3155232" y="3610745"/>
             <a:ext cx="1905000" cy="1905000"/>
           </a:xfrm>
           <a:prstGeom prst="rect">
@@ -3489,10 +3932,10 @@
       </p:pic>
       <p:pic>
         <p:nvPicPr>
-          <p:cNvPr id="33" name="Graphic 32">
-            <a:extLst>
-              <a:ext uri="{FF2B5EF4-FFF2-40B4-BE49-F238E27FC236}">
-                <a16:creationId xmlns:a16="http://schemas.microsoft.com/office/drawing/2014/main" id="{56CDF75E-E85C-994A-B9D8-8C4748C2F5BE}"/>
+          <p:cNvPr id="43" name="Graphic 42">
+            <a:extLst>
+              <a:ext uri="{FF2B5EF4-FFF2-40B4-BE49-F238E27FC236}">
+                <a16:creationId xmlns:a16="http://schemas.microsoft.com/office/drawing/2014/main" id="{EAD52623-D84A-5445-BB1E-54A6C97148DA}"/>
               </a:ext>
             </a:extLst>
           </p:cNvPr>
@@ -3515,7 +3958,7 @@
         </p:blipFill>
         <p:spPr>
           <a:xfrm>
-            <a:off x="9153042" y="2449007"/>
+            <a:off x="1155962" y="3610745"/>
             <a:ext cx="1905000" cy="1905000"/>
           </a:xfrm>
           <a:prstGeom prst="rect">
@@ -3525,10 +3968,10 @@
       </p:pic>
       <p:pic>
         <p:nvPicPr>
-          <p:cNvPr id="35" name="Graphic 34">
-            <a:extLst>
-              <a:ext uri="{FF2B5EF4-FFF2-40B4-BE49-F238E27FC236}">
-                <a16:creationId xmlns:a16="http://schemas.microsoft.com/office/drawing/2014/main" id="{4ADCCE6A-1E92-184A-9A6C-6261AE59993B}"/>
+          <p:cNvPr id="45" name="Graphic 44">
+            <a:extLst>
+              <a:ext uri="{FF2B5EF4-FFF2-40B4-BE49-F238E27FC236}">
+                <a16:creationId xmlns:a16="http://schemas.microsoft.com/office/drawing/2014/main" id="{DAB0D812-0848-1242-8FF9-7E04123C5B11}"/>
               </a:ext>
             </a:extLst>
           </p:cNvPr>
@@ -3551,7 +3994,7 @@
         </p:blipFill>
         <p:spPr>
           <a:xfrm>
-            <a:off x="5154502" y="4448277"/>
+            <a:off x="9153042" y="449737"/>
             <a:ext cx="1905000" cy="1905000"/>
           </a:xfrm>
           <a:prstGeom prst="rect">
@@ -3561,10 +4004,10 @@
       </p:pic>
       <p:pic>
         <p:nvPicPr>
-          <p:cNvPr id="37" name="Graphic 36">
-            <a:extLst>
-              <a:ext uri="{FF2B5EF4-FFF2-40B4-BE49-F238E27FC236}">
-                <a16:creationId xmlns:a16="http://schemas.microsoft.com/office/drawing/2014/main" id="{7FE6EFE3-201F-3D40-86A1-54AFDAFE2C1E}"/>
+          <p:cNvPr id="47" name="Graphic 46">
+            <a:extLst>
+              <a:ext uri="{FF2B5EF4-FFF2-40B4-BE49-F238E27FC236}">
+                <a16:creationId xmlns:a16="http://schemas.microsoft.com/office/drawing/2014/main" id="{F606A3FC-DAE8-1743-8E79-1D8D8630F28C}"/>
               </a:ext>
             </a:extLst>
           </p:cNvPr>
@@ -3587,7 +4030,7 @@
         </p:blipFill>
         <p:spPr>
           <a:xfrm>
-            <a:off x="3155232" y="4448277"/>
+            <a:off x="7153772" y="449737"/>
             <a:ext cx="1905000" cy="1905000"/>
           </a:xfrm>
           <a:prstGeom prst="rect">
@@ -3597,10 +4040,10 @@
       </p:pic>
       <p:pic>
         <p:nvPicPr>
-          <p:cNvPr id="39" name="Graphic 38">
-            <a:extLst>
-              <a:ext uri="{FF2B5EF4-FFF2-40B4-BE49-F238E27FC236}">
-                <a16:creationId xmlns:a16="http://schemas.microsoft.com/office/drawing/2014/main" id="{32F15B0A-43E2-3442-8779-744DE215AB03}"/>
+          <p:cNvPr id="49" name="Graphic 48">
+            <a:extLst>
+              <a:ext uri="{FF2B5EF4-FFF2-40B4-BE49-F238E27FC236}">
+                <a16:creationId xmlns:a16="http://schemas.microsoft.com/office/drawing/2014/main" id="{38ED027B-0571-EB48-8C3B-74BA23660773}"/>
               </a:ext>
             </a:extLst>
           </p:cNvPr>
@@ -3623,7 +4066,7 @@
         </p:blipFill>
         <p:spPr>
           <a:xfrm>
-            <a:off x="1155962" y="4448277"/>
+            <a:off x="5154502" y="449737"/>
             <a:ext cx="1905000" cy="1905000"/>
           </a:xfrm>
           <a:prstGeom prst="rect">
@@ -3633,10 +4076,10 @@
       </p:pic>
       <p:pic>
         <p:nvPicPr>
-          <p:cNvPr id="41" name="Graphic 40">
-            <a:extLst>
-              <a:ext uri="{FF2B5EF4-FFF2-40B4-BE49-F238E27FC236}">
-                <a16:creationId xmlns:a16="http://schemas.microsoft.com/office/drawing/2014/main" id="{878B9608-D4C2-4447-B7E6-E79410D996D7}"/>
+          <p:cNvPr id="51" name="Graphic 50">
+            <a:extLst>
+              <a:ext uri="{FF2B5EF4-FFF2-40B4-BE49-F238E27FC236}">
+                <a16:creationId xmlns:a16="http://schemas.microsoft.com/office/drawing/2014/main" id="{36DFB4E1-0BBE-DE4A-9AC6-84953953F3E7}"/>
               </a:ext>
             </a:extLst>
           </p:cNvPr>
@@ -3659,7 +4102,7 @@
         </p:blipFill>
         <p:spPr>
           <a:xfrm>
-            <a:off x="3155232" y="2449007"/>
+            <a:off x="3155232" y="449737"/>
             <a:ext cx="1905000" cy="1905000"/>
           </a:xfrm>
           <a:prstGeom prst="rect">
@@ -3669,10 +4112,10 @@
       </p:pic>
       <p:pic>
         <p:nvPicPr>
-          <p:cNvPr id="43" name="Graphic 42">
-            <a:extLst>
-              <a:ext uri="{FF2B5EF4-FFF2-40B4-BE49-F238E27FC236}">
-                <a16:creationId xmlns:a16="http://schemas.microsoft.com/office/drawing/2014/main" id="{EAD52623-D84A-5445-BB1E-54A6C97148DA}"/>
+          <p:cNvPr id="53" name="Graphic 52">
+            <a:extLst>
+              <a:ext uri="{FF2B5EF4-FFF2-40B4-BE49-F238E27FC236}">
+                <a16:creationId xmlns:a16="http://schemas.microsoft.com/office/drawing/2014/main" id="{46BF6328-2656-5142-A396-5582B33D0E95}"/>
               </a:ext>
             </a:extLst>
           </p:cNvPr>
@@ -3695,7 +4138,7 @@
         </p:blipFill>
         <p:spPr>
           <a:xfrm>
-            <a:off x="1155962" y="2449007"/>
+            <a:off x="1155962" y="449737"/>
             <a:ext cx="1905000" cy="1905000"/>
           </a:xfrm>
           <a:prstGeom prst="rect">
@@ -3703,186 +4146,468 @@
           </a:prstGeom>
         </p:spPr>
       </p:pic>
-      <p:pic>
-        <p:nvPicPr>
-          <p:cNvPr id="45" name="Graphic 44">
-            <a:extLst>
-              <a:ext uri="{FF2B5EF4-FFF2-40B4-BE49-F238E27FC236}">
-                <a16:creationId xmlns:a16="http://schemas.microsoft.com/office/drawing/2014/main" id="{DAB0D812-0848-1242-8FF9-7E04123C5B11}"/>
-              </a:ext>
-            </a:extLst>
-          </p:cNvPr>
-          <p:cNvPicPr>
-            <a:picLocks noChangeAspect="1"/>
-          </p:cNvPicPr>
+      <p:sp>
+        <p:nvSpPr>
+          <p:cNvPr id="2" name="TextBox 1">
+            <a:extLst>
+              <a:ext uri="{FF2B5EF4-FFF2-40B4-BE49-F238E27FC236}">
+                <a16:creationId xmlns:a16="http://schemas.microsoft.com/office/drawing/2014/main" id="{847C9791-388F-1F45-ABF9-9EB0C5E56426}"/>
+              </a:ext>
+            </a:extLst>
+          </p:cNvPr>
+          <p:cNvSpPr txBox="1"/>
           <p:nvPr/>
-        </p:nvPicPr>
-        <p:blipFill>
-          <a:blip r:embed="rId22">
-            <a:extLst>
-              <a:ext uri="{96DAC541-7B7A-43D3-8B79-37D633B846F1}">
-                <asvg:svgBlip xmlns:asvg="http://schemas.microsoft.com/office/drawing/2016/SVG/main" r:embed="rId23"/>
-              </a:ext>
-            </a:extLst>
-          </a:blip>
-          <a:stretch>
-            <a:fillRect/>
-          </a:stretch>
-        </p:blipFill>
-        <p:spPr>
-          <a:xfrm>
-            <a:off x="9153042" y="449737"/>
-            <a:ext cx="1905000" cy="1905000"/>
+        </p:nvSpPr>
+        <p:spPr>
+          <a:xfrm>
+            <a:off x="1752435" y="2469891"/>
+            <a:ext cx="712054" cy="307777"/>
           </a:xfrm>
           <a:prstGeom prst="rect">
             <a:avLst/>
           </a:prstGeom>
-        </p:spPr>
-      </p:pic>
-      <p:pic>
-        <p:nvPicPr>
-          <p:cNvPr id="47" name="Graphic 46">
-            <a:extLst>
-              <a:ext uri="{FF2B5EF4-FFF2-40B4-BE49-F238E27FC236}">
-                <a16:creationId xmlns:a16="http://schemas.microsoft.com/office/drawing/2014/main" id="{F606A3FC-DAE8-1743-8E79-1D8D8630F28C}"/>
-              </a:ext>
-            </a:extLst>
-          </p:cNvPr>
-          <p:cNvPicPr>
-            <a:picLocks noChangeAspect="1"/>
-          </p:cNvPicPr>
+          <a:noFill/>
+        </p:spPr>
+        <p:txBody>
+          <a:bodyPr wrap="none" rtlCol="0">
+            <a:spAutoFit/>
+          </a:bodyPr>
+          <a:lstStyle/>
+          <a:p>
+            <a:pPr algn="ctr"/>
+            <a:r>
+              <a:rPr lang="fr-FR" sz="1400" dirty="0" err="1">
+                <a:solidFill>
+                  <a:schemeClr val="accent1">
+                    <a:lumMod val="75000"/>
+                  </a:schemeClr>
+                </a:solidFill>
+              </a:rPr>
+              <a:t>Upload</a:t>
+            </a:r>
+            <a:endParaRPr lang="fr-FR" sz="1400" dirty="0">
+              <a:solidFill>
+                <a:schemeClr val="accent1">
+                  <a:lumMod val="75000"/>
+                </a:schemeClr>
+              </a:solidFill>
+            </a:endParaRPr>
+          </a:p>
+        </p:txBody>
+      </p:sp>
+      <p:sp>
+        <p:nvSpPr>
+          <p:cNvPr id="18" name="TextBox 17">
+            <a:extLst>
+              <a:ext uri="{FF2B5EF4-FFF2-40B4-BE49-F238E27FC236}">
+                <a16:creationId xmlns:a16="http://schemas.microsoft.com/office/drawing/2014/main" id="{AFA6ED96-7C77-6944-BD61-0A015A75A796}"/>
+              </a:ext>
+            </a:extLst>
+          </p:cNvPr>
+          <p:cNvSpPr txBox="1"/>
           <p:nvPr/>
-        </p:nvPicPr>
-        <p:blipFill>
-          <a:blip r:embed="rId24">
-            <a:extLst>
-              <a:ext uri="{96DAC541-7B7A-43D3-8B79-37D633B846F1}">
-                <asvg:svgBlip xmlns:asvg="http://schemas.microsoft.com/office/drawing/2016/SVG/main" r:embed="rId25"/>
-              </a:ext>
-            </a:extLst>
-          </a:blip>
-          <a:stretch>
-            <a:fillRect/>
-          </a:stretch>
-        </p:blipFill>
-        <p:spPr>
-          <a:xfrm>
-            <a:off x="7153772" y="449737"/>
-            <a:ext cx="1905000" cy="1905000"/>
+        </p:nvSpPr>
+        <p:spPr>
+          <a:xfrm>
+            <a:off x="3865775" y="2471494"/>
+            <a:ext cx="483915" cy="307777"/>
           </a:xfrm>
           <a:prstGeom prst="rect">
             <a:avLst/>
           </a:prstGeom>
-        </p:spPr>
-      </p:pic>
-      <p:pic>
-        <p:nvPicPr>
-          <p:cNvPr id="49" name="Graphic 48">
-            <a:extLst>
-              <a:ext uri="{FF2B5EF4-FFF2-40B4-BE49-F238E27FC236}">
-                <a16:creationId xmlns:a16="http://schemas.microsoft.com/office/drawing/2014/main" id="{38ED027B-0571-EB48-8C3B-74BA23660773}"/>
-              </a:ext>
-            </a:extLst>
-          </p:cNvPr>
-          <p:cNvPicPr>
-            <a:picLocks noChangeAspect="1"/>
-          </p:cNvPicPr>
+          <a:noFill/>
+        </p:spPr>
+        <p:txBody>
+          <a:bodyPr wrap="none" rtlCol="0">
+            <a:spAutoFit/>
+          </a:bodyPr>
+          <a:lstStyle/>
+          <a:p>
+            <a:pPr algn="ctr"/>
+            <a:r>
+              <a:rPr lang="fr-FR" sz="1400" dirty="0" err="1">
+                <a:solidFill>
+                  <a:schemeClr val="accent1">
+                    <a:lumMod val="75000"/>
+                  </a:schemeClr>
+                </a:solidFill>
+              </a:rPr>
+              <a:t>Text</a:t>
+            </a:r>
+            <a:endParaRPr lang="fr-FR" sz="1400" dirty="0">
+              <a:solidFill>
+                <a:schemeClr val="accent1">
+                  <a:lumMod val="75000"/>
+                </a:schemeClr>
+              </a:solidFill>
+            </a:endParaRPr>
+          </a:p>
+        </p:txBody>
+      </p:sp>
+      <p:sp>
+        <p:nvSpPr>
+          <p:cNvPr id="19" name="TextBox 18">
+            <a:extLst>
+              <a:ext uri="{FF2B5EF4-FFF2-40B4-BE49-F238E27FC236}">
+                <a16:creationId xmlns:a16="http://schemas.microsoft.com/office/drawing/2014/main" id="{9A5CBC23-13BD-A944-9992-105A8BB7884F}"/>
+              </a:ext>
+            </a:extLst>
+          </p:cNvPr>
+          <p:cNvSpPr txBox="1"/>
           <p:nvPr/>
-        </p:nvPicPr>
-        <p:blipFill>
-          <a:blip r:embed="rId26">
-            <a:extLst>
-              <a:ext uri="{96DAC541-7B7A-43D3-8B79-37D633B846F1}">
-                <asvg:svgBlip xmlns:asvg="http://schemas.microsoft.com/office/drawing/2016/SVG/main" r:embed="rId27"/>
-              </a:ext>
-            </a:extLst>
-          </a:blip>
-          <a:stretch>
-            <a:fillRect/>
-          </a:stretch>
-        </p:blipFill>
-        <p:spPr>
-          <a:xfrm>
-            <a:off x="5154502" y="449737"/>
-            <a:ext cx="1905000" cy="1905000"/>
+        </p:nvSpPr>
+        <p:spPr>
+          <a:xfrm>
+            <a:off x="5705003" y="2469891"/>
+            <a:ext cx="575863" cy="307777"/>
           </a:xfrm>
           <a:prstGeom prst="rect">
             <a:avLst/>
           </a:prstGeom>
-        </p:spPr>
-      </p:pic>
-      <p:pic>
-        <p:nvPicPr>
-          <p:cNvPr id="51" name="Graphic 50">
-            <a:extLst>
-              <a:ext uri="{FF2B5EF4-FFF2-40B4-BE49-F238E27FC236}">
-                <a16:creationId xmlns:a16="http://schemas.microsoft.com/office/drawing/2014/main" id="{36DFB4E1-0BBE-DE4A-9AC6-84953953F3E7}"/>
-              </a:ext>
-            </a:extLst>
-          </p:cNvPr>
-          <p:cNvPicPr>
-            <a:picLocks noChangeAspect="1"/>
-          </p:cNvPicPr>
+          <a:noFill/>
+        </p:spPr>
+        <p:txBody>
+          <a:bodyPr wrap="none" rtlCol="0">
+            <a:spAutoFit/>
+          </a:bodyPr>
+          <a:lstStyle/>
+          <a:p>
+            <a:pPr algn="ctr"/>
+            <a:r>
+              <a:rPr lang="fr-FR" sz="1400" dirty="0">
+                <a:solidFill>
+                  <a:schemeClr val="accent1">
+                    <a:lumMod val="75000"/>
+                  </a:schemeClr>
+                </a:solidFill>
+              </a:rPr>
+              <a:t>Team</a:t>
+            </a:r>
+          </a:p>
+        </p:txBody>
+      </p:sp>
+      <p:sp>
+        <p:nvSpPr>
+          <p:cNvPr id="20" name="TextBox 19">
+            <a:extLst>
+              <a:ext uri="{FF2B5EF4-FFF2-40B4-BE49-F238E27FC236}">
+                <a16:creationId xmlns:a16="http://schemas.microsoft.com/office/drawing/2014/main" id="{473599F4-04C2-B54B-9BC1-18901CF52D1C}"/>
+              </a:ext>
+            </a:extLst>
+          </p:cNvPr>
+          <p:cNvSpPr txBox="1"/>
           <p:nvPr/>
-        </p:nvPicPr>
-        <p:blipFill>
-          <a:blip r:embed="rId28">
-            <a:extLst>
-              <a:ext uri="{96DAC541-7B7A-43D3-8B79-37D633B846F1}">
-                <asvg:svgBlip xmlns:asvg="http://schemas.microsoft.com/office/drawing/2016/SVG/main" r:embed="rId29"/>
-              </a:ext>
-            </a:extLst>
-          </a:blip>
-          <a:stretch>
-            <a:fillRect/>
-          </a:stretch>
-        </p:blipFill>
-        <p:spPr>
-          <a:xfrm>
-            <a:off x="3155232" y="449737"/>
-            <a:ext cx="1905000" cy="1905000"/>
+        </p:nvSpPr>
+        <p:spPr>
+          <a:xfrm>
+            <a:off x="7735017" y="2471494"/>
+            <a:ext cx="742511" cy="307777"/>
           </a:xfrm>
           <a:prstGeom prst="rect">
             <a:avLst/>
           </a:prstGeom>
-        </p:spPr>
-      </p:pic>
-      <p:pic>
-        <p:nvPicPr>
-          <p:cNvPr id="53" name="Graphic 52">
-            <a:extLst>
-              <a:ext uri="{FF2B5EF4-FFF2-40B4-BE49-F238E27FC236}">
-                <a16:creationId xmlns:a16="http://schemas.microsoft.com/office/drawing/2014/main" id="{46BF6328-2656-5142-A396-5582B33D0E95}"/>
-              </a:ext>
-            </a:extLst>
-          </p:cNvPr>
-          <p:cNvPicPr>
-            <a:picLocks noChangeAspect="1"/>
-          </p:cNvPicPr>
+          <a:noFill/>
+        </p:spPr>
+        <p:txBody>
+          <a:bodyPr wrap="none" rtlCol="0">
+            <a:spAutoFit/>
+          </a:bodyPr>
+          <a:lstStyle/>
+          <a:p>
+            <a:pPr algn="ctr"/>
+            <a:r>
+              <a:rPr lang="fr-FR" sz="1400" dirty="0" err="1">
+                <a:solidFill>
+                  <a:schemeClr val="accent1">
+                    <a:lumMod val="75000"/>
+                  </a:schemeClr>
+                </a:solidFill>
+              </a:rPr>
+              <a:t>Success</a:t>
+            </a:r>
+            <a:endParaRPr lang="fr-FR" sz="1400" dirty="0">
+              <a:solidFill>
+                <a:schemeClr val="accent1">
+                  <a:lumMod val="75000"/>
+                </a:schemeClr>
+              </a:solidFill>
+            </a:endParaRPr>
+          </a:p>
+        </p:txBody>
+      </p:sp>
+      <p:sp>
+        <p:nvSpPr>
+          <p:cNvPr id="21" name="TextBox 20">
+            <a:extLst>
+              <a:ext uri="{FF2B5EF4-FFF2-40B4-BE49-F238E27FC236}">
+                <a16:creationId xmlns:a16="http://schemas.microsoft.com/office/drawing/2014/main" id="{3247FE19-71D8-A048-A585-84D39B8E5FDA}"/>
+              </a:ext>
+            </a:extLst>
+          </p:cNvPr>
+          <p:cNvSpPr txBox="1"/>
           <p:nvPr/>
-        </p:nvPicPr>
-        <p:blipFill>
-          <a:blip r:embed="rId30">
-            <a:extLst>
-              <a:ext uri="{96DAC541-7B7A-43D3-8B79-37D633B846F1}">
-                <asvg:svgBlip xmlns:asvg="http://schemas.microsoft.com/office/drawing/2016/SVG/main" r:embed="rId31"/>
-              </a:ext>
-            </a:extLst>
-          </a:blip>
-          <a:stretch>
-            <a:fillRect/>
-          </a:stretch>
-        </p:blipFill>
-        <p:spPr>
-          <a:xfrm>
-            <a:off x="1155962" y="449737"/>
-            <a:ext cx="1905000" cy="1905000"/>
+        </p:nvSpPr>
+        <p:spPr>
+          <a:xfrm>
+            <a:off x="9715210" y="2469890"/>
+            <a:ext cx="780663" cy="307777"/>
           </a:xfrm>
           <a:prstGeom prst="rect">
             <a:avLst/>
           </a:prstGeom>
-        </p:spPr>
-      </p:pic>
+          <a:noFill/>
+        </p:spPr>
+        <p:txBody>
+          <a:bodyPr wrap="none" rtlCol="0">
+            <a:spAutoFit/>
+          </a:bodyPr>
+          <a:lstStyle/>
+          <a:p>
+            <a:pPr algn="ctr"/>
+            <a:r>
+              <a:rPr lang="fr-FR" sz="1400" dirty="0" err="1">
+                <a:solidFill>
+                  <a:schemeClr val="accent1">
+                    <a:lumMod val="75000"/>
+                  </a:schemeClr>
+                </a:solidFill>
+              </a:rPr>
+              <a:t>Sitemap</a:t>
+            </a:r>
+            <a:endParaRPr lang="fr-FR" sz="1400" dirty="0">
+              <a:solidFill>
+                <a:schemeClr val="accent1">
+                  <a:lumMod val="75000"/>
+                </a:schemeClr>
+              </a:solidFill>
+            </a:endParaRPr>
+          </a:p>
+        </p:txBody>
+      </p:sp>
+      <p:sp>
+        <p:nvSpPr>
+          <p:cNvPr id="22" name="TextBox 21">
+            <a:extLst>
+              <a:ext uri="{FF2B5EF4-FFF2-40B4-BE49-F238E27FC236}">
+                <a16:creationId xmlns:a16="http://schemas.microsoft.com/office/drawing/2014/main" id="{A9D8941A-9524-1B48-9476-F71D352ABE73}"/>
+              </a:ext>
+            </a:extLst>
+          </p:cNvPr>
+          <p:cNvSpPr txBox="1"/>
+          <p:nvPr/>
+        </p:nvSpPr>
+        <p:spPr>
+          <a:xfrm>
+            <a:off x="1718131" y="5627819"/>
+            <a:ext cx="780663" cy="307777"/>
+          </a:xfrm>
+          <a:prstGeom prst="rect">
+            <a:avLst/>
+          </a:prstGeom>
+          <a:noFill/>
+        </p:spPr>
+        <p:txBody>
+          <a:bodyPr wrap="none" rtlCol="0">
+            <a:spAutoFit/>
+          </a:bodyPr>
+          <a:lstStyle/>
+          <a:p>
+            <a:pPr algn="ctr"/>
+            <a:r>
+              <a:rPr lang="fr-FR" sz="1400" dirty="0" err="1">
+                <a:solidFill>
+                  <a:schemeClr val="accent1">
+                    <a:lumMod val="75000"/>
+                  </a:schemeClr>
+                </a:solidFill>
+              </a:rPr>
+              <a:t>Sitemap</a:t>
+            </a:r>
+            <a:endParaRPr lang="fr-FR" sz="1400" dirty="0">
+              <a:solidFill>
+                <a:schemeClr val="accent1">
+                  <a:lumMod val="75000"/>
+                </a:schemeClr>
+              </a:solidFill>
+            </a:endParaRPr>
+          </a:p>
+        </p:txBody>
+      </p:sp>
+      <p:sp>
+        <p:nvSpPr>
+          <p:cNvPr id="23" name="TextBox 22">
+            <a:extLst>
+              <a:ext uri="{FF2B5EF4-FFF2-40B4-BE49-F238E27FC236}">
+                <a16:creationId xmlns:a16="http://schemas.microsoft.com/office/drawing/2014/main" id="{F0571261-A8D9-024E-B2FE-B569420B9292}"/>
+              </a:ext>
+            </a:extLst>
+          </p:cNvPr>
+          <p:cNvSpPr txBox="1"/>
+          <p:nvPr/>
+        </p:nvSpPr>
+        <p:spPr>
+          <a:xfrm>
+            <a:off x="3777994" y="5627818"/>
+            <a:ext cx="659476" cy="307777"/>
+          </a:xfrm>
+          <a:prstGeom prst="rect">
+            <a:avLst/>
+          </a:prstGeom>
+          <a:noFill/>
+        </p:spPr>
+        <p:txBody>
+          <a:bodyPr wrap="none" rtlCol="0">
+            <a:spAutoFit/>
+          </a:bodyPr>
+          <a:lstStyle/>
+          <a:p>
+            <a:pPr algn="ctr"/>
+            <a:r>
+              <a:rPr lang="fr-FR" sz="1400" dirty="0">
+                <a:solidFill>
+                  <a:schemeClr val="accent1">
+                    <a:lumMod val="75000"/>
+                  </a:schemeClr>
+                </a:solidFill>
+              </a:rPr>
+              <a:t>Profile</a:t>
+            </a:r>
+          </a:p>
+        </p:txBody>
+      </p:sp>
+      <p:sp>
+        <p:nvSpPr>
+          <p:cNvPr id="24" name="TextBox 23">
+            <a:extLst>
+              <a:ext uri="{FF2B5EF4-FFF2-40B4-BE49-F238E27FC236}">
+                <a16:creationId xmlns:a16="http://schemas.microsoft.com/office/drawing/2014/main" id="{BA4BA2BC-1EBC-454C-B67D-BD1426FF511B}"/>
+              </a:ext>
+            </a:extLst>
+          </p:cNvPr>
+          <p:cNvSpPr txBox="1"/>
+          <p:nvPr/>
+        </p:nvSpPr>
+        <p:spPr>
+          <a:xfrm>
+            <a:off x="5787169" y="5622821"/>
+            <a:ext cx="633508" cy="307777"/>
+          </a:xfrm>
+          <a:prstGeom prst="rect">
+            <a:avLst/>
+          </a:prstGeom>
+          <a:noFill/>
+        </p:spPr>
+        <p:txBody>
+          <a:bodyPr wrap="none" rtlCol="0">
+            <a:spAutoFit/>
+          </a:bodyPr>
+          <a:lstStyle/>
+          <a:p>
+            <a:pPr algn="ctr"/>
+            <a:r>
+              <a:rPr lang="fr-FR" sz="1400" dirty="0">
+                <a:solidFill>
+                  <a:schemeClr val="accent1">
+                    <a:lumMod val="75000"/>
+                  </a:schemeClr>
+                </a:solidFill>
+              </a:rPr>
+              <a:t>About</a:t>
+            </a:r>
+          </a:p>
+        </p:txBody>
+      </p:sp>
+      <p:sp>
+        <p:nvSpPr>
+          <p:cNvPr id="25" name="TextBox 24">
+            <a:extLst>
+              <a:ext uri="{FF2B5EF4-FFF2-40B4-BE49-F238E27FC236}">
+                <a16:creationId xmlns:a16="http://schemas.microsoft.com/office/drawing/2014/main" id="{CB28DD11-67C9-344D-8280-C5DAED40E36E}"/>
+              </a:ext>
+            </a:extLst>
+          </p:cNvPr>
+          <p:cNvSpPr txBox="1"/>
+          <p:nvPr/>
+        </p:nvSpPr>
+        <p:spPr>
+          <a:xfrm>
+            <a:off x="7825747" y="5622820"/>
+            <a:ext cx="561051" cy="307777"/>
+          </a:xfrm>
+          <a:prstGeom prst="rect">
+            <a:avLst/>
+          </a:prstGeom>
+          <a:noFill/>
+        </p:spPr>
+        <p:txBody>
+          <a:bodyPr wrap="none" rtlCol="0">
+            <a:spAutoFit/>
+          </a:bodyPr>
+          <a:lstStyle/>
+          <a:p>
+            <a:pPr algn="ctr"/>
+            <a:r>
+              <a:rPr lang="fr-FR" sz="1400" dirty="0" err="1">
+                <a:solidFill>
+                  <a:schemeClr val="accent1">
+                    <a:lumMod val="75000"/>
+                  </a:schemeClr>
+                </a:solidFill>
+              </a:rPr>
+              <a:t>Filter</a:t>
+            </a:r>
+            <a:endParaRPr lang="fr-FR" sz="1400" dirty="0">
+              <a:solidFill>
+                <a:schemeClr val="accent1">
+                  <a:lumMod val="75000"/>
+                </a:schemeClr>
+              </a:solidFill>
+            </a:endParaRPr>
+          </a:p>
+        </p:txBody>
+      </p:sp>
+      <p:sp>
+        <p:nvSpPr>
+          <p:cNvPr id="26" name="TextBox 25">
+            <a:extLst>
+              <a:ext uri="{FF2B5EF4-FFF2-40B4-BE49-F238E27FC236}">
+                <a16:creationId xmlns:a16="http://schemas.microsoft.com/office/drawing/2014/main" id="{630BC3D6-E713-E942-99DE-437E7D0B54F0}"/>
+              </a:ext>
+            </a:extLst>
+          </p:cNvPr>
+          <p:cNvSpPr txBox="1"/>
+          <p:nvPr/>
+        </p:nvSpPr>
+        <p:spPr>
+          <a:xfrm>
+            <a:off x="9657455" y="5635810"/>
+            <a:ext cx="906017" cy="307777"/>
+          </a:xfrm>
+          <a:prstGeom prst="rect">
+            <a:avLst/>
+          </a:prstGeom>
+          <a:noFill/>
+        </p:spPr>
+        <p:txBody>
+          <a:bodyPr wrap="none" rtlCol="0">
+            <a:spAutoFit/>
+          </a:bodyPr>
+          <a:lstStyle/>
+          <a:p>
+            <a:pPr algn="ctr"/>
+            <a:r>
+              <a:rPr lang="fr-FR" sz="1400" dirty="0">
+                <a:solidFill>
+                  <a:schemeClr val="accent1">
+                    <a:lumMod val="75000"/>
+                  </a:schemeClr>
+                </a:solidFill>
+              </a:rPr>
+              <a:t>Line chart</a:t>
+            </a:r>
+          </a:p>
+        </p:txBody>
+      </p:sp>
     </p:spTree>
     <p:extLst>
       <p:ext uri="{BB962C8B-B14F-4D97-AF65-F5344CB8AC3E}">
@@ -3928,10 +4653,10 @@
           <p:nvPr/>
         </p:nvPicPr>
         <p:blipFill>
-          <a:blip r:embed="rId2">
+          <a:blip r:embed="rId3">
             <a:extLst>
               <a:ext uri="{96DAC541-7B7A-43D3-8B79-37D633B846F1}">
-                <asvg:svgBlip xmlns:asvg="http://schemas.microsoft.com/office/drawing/2016/SVG/main" r:embed="rId3"/>
+                <asvg:svgBlip xmlns:asvg="http://schemas.microsoft.com/office/drawing/2016/SVG/main" r:embed="rId4"/>
               </a:ext>
             </a:extLst>
           </a:blip>
@@ -3941,7 +4666,7 @@
         </p:blipFill>
         <p:spPr>
           <a:xfrm>
-            <a:off x="1155600" y="2481842"/>
+            <a:off x="1155600" y="3628589"/>
             <a:ext cx="1905000" cy="1905000"/>
           </a:xfrm>
           <a:prstGeom prst="rect">
@@ -3955,6 +4680,851 @@
             <a:extLst>
               <a:ext uri="{FF2B5EF4-FFF2-40B4-BE49-F238E27FC236}">
                 <a16:creationId xmlns:a16="http://schemas.microsoft.com/office/drawing/2014/main" id="{E9A53560-3139-8C40-8308-19452E4C0DED}"/>
+              </a:ext>
+            </a:extLst>
+          </p:cNvPr>
+          <p:cNvPicPr>
+            <a:picLocks noChangeAspect="1"/>
+          </p:cNvPicPr>
+          <p:nvPr/>
+        </p:nvPicPr>
+        <p:blipFill>
+          <a:blip r:embed="rId5">
+            <a:extLst>
+              <a:ext uri="{96DAC541-7B7A-43D3-8B79-37D633B846F1}">
+                <asvg:svgBlip xmlns:asvg="http://schemas.microsoft.com/office/drawing/2016/SVG/main" r:embed="rId6"/>
+              </a:ext>
+            </a:extLst>
+          </a:blip>
+          <a:stretch>
+            <a:fillRect/>
+          </a:stretch>
+        </p:blipFill>
+        <p:spPr>
+          <a:xfrm>
+            <a:off x="5157376" y="450000"/>
+            <a:ext cx="1905000" cy="1905000"/>
+          </a:xfrm>
+          <a:prstGeom prst="rect">
+            <a:avLst/>
+          </a:prstGeom>
+        </p:spPr>
+      </p:pic>
+      <p:pic>
+        <p:nvPicPr>
+          <p:cNvPr id="6" name="Graphic 5">
+            <a:extLst>
+              <a:ext uri="{FF2B5EF4-FFF2-40B4-BE49-F238E27FC236}">
+                <a16:creationId xmlns:a16="http://schemas.microsoft.com/office/drawing/2014/main" id="{5F13DA21-9CC1-6347-9572-E0D3F1E2A271}"/>
+              </a:ext>
+            </a:extLst>
+          </p:cNvPr>
+          <p:cNvPicPr>
+            <a:picLocks noChangeAspect="1"/>
+          </p:cNvPicPr>
+          <p:nvPr/>
+        </p:nvPicPr>
+        <p:blipFill>
+          <a:blip r:embed="rId7">
+            <a:extLst>
+              <a:ext uri="{96DAC541-7B7A-43D3-8B79-37D633B846F1}">
+                <asvg:svgBlip xmlns:asvg="http://schemas.microsoft.com/office/drawing/2016/SVG/main" r:embed="rId8"/>
+              </a:ext>
+            </a:extLst>
+          </a:blip>
+          <a:stretch>
+            <a:fillRect/>
+          </a:stretch>
+        </p:blipFill>
+        <p:spPr>
+          <a:xfrm>
+            <a:off x="7150769" y="3628589"/>
+            <a:ext cx="1905000" cy="1905000"/>
+          </a:xfrm>
+          <a:prstGeom prst="rect">
+            <a:avLst/>
+          </a:prstGeom>
+        </p:spPr>
+      </p:pic>
+      <p:pic>
+        <p:nvPicPr>
+          <p:cNvPr id="7" name="Graphic 6">
+            <a:extLst>
+              <a:ext uri="{FF2B5EF4-FFF2-40B4-BE49-F238E27FC236}">
+                <a16:creationId xmlns:a16="http://schemas.microsoft.com/office/drawing/2014/main" id="{B3312EF9-FD14-6D41-B3B7-B733C5B02982}"/>
+              </a:ext>
+            </a:extLst>
+          </p:cNvPr>
+          <p:cNvPicPr>
+            <a:picLocks noChangeAspect="1"/>
+          </p:cNvPicPr>
+          <p:nvPr/>
+        </p:nvPicPr>
+        <p:blipFill>
+          <a:blip r:embed="rId9">
+            <a:extLst>
+              <a:ext uri="{96DAC541-7B7A-43D3-8B79-37D633B846F1}">
+                <asvg:svgBlip xmlns:asvg="http://schemas.microsoft.com/office/drawing/2016/SVG/main" r:embed="rId10"/>
+              </a:ext>
+            </a:extLst>
+          </a:blip>
+          <a:stretch>
+            <a:fillRect/>
+          </a:stretch>
+        </p:blipFill>
+        <p:spPr>
+          <a:xfrm>
+            <a:off x="3156488" y="450000"/>
+            <a:ext cx="1905000" cy="1905000"/>
+          </a:xfrm>
+          <a:prstGeom prst="rect">
+            <a:avLst/>
+          </a:prstGeom>
+        </p:spPr>
+      </p:pic>
+      <p:pic>
+        <p:nvPicPr>
+          <p:cNvPr id="8" name="Graphic 7">
+            <a:extLst>
+              <a:ext uri="{FF2B5EF4-FFF2-40B4-BE49-F238E27FC236}">
+                <a16:creationId xmlns:a16="http://schemas.microsoft.com/office/drawing/2014/main" id="{E082757D-A67B-B947-99D8-7A9A61FA749F}"/>
+              </a:ext>
+            </a:extLst>
+          </p:cNvPr>
+          <p:cNvPicPr>
+            <a:picLocks noChangeAspect="1"/>
+          </p:cNvPicPr>
+          <p:nvPr/>
+        </p:nvPicPr>
+        <p:blipFill>
+          <a:blip r:embed="rId11">
+            <a:extLst>
+              <a:ext uri="{96DAC541-7B7A-43D3-8B79-37D633B846F1}">
+                <asvg:svgBlip xmlns:asvg="http://schemas.microsoft.com/office/drawing/2016/SVG/main" r:embed="rId12"/>
+              </a:ext>
+            </a:extLst>
+          </a:blip>
+          <a:stretch>
+            <a:fillRect/>
+          </a:stretch>
+        </p:blipFill>
+        <p:spPr>
+          <a:xfrm>
+            <a:off x="3156488" y="3628589"/>
+            <a:ext cx="1905000" cy="1905000"/>
+          </a:xfrm>
+          <a:prstGeom prst="rect">
+            <a:avLst/>
+          </a:prstGeom>
+        </p:spPr>
+      </p:pic>
+      <p:pic>
+        <p:nvPicPr>
+          <p:cNvPr id="9" name="Graphic 8">
+            <a:extLst>
+              <a:ext uri="{FF2B5EF4-FFF2-40B4-BE49-F238E27FC236}">
+                <a16:creationId xmlns:a16="http://schemas.microsoft.com/office/drawing/2014/main" id="{4454A942-AC10-EB47-9524-4DC17E8CEAF1}"/>
+              </a:ext>
+            </a:extLst>
+          </p:cNvPr>
+          <p:cNvPicPr>
+            <a:picLocks noChangeAspect="1"/>
+          </p:cNvPicPr>
+          <p:nvPr/>
+        </p:nvPicPr>
+        <p:blipFill>
+          <a:blip r:embed="rId13">
+            <a:extLst>
+              <a:ext uri="{96DAC541-7B7A-43D3-8B79-37D633B846F1}">
+                <asvg:svgBlip xmlns:asvg="http://schemas.microsoft.com/office/drawing/2016/SVG/main" r:embed="rId14"/>
+              </a:ext>
+            </a:extLst>
+          </a:blip>
+          <a:stretch>
+            <a:fillRect/>
+          </a:stretch>
+        </p:blipFill>
+        <p:spPr>
+          <a:xfrm>
+            <a:off x="9151657" y="450000"/>
+            <a:ext cx="1905000" cy="1905000"/>
+          </a:xfrm>
+          <a:prstGeom prst="rect">
+            <a:avLst/>
+          </a:prstGeom>
+        </p:spPr>
+      </p:pic>
+      <p:pic>
+        <p:nvPicPr>
+          <p:cNvPr id="10" name="Graphic 9">
+            <a:extLst>
+              <a:ext uri="{FF2B5EF4-FFF2-40B4-BE49-F238E27FC236}">
+                <a16:creationId xmlns:a16="http://schemas.microsoft.com/office/drawing/2014/main" id="{ABFE6B6C-9C2D-F94B-9E0C-0344734EF802}"/>
+              </a:ext>
+            </a:extLst>
+          </p:cNvPr>
+          <p:cNvPicPr>
+            <a:picLocks noChangeAspect="1"/>
+          </p:cNvPicPr>
+          <p:nvPr/>
+        </p:nvPicPr>
+        <p:blipFill>
+          <a:blip r:embed="rId15">
+            <a:extLst>
+              <a:ext uri="{96DAC541-7B7A-43D3-8B79-37D633B846F1}">
+                <asvg:svgBlip xmlns:asvg="http://schemas.microsoft.com/office/drawing/2016/SVG/main" r:embed="rId16"/>
+              </a:ext>
+            </a:extLst>
+          </a:blip>
+          <a:stretch>
+            <a:fillRect/>
+          </a:stretch>
+        </p:blipFill>
+        <p:spPr>
+          <a:xfrm>
+            <a:off x="7150769" y="450000"/>
+            <a:ext cx="1905000" cy="1905000"/>
+          </a:xfrm>
+          <a:prstGeom prst="rect">
+            <a:avLst/>
+          </a:prstGeom>
+        </p:spPr>
+      </p:pic>
+      <p:pic>
+        <p:nvPicPr>
+          <p:cNvPr id="11" name="Graphic 10">
+            <a:extLst>
+              <a:ext uri="{FF2B5EF4-FFF2-40B4-BE49-F238E27FC236}">
+                <a16:creationId xmlns:a16="http://schemas.microsoft.com/office/drawing/2014/main" id="{B339A4AF-BD5B-C642-BB39-EA92186C2911}"/>
+              </a:ext>
+            </a:extLst>
+          </p:cNvPr>
+          <p:cNvPicPr>
+            <a:picLocks noChangeAspect="1"/>
+          </p:cNvPicPr>
+          <p:nvPr/>
+        </p:nvPicPr>
+        <p:blipFill>
+          <a:blip r:embed="rId17">
+            <a:extLst>
+              <a:ext uri="{96DAC541-7B7A-43D3-8B79-37D633B846F1}">
+                <asvg:svgBlip xmlns:asvg="http://schemas.microsoft.com/office/drawing/2016/SVG/main" r:embed="rId18"/>
+              </a:ext>
+            </a:extLst>
+          </a:blip>
+          <a:stretch>
+            <a:fillRect/>
+          </a:stretch>
+        </p:blipFill>
+        <p:spPr>
+          <a:xfrm>
+            <a:off x="5157376" y="3636084"/>
+            <a:ext cx="1905000" cy="1905000"/>
+          </a:xfrm>
+          <a:prstGeom prst="rect">
+            <a:avLst/>
+          </a:prstGeom>
+        </p:spPr>
+      </p:pic>
+      <p:pic>
+        <p:nvPicPr>
+          <p:cNvPr id="12" name="Graphic 11">
+            <a:extLst>
+              <a:ext uri="{FF2B5EF4-FFF2-40B4-BE49-F238E27FC236}">
+                <a16:creationId xmlns:a16="http://schemas.microsoft.com/office/drawing/2014/main" id="{B8F1A618-10CE-0E40-ABD6-15B1718E2487}"/>
+              </a:ext>
+            </a:extLst>
+          </p:cNvPr>
+          <p:cNvPicPr>
+            <a:picLocks noChangeAspect="1"/>
+          </p:cNvPicPr>
+          <p:nvPr/>
+        </p:nvPicPr>
+        <p:blipFill>
+          <a:blip r:embed="rId19">
+            <a:extLst>
+              <a:ext uri="{96DAC541-7B7A-43D3-8B79-37D633B846F1}">
+                <asvg:svgBlip xmlns:asvg="http://schemas.microsoft.com/office/drawing/2016/SVG/main" r:embed="rId20"/>
+              </a:ext>
+            </a:extLst>
+          </a:blip>
+          <a:stretch>
+            <a:fillRect/>
+          </a:stretch>
+        </p:blipFill>
+        <p:spPr>
+          <a:xfrm>
+            <a:off x="1155600" y="450000"/>
+            <a:ext cx="1905000" cy="1905000"/>
+          </a:xfrm>
+          <a:prstGeom prst="rect">
+            <a:avLst/>
+          </a:prstGeom>
+        </p:spPr>
+      </p:pic>
+      <p:pic>
+        <p:nvPicPr>
+          <p:cNvPr id="13" name="Graphic 12">
+            <a:extLst>
+              <a:ext uri="{FF2B5EF4-FFF2-40B4-BE49-F238E27FC236}">
+                <a16:creationId xmlns:a16="http://schemas.microsoft.com/office/drawing/2014/main" id="{FAA924D3-BEA6-9D4F-B513-31089DF99F0D}"/>
+              </a:ext>
+            </a:extLst>
+          </p:cNvPr>
+          <p:cNvPicPr>
+            <a:picLocks noChangeAspect="1"/>
+          </p:cNvPicPr>
+          <p:nvPr/>
+        </p:nvPicPr>
+        <p:blipFill>
+          <a:blip r:embed="rId21">
+            <a:extLst>
+              <a:ext uri="{96DAC541-7B7A-43D3-8B79-37D633B846F1}">
+                <asvg:svgBlip xmlns:asvg="http://schemas.microsoft.com/office/drawing/2016/SVG/main" r:embed="rId22"/>
+              </a:ext>
+            </a:extLst>
+          </a:blip>
+          <a:stretch>
+            <a:fillRect/>
+          </a:stretch>
+        </p:blipFill>
+        <p:spPr>
+          <a:xfrm>
+            <a:off x="9151657" y="3636084"/>
+            <a:ext cx="1905000" cy="1905000"/>
+          </a:xfrm>
+          <a:prstGeom prst="rect">
+            <a:avLst/>
+          </a:prstGeom>
+        </p:spPr>
+      </p:pic>
+      <p:sp>
+        <p:nvSpPr>
+          <p:cNvPr id="14" name="TextBox 13">
+            <a:extLst>
+              <a:ext uri="{FF2B5EF4-FFF2-40B4-BE49-F238E27FC236}">
+                <a16:creationId xmlns:a16="http://schemas.microsoft.com/office/drawing/2014/main" id="{617B0F92-03AA-AB46-80CB-5BD38F844017}"/>
+              </a:ext>
+            </a:extLst>
+          </p:cNvPr>
+          <p:cNvSpPr txBox="1"/>
+          <p:nvPr/>
+        </p:nvSpPr>
+        <p:spPr>
+          <a:xfrm>
+            <a:off x="1836593" y="2469891"/>
+            <a:ext cx="543739" cy="307777"/>
+          </a:xfrm>
+          <a:prstGeom prst="rect">
+            <a:avLst/>
+          </a:prstGeom>
+          <a:noFill/>
+        </p:spPr>
+        <p:txBody>
+          <a:bodyPr wrap="none" rtlCol="0">
+            <a:spAutoFit/>
+          </a:bodyPr>
+          <a:lstStyle/>
+          <a:p>
+            <a:pPr algn="ctr"/>
+            <a:r>
+              <a:rPr lang="fr-FR" sz="1400" dirty="0" err="1">
+                <a:solidFill>
+                  <a:schemeClr val="accent1">
+                    <a:lumMod val="75000"/>
+                  </a:schemeClr>
+                </a:solidFill>
+              </a:rPr>
+              <a:t>Alert</a:t>
+            </a:r>
+            <a:endParaRPr lang="fr-FR" sz="1400" dirty="0">
+              <a:solidFill>
+                <a:schemeClr val="accent1">
+                  <a:lumMod val="75000"/>
+                </a:schemeClr>
+              </a:solidFill>
+            </a:endParaRPr>
+          </a:p>
+        </p:txBody>
+      </p:sp>
+      <p:sp>
+        <p:nvSpPr>
+          <p:cNvPr id="15" name="TextBox 14">
+            <a:extLst>
+              <a:ext uri="{FF2B5EF4-FFF2-40B4-BE49-F238E27FC236}">
+                <a16:creationId xmlns:a16="http://schemas.microsoft.com/office/drawing/2014/main" id="{E2342A43-7EEC-1245-A2CC-EB625711D423}"/>
+              </a:ext>
+            </a:extLst>
+          </p:cNvPr>
+          <p:cNvSpPr txBox="1"/>
+          <p:nvPr/>
+        </p:nvSpPr>
+        <p:spPr>
+          <a:xfrm>
+            <a:off x="3684416" y="2469890"/>
+            <a:ext cx="849143" cy="307777"/>
+          </a:xfrm>
+          <a:prstGeom prst="rect">
+            <a:avLst/>
+          </a:prstGeom>
+          <a:noFill/>
+        </p:spPr>
+        <p:txBody>
+          <a:bodyPr wrap="none" rtlCol="0">
+            <a:spAutoFit/>
+          </a:bodyPr>
+          <a:lstStyle/>
+          <a:p>
+            <a:pPr algn="ctr"/>
+            <a:r>
+              <a:rPr lang="fr-FR" sz="1400" dirty="0">
+                <a:solidFill>
+                  <a:schemeClr val="accent1">
+                    <a:lumMod val="75000"/>
+                  </a:schemeClr>
+                </a:solidFill>
+              </a:rPr>
+              <a:t>Compare</a:t>
+            </a:r>
+          </a:p>
+        </p:txBody>
+      </p:sp>
+      <p:sp>
+        <p:nvSpPr>
+          <p:cNvPr id="16" name="TextBox 15">
+            <a:extLst>
+              <a:ext uri="{FF2B5EF4-FFF2-40B4-BE49-F238E27FC236}">
+                <a16:creationId xmlns:a16="http://schemas.microsoft.com/office/drawing/2014/main" id="{6FAD20E2-8C57-1F40-92F9-6577A26F917E}"/>
+              </a:ext>
+            </a:extLst>
+          </p:cNvPr>
+          <p:cNvSpPr txBox="1"/>
+          <p:nvPr/>
+        </p:nvSpPr>
+        <p:spPr>
+          <a:xfrm>
+            <a:off x="5890103" y="2469889"/>
+            <a:ext cx="439544" cy="307777"/>
+          </a:xfrm>
+          <a:prstGeom prst="rect">
+            <a:avLst/>
+          </a:prstGeom>
+          <a:noFill/>
+        </p:spPr>
+        <p:txBody>
+          <a:bodyPr wrap="none" rtlCol="0">
+            <a:spAutoFit/>
+          </a:bodyPr>
+          <a:lstStyle/>
+          <a:p>
+            <a:pPr algn="ctr"/>
+            <a:r>
+              <a:rPr lang="fr-FR" sz="1400" dirty="0">
+                <a:solidFill>
+                  <a:schemeClr val="accent1">
+                    <a:lumMod val="75000"/>
+                  </a:schemeClr>
+                </a:solidFill>
+              </a:rPr>
+              <a:t>File</a:t>
+            </a:r>
+          </a:p>
+        </p:txBody>
+      </p:sp>
+      <p:sp>
+        <p:nvSpPr>
+          <p:cNvPr id="17" name="TextBox 16">
+            <a:extLst>
+              <a:ext uri="{FF2B5EF4-FFF2-40B4-BE49-F238E27FC236}">
+                <a16:creationId xmlns:a16="http://schemas.microsoft.com/office/drawing/2014/main" id="{6433CB0F-65B0-C74C-819F-732F88D3A950}"/>
+              </a:ext>
+            </a:extLst>
+          </p:cNvPr>
+          <p:cNvSpPr txBox="1"/>
+          <p:nvPr/>
+        </p:nvSpPr>
+        <p:spPr>
+          <a:xfrm>
+            <a:off x="7684726" y="2469889"/>
+            <a:ext cx="837089" cy="307777"/>
+          </a:xfrm>
+          <a:prstGeom prst="rect">
+            <a:avLst/>
+          </a:prstGeom>
+          <a:noFill/>
+        </p:spPr>
+        <p:txBody>
+          <a:bodyPr wrap="none" rtlCol="0">
+            <a:spAutoFit/>
+          </a:bodyPr>
+          <a:lstStyle/>
+          <a:p>
+            <a:pPr algn="ctr"/>
+            <a:r>
+              <a:rPr lang="fr-FR" sz="1400" dirty="0" err="1">
+                <a:solidFill>
+                  <a:schemeClr val="accent1">
+                    <a:lumMod val="75000"/>
+                  </a:schemeClr>
+                </a:solidFill>
+              </a:rPr>
+              <a:t>Calendar</a:t>
+            </a:r>
+            <a:endParaRPr lang="fr-FR" sz="1400" dirty="0">
+              <a:solidFill>
+                <a:schemeClr val="accent1">
+                  <a:lumMod val="75000"/>
+                </a:schemeClr>
+              </a:solidFill>
+            </a:endParaRPr>
+          </a:p>
+        </p:txBody>
+      </p:sp>
+      <p:sp>
+        <p:nvSpPr>
+          <p:cNvPr id="18" name="TextBox 17">
+            <a:extLst>
+              <a:ext uri="{FF2B5EF4-FFF2-40B4-BE49-F238E27FC236}">
+                <a16:creationId xmlns:a16="http://schemas.microsoft.com/office/drawing/2014/main" id="{8D6FE483-0AB4-F742-A86B-794812901167}"/>
+              </a:ext>
+            </a:extLst>
+          </p:cNvPr>
+          <p:cNvSpPr txBox="1"/>
+          <p:nvPr/>
+        </p:nvSpPr>
+        <p:spPr>
+          <a:xfrm>
+            <a:off x="9843540" y="2469888"/>
+            <a:ext cx="521233" cy="307777"/>
+          </a:xfrm>
+          <a:prstGeom prst="rect">
+            <a:avLst/>
+          </a:prstGeom>
+          <a:noFill/>
+        </p:spPr>
+        <p:txBody>
+          <a:bodyPr wrap="none" rtlCol="0">
+            <a:spAutoFit/>
+          </a:bodyPr>
+          <a:lstStyle/>
+          <a:p>
+            <a:pPr algn="ctr"/>
+            <a:r>
+              <a:rPr lang="fr-FR" sz="1400" dirty="0">
+                <a:solidFill>
+                  <a:schemeClr val="accent1">
+                    <a:lumMod val="75000"/>
+                  </a:schemeClr>
+                </a:solidFill>
+              </a:rPr>
+              <a:t>Chat</a:t>
+            </a:r>
+          </a:p>
+        </p:txBody>
+      </p:sp>
+      <p:sp>
+        <p:nvSpPr>
+          <p:cNvPr id="19" name="TextBox 18">
+            <a:extLst>
+              <a:ext uri="{FF2B5EF4-FFF2-40B4-BE49-F238E27FC236}">
+                <a16:creationId xmlns:a16="http://schemas.microsoft.com/office/drawing/2014/main" id="{7733BD9F-DF98-2E41-A0C0-793B343E9163}"/>
+              </a:ext>
+            </a:extLst>
+          </p:cNvPr>
+          <p:cNvSpPr txBox="1"/>
+          <p:nvPr/>
+        </p:nvSpPr>
+        <p:spPr>
+          <a:xfrm>
+            <a:off x="1855164" y="5642809"/>
+            <a:ext cx="510076" cy="307777"/>
+          </a:xfrm>
+          <a:prstGeom prst="rect">
+            <a:avLst/>
+          </a:prstGeom>
+          <a:noFill/>
+        </p:spPr>
+        <p:txBody>
+          <a:bodyPr wrap="none" rtlCol="0">
+            <a:spAutoFit/>
+          </a:bodyPr>
+          <a:lstStyle/>
+          <a:p>
+            <a:pPr algn="ctr"/>
+            <a:r>
+              <a:rPr lang="fr-FR" sz="1400" dirty="0">
+                <a:solidFill>
+                  <a:schemeClr val="accent1">
+                    <a:lumMod val="75000"/>
+                  </a:schemeClr>
+                </a:solidFill>
+              </a:rPr>
+              <a:t>Files</a:t>
+            </a:r>
+          </a:p>
+        </p:txBody>
+      </p:sp>
+      <p:sp>
+        <p:nvSpPr>
+          <p:cNvPr id="20" name="TextBox 19">
+            <a:extLst>
+              <a:ext uri="{FF2B5EF4-FFF2-40B4-BE49-F238E27FC236}">
+                <a16:creationId xmlns:a16="http://schemas.microsoft.com/office/drawing/2014/main" id="{20DF800E-B7DD-2C40-ADE9-122724345E5A}"/>
+              </a:ext>
+            </a:extLst>
+          </p:cNvPr>
+          <p:cNvSpPr txBox="1"/>
+          <p:nvPr/>
+        </p:nvSpPr>
+        <p:spPr>
+          <a:xfrm>
+            <a:off x="3621546" y="5642808"/>
+            <a:ext cx="974883" cy="307777"/>
+          </a:xfrm>
+          <a:prstGeom prst="rect">
+            <a:avLst/>
+          </a:prstGeom>
+          <a:noFill/>
+        </p:spPr>
+        <p:txBody>
+          <a:bodyPr wrap="none" rtlCol="0">
+            <a:spAutoFit/>
+          </a:bodyPr>
+          <a:lstStyle/>
+          <a:p>
+            <a:pPr algn="ctr"/>
+            <a:r>
+              <a:rPr lang="fr-FR" sz="1400" dirty="0" err="1">
+                <a:solidFill>
+                  <a:schemeClr val="accent1">
+                    <a:lumMod val="75000"/>
+                  </a:schemeClr>
+                </a:solidFill>
+              </a:rPr>
+              <a:t>Comments</a:t>
+            </a:r>
+            <a:endParaRPr lang="fr-FR" sz="1400" dirty="0">
+              <a:solidFill>
+                <a:schemeClr val="accent1">
+                  <a:lumMod val="75000"/>
+                </a:schemeClr>
+              </a:solidFill>
+            </a:endParaRPr>
+          </a:p>
+        </p:txBody>
+      </p:sp>
+      <p:sp>
+        <p:nvSpPr>
+          <p:cNvPr id="21" name="TextBox 20">
+            <a:extLst>
+              <a:ext uri="{FF2B5EF4-FFF2-40B4-BE49-F238E27FC236}">
+                <a16:creationId xmlns:a16="http://schemas.microsoft.com/office/drawing/2014/main" id="{B9C0ED87-E3EE-4741-9115-69FC53BE37FA}"/>
+              </a:ext>
+            </a:extLst>
+          </p:cNvPr>
+          <p:cNvSpPr txBox="1"/>
+          <p:nvPr/>
+        </p:nvSpPr>
+        <p:spPr>
+          <a:xfrm>
+            <a:off x="5779496" y="5642807"/>
+            <a:ext cx="660758" cy="307777"/>
+          </a:xfrm>
+          <a:prstGeom prst="rect">
+            <a:avLst/>
+          </a:prstGeom>
+          <a:noFill/>
+        </p:spPr>
+        <p:txBody>
+          <a:bodyPr wrap="none" rtlCol="0">
+            <a:spAutoFit/>
+          </a:bodyPr>
+          <a:lstStyle/>
+          <a:p>
+            <a:pPr algn="ctr"/>
+            <a:r>
+              <a:rPr lang="fr-FR" sz="1400" dirty="0">
+                <a:solidFill>
+                  <a:schemeClr val="accent1">
+                    <a:lumMod val="75000"/>
+                  </a:schemeClr>
+                </a:solidFill>
+              </a:rPr>
+              <a:t>Article</a:t>
+            </a:r>
+          </a:p>
+        </p:txBody>
+      </p:sp>
+      <p:sp>
+        <p:nvSpPr>
+          <p:cNvPr id="22" name="TextBox 21">
+            <a:extLst>
+              <a:ext uri="{FF2B5EF4-FFF2-40B4-BE49-F238E27FC236}">
+                <a16:creationId xmlns:a16="http://schemas.microsoft.com/office/drawing/2014/main" id="{BD5E71D1-F8BB-3143-8863-5C5BCC7F8C64}"/>
+              </a:ext>
+            </a:extLst>
+          </p:cNvPr>
+          <p:cNvSpPr txBox="1"/>
+          <p:nvPr/>
+        </p:nvSpPr>
+        <p:spPr>
+          <a:xfrm>
+            <a:off x="7638593" y="5642807"/>
+            <a:ext cx="929357" cy="307777"/>
+          </a:xfrm>
+          <a:prstGeom prst="rect">
+            <a:avLst/>
+          </a:prstGeom>
+          <a:noFill/>
+        </p:spPr>
+        <p:txBody>
+          <a:bodyPr wrap="none" rtlCol="0">
+            <a:spAutoFit/>
+          </a:bodyPr>
+          <a:lstStyle/>
+          <a:p>
+            <a:pPr algn="ctr"/>
+            <a:r>
+              <a:rPr lang="fr-FR" sz="1400" dirty="0" err="1">
+                <a:solidFill>
+                  <a:schemeClr val="accent1">
+                    <a:lumMod val="75000"/>
+                  </a:schemeClr>
+                </a:solidFill>
+              </a:rPr>
+              <a:t>Download</a:t>
+            </a:r>
+            <a:endParaRPr lang="fr-FR" sz="1400" dirty="0">
+              <a:solidFill>
+                <a:schemeClr val="accent1">
+                  <a:lumMod val="75000"/>
+                </a:schemeClr>
+              </a:solidFill>
+            </a:endParaRPr>
+          </a:p>
+        </p:txBody>
+      </p:sp>
+      <p:sp>
+        <p:nvSpPr>
+          <p:cNvPr id="23" name="TextBox 22">
+            <a:extLst>
+              <a:ext uri="{FF2B5EF4-FFF2-40B4-BE49-F238E27FC236}">
+                <a16:creationId xmlns:a16="http://schemas.microsoft.com/office/drawing/2014/main" id="{CE34D9DA-EC08-204A-9D4B-D407F6A7BE5C}"/>
+              </a:ext>
+            </a:extLst>
+          </p:cNvPr>
+          <p:cNvSpPr txBox="1"/>
+          <p:nvPr/>
+        </p:nvSpPr>
+        <p:spPr>
+          <a:xfrm>
+            <a:off x="9752490" y="5642806"/>
+            <a:ext cx="703334" cy="307777"/>
+          </a:xfrm>
+          <a:prstGeom prst="rect">
+            <a:avLst/>
+          </a:prstGeom>
+          <a:noFill/>
+        </p:spPr>
+        <p:txBody>
+          <a:bodyPr wrap="none" rtlCol="0">
+            <a:spAutoFit/>
+          </a:bodyPr>
+          <a:lstStyle/>
+          <a:p>
+            <a:pPr algn="ctr"/>
+            <a:r>
+              <a:rPr lang="fr-FR" sz="1400" dirty="0" err="1">
+                <a:solidFill>
+                  <a:schemeClr val="accent1">
+                    <a:lumMod val="75000"/>
+                  </a:schemeClr>
+                </a:solidFill>
+              </a:rPr>
+              <a:t>Gallery</a:t>
+            </a:r>
+            <a:endParaRPr lang="fr-FR" sz="1400" dirty="0">
+              <a:solidFill>
+                <a:schemeClr val="accent1">
+                  <a:lumMod val="75000"/>
+                </a:schemeClr>
+              </a:solidFill>
+            </a:endParaRPr>
+          </a:p>
+        </p:txBody>
+      </p:sp>
+    </p:spTree>
+    <p:extLst>
+      <p:ext uri="{BB962C8B-B14F-4D97-AF65-F5344CB8AC3E}">
+        <p14:creationId xmlns:p14="http://schemas.microsoft.com/office/powerpoint/2010/main" val="1367573051"/>
+      </p:ext>
+    </p:extLst>
+  </p:cSld>
+  <p:clrMapOvr>
+    <a:masterClrMapping/>
+  </p:clrMapOvr>
+</p:sld>
+</file>
+
+<file path=ppt/slides/slide3.xml><?xml version="1.0" encoding="utf-8"?>
+<p:sld xmlns:a="http://schemas.openxmlformats.org/drawingml/2006/main" xmlns:r="http://schemas.openxmlformats.org/officeDocument/2006/relationships" xmlns:p="http://schemas.openxmlformats.org/presentationml/2006/main">
+  <p:cSld>
+    <p:spTree>
+      <p:nvGrpSpPr>
+        <p:cNvPr id="1" name=""/>
+        <p:cNvGrpSpPr/>
+        <p:nvPr/>
+      </p:nvGrpSpPr>
+      <p:grpSpPr>
+        <a:xfrm>
+          <a:off x="0" y="0"/>
+          <a:ext cx="0" cy="0"/>
+          <a:chOff x="0" y="0"/>
+          <a:chExt cx="0" cy="0"/>
+        </a:xfrm>
+      </p:grpSpPr>
+      <p:pic>
+        <p:nvPicPr>
+          <p:cNvPr id="4" name="Graphic 3">
+            <a:extLst>
+              <a:ext uri="{FF2B5EF4-FFF2-40B4-BE49-F238E27FC236}">
+                <a16:creationId xmlns:a16="http://schemas.microsoft.com/office/drawing/2014/main" id="{0021A144-F509-3D43-8E3A-85DDEABC66BD}"/>
+              </a:ext>
+            </a:extLst>
+          </p:cNvPr>
+          <p:cNvPicPr>
+            <a:picLocks noChangeAspect="1"/>
+          </p:cNvPicPr>
+          <p:nvPr/>
+        </p:nvPicPr>
+        <p:blipFill>
+          <a:blip r:embed="rId2">
+            <a:extLst>
+              <a:ext uri="{96DAC541-7B7A-43D3-8B79-37D633B846F1}">
+                <asvg:svgBlip xmlns:asvg="http://schemas.microsoft.com/office/drawing/2016/SVG/main" r:embed="rId3"/>
+              </a:ext>
+            </a:extLst>
+          </a:blip>
+          <a:stretch>
+            <a:fillRect/>
+          </a:stretch>
+        </p:blipFill>
+        <p:spPr>
+          <a:xfrm>
+            <a:off x="7078820" y="505864"/>
+            <a:ext cx="1905000" cy="1905000"/>
+          </a:xfrm>
+          <a:prstGeom prst="rect">
+            <a:avLst/>
+          </a:prstGeom>
+        </p:spPr>
+      </p:pic>
+      <p:pic>
+        <p:nvPicPr>
+          <p:cNvPr id="6" name="Graphic 5">
+            <a:extLst>
+              <a:ext uri="{FF2B5EF4-FFF2-40B4-BE49-F238E27FC236}">
+                <a16:creationId xmlns:a16="http://schemas.microsoft.com/office/drawing/2014/main" id="{005AC345-FB08-5246-869E-FA9C40FD6FC2}"/>
               </a:ext>
             </a:extLst>
           </p:cNvPr>
@@ -3977,7 +5547,7 @@
         </p:blipFill>
         <p:spPr>
           <a:xfrm>
-            <a:off x="5232328" y="450000"/>
+            <a:off x="5079550" y="505864"/>
             <a:ext cx="1905000" cy="1905000"/>
           </a:xfrm>
           <a:prstGeom prst="rect">
@@ -3987,10 +5557,10 @@
       </p:pic>
       <p:pic>
         <p:nvPicPr>
-          <p:cNvPr id="6" name="Graphic 5">
-            <a:extLst>
-              <a:ext uri="{FF2B5EF4-FFF2-40B4-BE49-F238E27FC236}">
-                <a16:creationId xmlns:a16="http://schemas.microsoft.com/office/drawing/2014/main" id="{5F13DA21-9CC1-6347-9572-E0D3F1E2A271}"/>
+          <p:cNvPr id="7" name="Graphic 6">
+            <a:extLst>
+              <a:ext uri="{FF2B5EF4-FFF2-40B4-BE49-F238E27FC236}">
+                <a16:creationId xmlns:a16="http://schemas.microsoft.com/office/drawing/2014/main" id="{B322F60D-A582-7E41-977B-6D6DBAB17186}"/>
               </a:ext>
             </a:extLst>
           </p:cNvPr>
@@ -4013,7 +5583,7 @@
         </p:blipFill>
         <p:spPr>
           <a:xfrm>
-            <a:off x="7270692" y="2481842"/>
+            <a:off x="3080280" y="505864"/>
             <a:ext cx="1905000" cy="1905000"/>
           </a:xfrm>
           <a:prstGeom prst="rect">
@@ -4023,10 +5593,10 @@
       </p:pic>
       <p:pic>
         <p:nvPicPr>
-          <p:cNvPr id="7" name="Graphic 6">
-            <a:extLst>
-              <a:ext uri="{FF2B5EF4-FFF2-40B4-BE49-F238E27FC236}">
-                <a16:creationId xmlns:a16="http://schemas.microsoft.com/office/drawing/2014/main" id="{B3312EF9-FD14-6D41-B3B7-B733C5B02982}"/>
+          <p:cNvPr id="8" name="Graphic 7">
+            <a:extLst>
+              <a:ext uri="{FF2B5EF4-FFF2-40B4-BE49-F238E27FC236}">
+                <a16:creationId xmlns:a16="http://schemas.microsoft.com/office/drawing/2014/main" id="{E9F74BE5-3B62-7B4C-831B-171FE16E92B7}"/>
               </a:ext>
             </a:extLst>
           </p:cNvPr>
@@ -4049,7 +5619,7 @@
         </p:blipFill>
         <p:spPr>
           <a:xfrm>
-            <a:off x="3193964" y="450000"/>
+            <a:off x="1081010" y="505864"/>
             <a:ext cx="1905000" cy="1905000"/>
           </a:xfrm>
           <a:prstGeom prst="rect">
@@ -4057,190 +5627,185 @@
           </a:prstGeom>
         </p:spPr>
       </p:pic>
-      <p:pic>
-        <p:nvPicPr>
-          <p:cNvPr id="8" name="Graphic 7">
-            <a:extLst>
-              <a:ext uri="{FF2B5EF4-FFF2-40B4-BE49-F238E27FC236}">
-                <a16:creationId xmlns:a16="http://schemas.microsoft.com/office/drawing/2014/main" id="{E082757D-A67B-B947-99D8-7A9A61FA749F}"/>
-              </a:ext>
-            </a:extLst>
-          </p:cNvPr>
-          <p:cNvPicPr>
-            <a:picLocks noChangeAspect="1"/>
-          </p:cNvPicPr>
+      <p:sp>
+        <p:nvSpPr>
+          <p:cNvPr id="9" name="TextBox 8">
+            <a:extLst>
+              <a:ext uri="{FF2B5EF4-FFF2-40B4-BE49-F238E27FC236}">
+                <a16:creationId xmlns:a16="http://schemas.microsoft.com/office/drawing/2014/main" id="{1142DF87-6F2A-A746-86D8-08454857805F}"/>
+              </a:ext>
+            </a:extLst>
+          </p:cNvPr>
+          <p:cNvSpPr txBox="1"/>
           <p:nvPr/>
-        </p:nvPicPr>
-        <p:blipFill>
-          <a:blip r:embed="rId10">
-            <a:extLst>
-              <a:ext uri="{96DAC541-7B7A-43D3-8B79-37D633B846F1}">
-                <asvg:svgBlip xmlns:asvg="http://schemas.microsoft.com/office/drawing/2016/SVG/main" r:embed="rId11"/>
-              </a:ext>
-            </a:extLst>
-          </a:blip>
-          <a:stretch>
-            <a:fillRect/>
-          </a:stretch>
-        </p:blipFill>
-        <p:spPr>
-          <a:xfrm>
-            <a:off x="3193964" y="2481842"/>
-            <a:ext cx="1905000" cy="1905000"/>
+        </p:nvSpPr>
+        <p:spPr>
+          <a:xfrm>
+            <a:off x="1693927" y="2488179"/>
+            <a:ext cx="829074" cy="307777"/>
           </a:xfrm>
           <a:prstGeom prst="rect">
             <a:avLst/>
           </a:prstGeom>
-        </p:spPr>
-      </p:pic>
-      <p:pic>
-        <p:nvPicPr>
-          <p:cNvPr id="9" name="Graphic 8">
-            <a:extLst>
-              <a:ext uri="{FF2B5EF4-FFF2-40B4-BE49-F238E27FC236}">
-                <a16:creationId xmlns:a16="http://schemas.microsoft.com/office/drawing/2014/main" id="{4454A942-AC10-EB47-9524-4DC17E8CEAF1}"/>
-              </a:ext>
-            </a:extLst>
-          </p:cNvPr>
-          <p:cNvPicPr>
-            <a:picLocks noChangeAspect="1"/>
-          </p:cNvPicPr>
+          <a:noFill/>
+        </p:spPr>
+        <p:txBody>
+          <a:bodyPr wrap="none" rtlCol="0">
+            <a:spAutoFit/>
+          </a:bodyPr>
+          <a:lstStyle/>
+          <a:p>
+            <a:pPr algn="ctr"/>
+            <a:r>
+              <a:rPr lang="fr-FR" sz="1400" dirty="0">
+                <a:solidFill>
+                  <a:schemeClr val="accent1">
+                    <a:lumMod val="75000"/>
+                  </a:schemeClr>
+                </a:solidFill>
+              </a:rPr>
+              <a:t>Pie chart</a:t>
+            </a:r>
+          </a:p>
+        </p:txBody>
+      </p:sp>
+      <p:sp>
+        <p:nvSpPr>
+          <p:cNvPr id="10" name="TextBox 9">
+            <a:extLst>
+              <a:ext uri="{FF2B5EF4-FFF2-40B4-BE49-F238E27FC236}">
+                <a16:creationId xmlns:a16="http://schemas.microsoft.com/office/drawing/2014/main" id="{EFABDB1B-028D-0049-907D-D94E74C7F741}"/>
+              </a:ext>
+            </a:extLst>
+          </p:cNvPr>
+          <p:cNvSpPr txBox="1"/>
           <p:nvPr/>
-        </p:nvPicPr>
-        <p:blipFill>
-          <a:blip r:embed="rId12">
-            <a:extLst>
-              <a:ext uri="{96DAC541-7B7A-43D3-8B79-37D633B846F1}">
-                <asvg:svgBlip xmlns:asvg="http://schemas.microsoft.com/office/drawing/2016/SVG/main" r:embed="rId13"/>
-              </a:ext>
-            </a:extLst>
-          </a:blip>
-          <a:stretch>
-            <a:fillRect/>
-          </a:stretch>
-        </p:blipFill>
-        <p:spPr>
-          <a:xfrm>
-            <a:off x="9309056" y="450000"/>
-            <a:ext cx="1905000" cy="1905000"/>
+        </p:nvSpPr>
+        <p:spPr>
+          <a:xfrm>
+            <a:off x="3704807" y="2488179"/>
+            <a:ext cx="655950" cy="307777"/>
           </a:xfrm>
           <a:prstGeom prst="rect">
             <a:avLst/>
           </a:prstGeom>
-        </p:spPr>
-      </p:pic>
-      <p:pic>
-        <p:nvPicPr>
-          <p:cNvPr id="10" name="Graphic 9">
-            <a:extLst>
-              <a:ext uri="{FF2B5EF4-FFF2-40B4-BE49-F238E27FC236}">
-                <a16:creationId xmlns:a16="http://schemas.microsoft.com/office/drawing/2014/main" id="{ABFE6B6C-9C2D-F94B-9E0C-0344734EF802}"/>
-              </a:ext>
-            </a:extLst>
-          </p:cNvPr>
-          <p:cNvPicPr>
-            <a:picLocks noChangeAspect="1"/>
-          </p:cNvPicPr>
+          <a:noFill/>
+        </p:spPr>
+        <p:txBody>
+          <a:bodyPr wrap="none" rtlCol="0">
+            <a:spAutoFit/>
+          </a:bodyPr>
+          <a:lstStyle/>
+          <a:p>
+            <a:pPr algn="ctr"/>
+            <a:r>
+              <a:rPr lang="fr-FR" sz="1400" dirty="0">
+                <a:solidFill>
+                  <a:schemeClr val="accent1">
+                    <a:lumMod val="75000"/>
+                  </a:schemeClr>
+                </a:solidFill>
+              </a:rPr>
+              <a:t>Modal</a:t>
+            </a:r>
+          </a:p>
+        </p:txBody>
+      </p:sp>
+      <p:sp>
+        <p:nvSpPr>
+          <p:cNvPr id="11" name="TextBox 10">
+            <a:extLst>
+              <a:ext uri="{FF2B5EF4-FFF2-40B4-BE49-F238E27FC236}">
+                <a16:creationId xmlns:a16="http://schemas.microsoft.com/office/drawing/2014/main" id="{B6118184-9F69-F846-A15C-AC247B5BE93A}"/>
+              </a:ext>
+            </a:extLst>
+          </p:cNvPr>
+          <p:cNvSpPr txBox="1"/>
           <p:nvPr/>
-        </p:nvPicPr>
-        <p:blipFill>
-          <a:blip r:embed="rId14">
-            <a:extLst>
-              <a:ext uri="{96DAC541-7B7A-43D3-8B79-37D633B846F1}">
-                <asvg:svgBlip xmlns:asvg="http://schemas.microsoft.com/office/drawing/2016/SVG/main" r:embed="rId15"/>
-              </a:ext>
-            </a:extLst>
-          </a:blip>
-          <a:stretch>
-            <a:fillRect/>
-          </a:stretch>
-        </p:blipFill>
-        <p:spPr>
-          <a:xfrm>
-            <a:off x="7270692" y="450000"/>
-            <a:ext cx="1905000" cy="1905000"/>
+        </p:nvSpPr>
+        <p:spPr>
+          <a:xfrm>
+            <a:off x="5744151" y="2488179"/>
+            <a:ext cx="575799" cy="307777"/>
           </a:xfrm>
           <a:prstGeom prst="rect">
             <a:avLst/>
           </a:prstGeom>
-        </p:spPr>
-      </p:pic>
-      <p:pic>
-        <p:nvPicPr>
-          <p:cNvPr id="11" name="Graphic 10">
-            <a:extLst>
-              <a:ext uri="{FF2B5EF4-FFF2-40B4-BE49-F238E27FC236}">
-                <a16:creationId xmlns:a16="http://schemas.microsoft.com/office/drawing/2014/main" id="{B339A4AF-BD5B-C642-BB39-EA92186C2911}"/>
-              </a:ext>
-            </a:extLst>
-          </p:cNvPr>
-          <p:cNvPicPr>
-            <a:picLocks noChangeAspect="1"/>
-          </p:cNvPicPr>
+          <a:noFill/>
+        </p:spPr>
+        <p:txBody>
+          <a:bodyPr wrap="none" rtlCol="0">
+            <a:spAutoFit/>
+          </a:bodyPr>
+          <a:lstStyle/>
+          <a:p>
+            <a:pPr algn="ctr"/>
+            <a:r>
+              <a:rPr lang="fr-FR" sz="1400" dirty="0">
+                <a:solidFill>
+                  <a:schemeClr val="accent1">
+                    <a:lumMod val="75000"/>
+                  </a:schemeClr>
+                </a:solidFill>
+              </a:rPr>
+              <a:t>Login</a:t>
+            </a:r>
+          </a:p>
+        </p:txBody>
+      </p:sp>
+      <p:sp>
+        <p:nvSpPr>
+          <p:cNvPr id="12" name="TextBox 11">
+            <a:extLst>
+              <a:ext uri="{FF2B5EF4-FFF2-40B4-BE49-F238E27FC236}">
+                <a16:creationId xmlns:a16="http://schemas.microsoft.com/office/drawing/2014/main" id="{6E6A8B6F-9B8F-9D4D-8E5A-F684C5106E7D}"/>
+              </a:ext>
+            </a:extLst>
+          </p:cNvPr>
+          <p:cNvSpPr txBox="1"/>
           <p:nvPr/>
-        </p:nvPicPr>
-        <p:blipFill>
-          <a:blip r:embed="rId16">
-            <a:extLst>
-              <a:ext uri="{96DAC541-7B7A-43D3-8B79-37D633B846F1}">
-                <asvg:svgBlip xmlns:asvg="http://schemas.microsoft.com/office/drawing/2016/SVG/main" r:embed="rId17"/>
-              </a:ext>
-            </a:extLst>
-          </a:blip>
-          <a:stretch>
-            <a:fillRect/>
-          </a:stretch>
-        </p:blipFill>
-        <p:spPr>
-          <a:xfrm>
-            <a:off x="5232328" y="2481842"/>
-            <a:ext cx="1905000" cy="1905000"/>
+        </p:nvSpPr>
+        <p:spPr>
+          <a:xfrm>
+            <a:off x="7749447" y="2488179"/>
+            <a:ext cx="563745" cy="307777"/>
           </a:xfrm>
           <a:prstGeom prst="rect">
             <a:avLst/>
           </a:prstGeom>
-        </p:spPr>
-      </p:pic>
-      <p:pic>
-        <p:nvPicPr>
-          <p:cNvPr id="12" name="Graphic 11">
-            <a:extLst>
-              <a:ext uri="{FF2B5EF4-FFF2-40B4-BE49-F238E27FC236}">
-                <a16:creationId xmlns:a16="http://schemas.microsoft.com/office/drawing/2014/main" id="{B8F1A618-10CE-0E40-ABD6-15B1718E2487}"/>
-              </a:ext>
-            </a:extLst>
-          </p:cNvPr>
-          <p:cNvPicPr>
-            <a:picLocks noChangeAspect="1"/>
-          </p:cNvPicPr>
-          <p:nvPr/>
-        </p:nvPicPr>
-        <p:blipFill>
-          <a:blip r:embed="rId18">
-            <a:extLst>
-              <a:ext uri="{96DAC541-7B7A-43D3-8B79-37D633B846F1}">
-                <asvg:svgBlip xmlns:asvg="http://schemas.microsoft.com/office/drawing/2016/SVG/main" r:embed="rId19"/>
-              </a:ext>
-            </a:extLst>
-          </a:blip>
-          <a:stretch>
-            <a:fillRect/>
-          </a:stretch>
-        </p:blipFill>
-        <p:spPr>
-          <a:xfrm>
-            <a:off x="1155600" y="450000"/>
-            <a:ext cx="1905000" cy="1905000"/>
-          </a:xfrm>
-          <a:prstGeom prst="rect">
-            <a:avLst/>
-          </a:prstGeom>
-        </p:spPr>
-      </p:pic>
+          <a:noFill/>
+        </p:spPr>
+        <p:txBody>
+          <a:bodyPr wrap="none" rtlCol="0">
+            <a:spAutoFit/>
+          </a:bodyPr>
+          <a:lstStyle/>
+          <a:p>
+            <a:pPr algn="ctr"/>
+            <a:r>
+              <a:rPr lang="fr-FR" sz="1400" dirty="0" err="1">
+                <a:solidFill>
+                  <a:schemeClr val="accent1">
+                    <a:lumMod val="75000"/>
+                  </a:schemeClr>
+                </a:solidFill>
+              </a:rPr>
+              <a:t>Form</a:t>
+            </a:r>
+            <a:endParaRPr lang="fr-FR" sz="1400" dirty="0">
+              <a:solidFill>
+                <a:schemeClr val="accent1">
+                  <a:lumMod val="75000"/>
+                </a:schemeClr>
+              </a:solidFill>
+            </a:endParaRPr>
+          </a:p>
+        </p:txBody>
+      </p:sp>
     </p:spTree>
     <p:extLst>
       <p:ext uri="{BB962C8B-B14F-4D97-AF65-F5344CB8AC3E}">
-        <p14:creationId xmlns:p14="http://schemas.microsoft.com/office/powerpoint/2010/main" val="1367573051"/>
+        <p14:creationId xmlns:p14="http://schemas.microsoft.com/office/powerpoint/2010/main" val="2055295497"/>
       </p:ext>
     </p:extLst>
   </p:cSld>
@@ -4543,4 +6108,299 @@
     </a:ext>
   </a:extLst>
 </a:theme>
+</file>
+
+<file path=ppt/theme/theme2.xml><?xml version="1.0" encoding="utf-8"?>
+<a:theme xmlns:a="http://schemas.openxmlformats.org/drawingml/2006/main" name="Office Theme">
+  <a:themeElements>
+    <a:clrScheme name="Office">
+      <a:dk1>
+        <a:sysClr val="windowText" lastClr="000000"/>
+      </a:dk1>
+      <a:lt1>
+        <a:sysClr val="window" lastClr="FFFFFF"/>
+      </a:lt1>
+      <a:dk2>
+        <a:srgbClr val="44546A"/>
+      </a:dk2>
+      <a:lt2>
+        <a:srgbClr val="E7E6E6"/>
+      </a:lt2>
+      <a:accent1>
+        <a:srgbClr val="4472C4"/>
+      </a:accent1>
+      <a:accent2>
+        <a:srgbClr val="ED7D31"/>
+      </a:accent2>
+      <a:accent3>
+        <a:srgbClr val="A5A5A5"/>
+      </a:accent3>
+      <a:accent4>
+        <a:srgbClr val="FFC000"/>
+      </a:accent4>
+      <a:accent5>
+        <a:srgbClr val="5B9BD5"/>
+      </a:accent5>
+      <a:accent6>
+        <a:srgbClr val="70AD47"/>
+      </a:accent6>
+      <a:hlink>
+        <a:srgbClr val="0563C1"/>
+      </a:hlink>
+      <a:folHlink>
+        <a:srgbClr val="954F72"/>
+      </a:folHlink>
+    </a:clrScheme>
+    <a:fontScheme name="Office">
+      <a:majorFont>
+        <a:latin typeface="Calibri Light" panose="020F0302020204030204"/>
+        <a:ea typeface=""/>
+        <a:cs typeface=""/>
+        <a:font script="Jpan" typeface="游ゴシック Light"/>
+        <a:font script="Hang" typeface="맑은 고딕"/>
+        <a:font script="Hans" typeface="等线 Light"/>
+        <a:font script="Hant" typeface="新細明體"/>
+        <a:font script="Arab" typeface="Times New Roman"/>
+        <a:font script="Hebr" typeface="Times New Roman"/>
+        <a:font script="Thai" typeface="Angsana New"/>
+        <a:font script="Ethi" typeface="Nyala"/>
+        <a:font script="Beng" typeface="Vrinda"/>
+        <a:font script="Gujr" typeface="Shruti"/>
+        <a:font script="Khmr" typeface="MoolBoran"/>
+        <a:font script="Knda" typeface="Tunga"/>
+        <a:font script="Guru" typeface="Raavi"/>
+        <a:font script="Cans" typeface="Euphemia"/>
+        <a:font script="Cher" typeface="Plantagenet Cherokee"/>
+        <a:font script="Yiii" typeface="Microsoft Yi Baiti"/>
+        <a:font script="Tibt" typeface="Microsoft Himalaya"/>
+        <a:font script="Thaa" typeface="MV Boli"/>
+        <a:font script="Deva" typeface="Mangal"/>
+        <a:font script="Telu" typeface="Gautami"/>
+        <a:font script="Taml" typeface="Latha"/>
+        <a:font script="Syrc" typeface="Estrangelo Edessa"/>
+        <a:font script="Orya" typeface="Kalinga"/>
+        <a:font script="Mlym" typeface="Kartika"/>
+        <a:font script="Laoo" typeface="DokChampa"/>
+        <a:font script="Sinh" typeface="Iskoola Pota"/>
+        <a:font script="Mong" typeface="Mongolian Baiti"/>
+        <a:font script="Viet" typeface="Times New Roman"/>
+        <a:font script="Uigh" typeface="Microsoft Uighur"/>
+        <a:font script="Geor" typeface="Sylfaen"/>
+        <a:font script="Armn" typeface="Arial"/>
+        <a:font script="Bugi" typeface="Leelawadee UI"/>
+        <a:font script="Bopo" typeface="Microsoft JhengHei"/>
+        <a:font script="Java" typeface="Javanese Text"/>
+        <a:font script="Lisu" typeface="Segoe UI"/>
+        <a:font script="Mymr" typeface="Myanmar Text"/>
+        <a:font script="Nkoo" typeface="Ebrima"/>
+        <a:font script="Olck" typeface="Nirmala UI"/>
+        <a:font script="Osma" typeface="Ebrima"/>
+        <a:font script="Phag" typeface="Phagspa"/>
+        <a:font script="Syrn" typeface="Estrangelo Edessa"/>
+        <a:font script="Syrj" typeface="Estrangelo Edessa"/>
+        <a:font script="Syre" typeface="Estrangelo Edessa"/>
+        <a:font script="Sora" typeface="Nirmala UI"/>
+        <a:font script="Tale" typeface="Microsoft Tai Le"/>
+        <a:font script="Talu" typeface="Microsoft New Tai Lue"/>
+        <a:font script="Tfng" typeface="Ebrima"/>
+      </a:majorFont>
+      <a:minorFont>
+        <a:latin typeface="Calibri" panose="020F0502020204030204"/>
+        <a:ea typeface=""/>
+        <a:cs typeface=""/>
+        <a:font script="Jpan" typeface="游ゴシック"/>
+        <a:font script="Hang" typeface="맑은 고딕"/>
+        <a:font script="Hans" typeface="等线"/>
+        <a:font script="Hant" typeface="新細明體"/>
+        <a:font script="Arab" typeface="Arial"/>
+        <a:font script="Hebr" typeface="Arial"/>
+        <a:font script="Thai" typeface="Cordia New"/>
+        <a:font script="Ethi" typeface="Nyala"/>
+        <a:font script="Beng" typeface="Vrinda"/>
+        <a:font script="Gujr" typeface="Shruti"/>
+        <a:font script="Khmr" typeface="DaunPenh"/>
+        <a:font script="Knda" typeface="Tunga"/>
+        <a:font script="Guru" typeface="Raavi"/>
+        <a:font script="Cans" typeface="Euphemia"/>
+        <a:font script="Cher" typeface="Plantagenet Cherokee"/>
+        <a:font script="Yiii" typeface="Microsoft Yi Baiti"/>
+        <a:font script="Tibt" typeface="Microsoft Himalaya"/>
+        <a:font script="Thaa" typeface="MV Boli"/>
+        <a:font script="Deva" typeface="Mangal"/>
+        <a:font script="Telu" typeface="Gautami"/>
+        <a:font script="Taml" typeface="Latha"/>
+        <a:font script="Syrc" typeface="Estrangelo Edessa"/>
+        <a:font script="Orya" typeface="Kalinga"/>
+        <a:font script="Mlym" typeface="Kartika"/>
+        <a:font script="Laoo" typeface="DokChampa"/>
+        <a:font script="Sinh" typeface="Iskoola Pota"/>
+        <a:font script="Mong" typeface="Mongolian Baiti"/>
+        <a:font script="Viet" typeface="Arial"/>
+        <a:font script="Uigh" typeface="Microsoft Uighur"/>
+        <a:font script="Geor" typeface="Sylfaen"/>
+        <a:font script="Armn" typeface="Arial"/>
+        <a:font script="Bugi" typeface="Leelawadee UI"/>
+        <a:font script="Bopo" typeface="Microsoft JhengHei"/>
+        <a:font script="Java" typeface="Javanese Text"/>
+        <a:font script="Lisu" typeface="Segoe UI"/>
+        <a:font script="Mymr" typeface="Myanmar Text"/>
+        <a:font script="Nkoo" typeface="Ebrima"/>
+        <a:font script="Olck" typeface="Nirmala UI"/>
+        <a:font script="Osma" typeface="Ebrima"/>
+        <a:font script="Phag" typeface="Phagspa"/>
+        <a:font script="Syrn" typeface="Estrangelo Edessa"/>
+        <a:font script="Syrj" typeface="Estrangelo Edessa"/>
+        <a:font script="Syre" typeface="Estrangelo Edessa"/>
+        <a:font script="Sora" typeface="Nirmala UI"/>
+        <a:font script="Tale" typeface="Microsoft Tai Le"/>
+        <a:font script="Talu" typeface="Microsoft New Tai Lue"/>
+        <a:font script="Tfng" typeface="Ebrima"/>
+      </a:minorFont>
+    </a:fontScheme>
+    <a:fmtScheme name="Office">
+      <a:fillStyleLst>
+        <a:solidFill>
+          <a:schemeClr val="phClr"/>
+        </a:solidFill>
+        <a:gradFill rotWithShape="1">
+          <a:gsLst>
+            <a:gs pos="0">
+              <a:schemeClr val="phClr">
+                <a:lumMod val="110000"/>
+                <a:satMod val="105000"/>
+                <a:tint val="67000"/>
+              </a:schemeClr>
+            </a:gs>
+            <a:gs pos="50000">
+              <a:schemeClr val="phClr">
+                <a:lumMod val="105000"/>
+                <a:satMod val="103000"/>
+                <a:tint val="73000"/>
+              </a:schemeClr>
+            </a:gs>
+            <a:gs pos="100000">
+              <a:schemeClr val="phClr">
+                <a:lumMod val="105000"/>
+                <a:satMod val="109000"/>
+                <a:tint val="81000"/>
+              </a:schemeClr>
+            </a:gs>
+          </a:gsLst>
+          <a:lin ang="5400000" scaled="0"/>
+        </a:gradFill>
+        <a:gradFill rotWithShape="1">
+          <a:gsLst>
+            <a:gs pos="0">
+              <a:schemeClr val="phClr">
+                <a:satMod val="103000"/>
+                <a:lumMod val="102000"/>
+                <a:tint val="94000"/>
+              </a:schemeClr>
+            </a:gs>
+            <a:gs pos="50000">
+              <a:schemeClr val="phClr">
+                <a:satMod val="110000"/>
+                <a:lumMod val="100000"/>
+                <a:shade val="100000"/>
+              </a:schemeClr>
+            </a:gs>
+            <a:gs pos="100000">
+              <a:schemeClr val="phClr">
+                <a:lumMod val="99000"/>
+                <a:satMod val="120000"/>
+                <a:shade val="78000"/>
+              </a:schemeClr>
+            </a:gs>
+          </a:gsLst>
+          <a:lin ang="5400000" scaled="0"/>
+        </a:gradFill>
+      </a:fillStyleLst>
+      <a:lnStyleLst>
+        <a:ln w="6350" cap="flat" cmpd="sng" algn="ctr">
+          <a:solidFill>
+            <a:schemeClr val="phClr"/>
+          </a:solidFill>
+          <a:prstDash val="solid"/>
+          <a:miter lim="800000"/>
+        </a:ln>
+        <a:ln w="12700" cap="flat" cmpd="sng" algn="ctr">
+          <a:solidFill>
+            <a:schemeClr val="phClr"/>
+          </a:solidFill>
+          <a:prstDash val="solid"/>
+          <a:miter lim="800000"/>
+        </a:ln>
+        <a:ln w="19050" cap="flat" cmpd="sng" algn="ctr">
+          <a:solidFill>
+            <a:schemeClr val="phClr"/>
+          </a:solidFill>
+          <a:prstDash val="solid"/>
+          <a:miter lim="800000"/>
+        </a:ln>
+      </a:lnStyleLst>
+      <a:effectStyleLst>
+        <a:effectStyle>
+          <a:effectLst/>
+        </a:effectStyle>
+        <a:effectStyle>
+          <a:effectLst/>
+        </a:effectStyle>
+        <a:effectStyle>
+          <a:effectLst>
+            <a:outerShdw blurRad="57150" dist="19050" dir="5400000" algn="ctr" rotWithShape="0">
+              <a:srgbClr val="000000">
+                <a:alpha val="63000"/>
+              </a:srgbClr>
+            </a:outerShdw>
+          </a:effectLst>
+        </a:effectStyle>
+      </a:effectStyleLst>
+      <a:bgFillStyleLst>
+        <a:solidFill>
+          <a:schemeClr val="phClr"/>
+        </a:solidFill>
+        <a:solidFill>
+          <a:schemeClr val="phClr">
+            <a:tint val="95000"/>
+            <a:satMod val="170000"/>
+          </a:schemeClr>
+        </a:solidFill>
+        <a:gradFill rotWithShape="1">
+          <a:gsLst>
+            <a:gs pos="0">
+              <a:schemeClr val="phClr">
+                <a:tint val="93000"/>
+                <a:satMod val="150000"/>
+                <a:shade val="98000"/>
+                <a:lumMod val="102000"/>
+              </a:schemeClr>
+            </a:gs>
+            <a:gs pos="50000">
+              <a:schemeClr val="phClr">
+                <a:tint val="98000"/>
+                <a:satMod val="130000"/>
+                <a:shade val="90000"/>
+                <a:lumMod val="103000"/>
+              </a:schemeClr>
+            </a:gs>
+            <a:gs pos="100000">
+              <a:schemeClr val="phClr">
+                <a:shade val="63000"/>
+                <a:satMod val="120000"/>
+              </a:schemeClr>
+            </a:gs>
+          </a:gsLst>
+          <a:lin ang="5400000" scaled="0"/>
+        </a:gradFill>
+      </a:bgFillStyleLst>
+    </a:fmtScheme>
+  </a:themeElements>
+  <a:objectDefaults/>
+  <a:extraClrSchemeLst/>
+  <a:extLst>
+    <a:ext uri="{05A4C25C-085E-4340-85A3-A5531E510DB2}">
+      <thm15:themeFamily xmlns:thm15="http://schemas.microsoft.com/office/thememl/2012/main" name="Office Theme" id="{62F939B6-93AF-4DB8-9C6B-D6C7DFDC589F}" vid="{4A3C46E8-61CC-4603-A589-7422A47A8E4A}"/>
+    </a:ext>
+  </a:extLst>
+</a:theme>
 </file>
</xml_diff>

<commit_message>
feat(user-flows): improve sketch file, add pptx flow examples
</commit_message>
<xml_diff>
--- a/01 - Plan & Ideate/03 - User Flow/user_flows.pptx
+++ b/01 - Plan & Ideate/03 - User Flow/user_flows.pptx
@@ -5,12 +5,13 @@
     <p:sldMasterId id="2147483648" r:id="rId1"/>
   </p:sldMasterIdLst>
   <p:notesMasterIdLst>
-    <p:notesMasterId r:id="rId5"/>
+    <p:notesMasterId r:id="rId6"/>
   </p:notesMasterIdLst>
   <p:sldIdLst>
-    <p:sldId id="256" r:id="rId2"/>
-    <p:sldId id="257" r:id="rId3"/>
-    <p:sldId id="258" r:id="rId4"/>
+    <p:sldId id="260" r:id="rId2"/>
+    <p:sldId id="259" r:id="rId3"/>
+    <p:sldId id="256" r:id="rId4"/>
+    <p:sldId id="257" r:id="rId5"/>
   </p:sldIdLst>
   <p:sldSz cx="12192000" cy="6858000"/>
   <p:notesSz cx="6858000" cy="9144000"/>
@@ -199,7 +200,7 @@
           <a:p>
             <a:fld id="{5EADFFCF-004F-A44E-8FA0-367663537F64}" type="datetimeFigureOut">
               <a:rPr lang="fr-FR" smtClean="0"/>
-              <a:t>17/04/2020</a:t>
+              <a:t>22/04/2020</a:t>
             </a:fld>
             <a:endParaRPr lang="fr-FR"/>
           </a:p>
@@ -532,7 +533,91 @@
           <a:p>
             <a:fld id="{0F19A71E-30D6-E84B-B90F-7209948FA413}" type="slidenum">
               <a:rPr lang="fr-FR" smtClean="0"/>
-              <a:t>2</a:t>
+              <a:t>3</a:t>
+            </a:fld>
+            <a:endParaRPr lang="fr-FR"/>
+          </a:p>
+        </p:txBody>
+      </p:sp>
+    </p:spTree>
+    <p:extLst>
+      <p:ext uri="{BB962C8B-B14F-4D97-AF65-F5344CB8AC3E}">
+        <p14:creationId xmlns:p14="http://schemas.microsoft.com/office/powerpoint/2010/main" val="1766170164"/>
+      </p:ext>
+    </p:extLst>
+  </p:cSld>
+  <p:clrMapOvr>
+    <a:masterClrMapping/>
+  </p:clrMapOvr>
+</p:notes>
+</file>
+
+<file path=ppt/notesSlides/notesSlide2.xml><?xml version="1.0" encoding="utf-8"?>
+<p:notes xmlns:a="http://schemas.openxmlformats.org/drawingml/2006/main" xmlns:r="http://schemas.openxmlformats.org/officeDocument/2006/relationships" xmlns:p="http://schemas.openxmlformats.org/presentationml/2006/main">
+  <p:cSld>
+    <p:spTree>
+      <p:nvGrpSpPr>
+        <p:cNvPr id="1" name=""/>
+        <p:cNvGrpSpPr/>
+        <p:nvPr/>
+      </p:nvGrpSpPr>
+      <p:grpSpPr>
+        <a:xfrm>
+          <a:off x="0" y="0"/>
+          <a:ext cx="0" cy="0"/>
+          <a:chOff x="0" y="0"/>
+          <a:chExt cx="0" cy="0"/>
+        </a:xfrm>
+      </p:grpSpPr>
+      <p:sp>
+        <p:nvSpPr>
+          <p:cNvPr id="2" name="Slide Image Placeholder 1"/>
+          <p:cNvSpPr>
+            <a:spLocks noGrp="1" noRot="1" noChangeAspect="1"/>
+          </p:cNvSpPr>
+          <p:nvPr>
+            <p:ph type="sldImg"/>
+          </p:nvPr>
+        </p:nvSpPr>
+        <p:spPr/>
+      </p:sp>
+      <p:sp>
+        <p:nvSpPr>
+          <p:cNvPr id="3" name="Notes Placeholder 2"/>
+          <p:cNvSpPr>
+            <a:spLocks noGrp="1"/>
+          </p:cNvSpPr>
+          <p:nvPr>
+            <p:ph type="body" idx="1"/>
+          </p:nvPr>
+        </p:nvSpPr>
+        <p:spPr/>
+        <p:txBody>
+          <a:bodyPr/>
+          <a:lstStyle/>
+          <a:p>
+            <a:endParaRPr lang="fr-FR" dirty="0"/>
+          </a:p>
+        </p:txBody>
+      </p:sp>
+      <p:sp>
+        <p:nvSpPr>
+          <p:cNvPr id="4" name="Slide Number Placeholder 3"/>
+          <p:cNvSpPr>
+            <a:spLocks noGrp="1"/>
+          </p:cNvSpPr>
+          <p:nvPr>
+            <p:ph type="sldNum" sz="quarter" idx="5"/>
+          </p:nvPr>
+        </p:nvSpPr>
+        <p:spPr/>
+        <p:txBody>
+          <a:bodyPr/>
+          <a:lstStyle/>
+          <a:p>
+            <a:fld id="{0F19A71E-30D6-E84B-B90F-7209948FA413}" type="slidenum">
+              <a:rPr lang="fr-FR" smtClean="0"/>
+              <a:t>4</a:t>
             </a:fld>
             <a:endParaRPr lang="fr-FR"/>
           </a:p>
@@ -700,7 +785,7 @@
           <a:p>
             <a:fld id="{4CFC7556-B619-E244-8485-B97F9347A4CD}" type="datetimeFigureOut">
               <a:rPr lang="fr-FR" smtClean="0"/>
-              <a:t>17/04/2020</a:t>
+              <a:t>22/04/2020</a:t>
             </a:fld>
             <a:endParaRPr lang="fr-FR"/>
           </a:p>
@@ -900,7 +985,7 @@
           <a:p>
             <a:fld id="{4CFC7556-B619-E244-8485-B97F9347A4CD}" type="datetimeFigureOut">
               <a:rPr lang="fr-FR" smtClean="0"/>
-              <a:t>17/04/2020</a:t>
+              <a:t>22/04/2020</a:t>
             </a:fld>
             <a:endParaRPr lang="fr-FR"/>
           </a:p>
@@ -1110,7 +1195,7 @@
           <a:p>
             <a:fld id="{4CFC7556-B619-E244-8485-B97F9347A4CD}" type="datetimeFigureOut">
               <a:rPr lang="fr-FR" smtClean="0"/>
-              <a:t>17/04/2020</a:t>
+              <a:t>22/04/2020</a:t>
             </a:fld>
             <a:endParaRPr lang="fr-FR"/>
           </a:p>
@@ -1310,7 +1395,7 @@
           <a:p>
             <a:fld id="{4CFC7556-B619-E244-8485-B97F9347A4CD}" type="datetimeFigureOut">
               <a:rPr lang="fr-FR" smtClean="0"/>
-              <a:t>17/04/2020</a:t>
+              <a:t>22/04/2020</a:t>
             </a:fld>
             <a:endParaRPr lang="fr-FR"/>
           </a:p>
@@ -1586,7 +1671,7 @@
           <a:p>
             <a:fld id="{4CFC7556-B619-E244-8485-B97F9347A4CD}" type="datetimeFigureOut">
               <a:rPr lang="fr-FR" smtClean="0"/>
-              <a:t>17/04/2020</a:t>
+              <a:t>22/04/2020</a:t>
             </a:fld>
             <a:endParaRPr lang="fr-FR"/>
           </a:p>
@@ -1854,7 +1939,7 @@
           <a:p>
             <a:fld id="{4CFC7556-B619-E244-8485-B97F9347A4CD}" type="datetimeFigureOut">
               <a:rPr lang="fr-FR" smtClean="0"/>
-              <a:t>17/04/2020</a:t>
+              <a:t>22/04/2020</a:t>
             </a:fld>
             <a:endParaRPr lang="fr-FR"/>
           </a:p>
@@ -2269,7 +2354,7 @@
           <a:p>
             <a:fld id="{4CFC7556-B619-E244-8485-B97F9347A4CD}" type="datetimeFigureOut">
               <a:rPr lang="fr-FR" smtClean="0"/>
-              <a:t>17/04/2020</a:t>
+              <a:t>22/04/2020</a:t>
             </a:fld>
             <a:endParaRPr lang="fr-FR"/>
           </a:p>
@@ -2411,7 +2496,7 @@
           <a:p>
             <a:fld id="{4CFC7556-B619-E244-8485-B97F9347A4CD}" type="datetimeFigureOut">
               <a:rPr lang="fr-FR" smtClean="0"/>
-              <a:t>17/04/2020</a:t>
+              <a:t>22/04/2020</a:t>
             </a:fld>
             <a:endParaRPr lang="fr-FR"/>
           </a:p>
@@ -2524,7 +2609,7 @@
           <a:p>
             <a:fld id="{4CFC7556-B619-E244-8485-B97F9347A4CD}" type="datetimeFigureOut">
               <a:rPr lang="fr-FR" smtClean="0"/>
-              <a:t>17/04/2020</a:t>
+              <a:t>22/04/2020</a:t>
             </a:fld>
             <a:endParaRPr lang="fr-FR"/>
           </a:p>
@@ -2837,7 +2922,7 @@
           <a:p>
             <a:fld id="{4CFC7556-B619-E244-8485-B97F9347A4CD}" type="datetimeFigureOut">
               <a:rPr lang="fr-FR" smtClean="0"/>
-              <a:t>17/04/2020</a:t>
+              <a:t>22/04/2020</a:t>
             </a:fld>
             <a:endParaRPr lang="fr-FR"/>
           </a:p>
@@ -3126,7 +3211,7 @@
           <a:p>
             <a:fld id="{4CFC7556-B619-E244-8485-B97F9347A4CD}" type="datetimeFigureOut">
               <a:rPr lang="fr-FR" smtClean="0"/>
-              <a:t>17/04/2020</a:t>
+              <a:t>22/04/2020</a:t>
             </a:fld>
             <a:endParaRPr lang="fr-FR"/>
           </a:p>
@@ -3369,7 +3454,7 @@
           <a:p>
             <a:fld id="{4CFC7556-B619-E244-8485-B97F9347A4CD}" type="datetimeFigureOut">
               <a:rPr lang="fr-FR" smtClean="0"/>
-              <a:t>17/04/2020</a:t>
+              <a:t>22/04/2020</a:t>
             </a:fld>
             <a:endParaRPr lang="fr-FR"/>
           </a:p>
@@ -3786,12 +3871,324 @@
           <a:chExt cx="0" cy="0"/>
         </a:xfrm>
       </p:grpSpPr>
+      <p:cxnSp>
+        <p:nvCxnSpPr>
+          <p:cNvPr id="9" name="Straight Arrow Connector 8">
+            <a:extLst>
+              <a:ext uri="{FF2B5EF4-FFF2-40B4-BE49-F238E27FC236}">
+                <a16:creationId xmlns:a16="http://schemas.microsoft.com/office/drawing/2014/main" id="{B11C0ACC-2C32-3444-8CB6-948A8B7302D1}"/>
+              </a:ext>
+            </a:extLst>
+          </p:cNvPr>
+          <p:cNvCxnSpPr>
+            <a:cxnSpLocks/>
+          </p:cNvCxnSpPr>
+          <p:nvPr/>
+        </p:nvCxnSpPr>
+        <p:spPr>
+          <a:xfrm>
+            <a:off x="3243823" y="3240976"/>
+            <a:ext cx="580643" cy="0"/>
+          </a:xfrm>
+          <a:prstGeom prst="straightConnector1">
+            <a:avLst/>
+          </a:prstGeom>
+          <a:ln>
+            <a:tailEnd type="triangle"/>
+          </a:ln>
+        </p:spPr>
+        <p:style>
+          <a:lnRef idx="1">
+            <a:schemeClr val="accent1"/>
+          </a:lnRef>
+          <a:fillRef idx="0">
+            <a:schemeClr val="accent1"/>
+          </a:fillRef>
+          <a:effectRef idx="0">
+            <a:schemeClr val="accent1"/>
+          </a:effectRef>
+          <a:fontRef idx="minor">
+            <a:schemeClr val="tx1"/>
+          </a:fontRef>
+        </p:style>
+      </p:cxnSp>
+      <p:cxnSp>
+        <p:nvCxnSpPr>
+          <p:cNvPr id="11" name="Straight Arrow Connector 10">
+            <a:extLst>
+              <a:ext uri="{FF2B5EF4-FFF2-40B4-BE49-F238E27FC236}">
+                <a16:creationId xmlns:a16="http://schemas.microsoft.com/office/drawing/2014/main" id="{76E05711-5EE0-EA4A-A249-1E5CF45DB502}"/>
+              </a:ext>
+            </a:extLst>
+          </p:cNvPr>
+          <p:cNvCxnSpPr>
+            <a:cxnSpLocks/>
+          </p:cNvCxnSpPr>
+          <p:nvPr/>
+        </p:nvCxnSpPr>
+        <p:spPr>
+          <a:xfrm>
+            <a:off x="5729466" y="3240976"/>
+            <a:ext cx="580643" cy="0"/>
+          </a:xfrm>
+          <a:prstGeom prst="straightConnector1">
+            <a:avLst/>
+          </a:prstGeom>
+          <a:ln>
+            <a:tailEnd type="triangle"/>
+          </a:ln>
+        </p:spPr>
+        <p:style>
+          <a:lnRef idx="1">
+            <a:schemeClr val="accent1"/>
+          </a:lnRef>
+          <a:fillRef idx="0">
+            <a:schemeClr val="accent1"/>
+          </a:fillRef>
+          <a:effectRef idx="0">
+            <a:schemeClr val="accent1"/>
+          </a:effectRef>
+          <a:fontRef idx="minor">
+            <a:schemeClr val="tx1"/>
+          </a:fontRef>
+        </p:style>
+      </p:cxnSp>
+      <p:cxnSp>
+        <p:nvCxnSpPr>
+          <p:cNvPr id="13" name="Straight Arrow Connector 12">
+            <a:extLst>
+              <a:ext uri="{FF2B5EF4-FFF2-40B4-BE49-F238E27FC236}">
+                <a16:creationId xmlns:a16="http://schemas.microsoft.com/office/drawing/2014/main" id="{266D0019-F0EB-404A-A80C-2E4C55441CB5}"/>
+              </a:ext>
+            </a:extLst>
+          </p:cNvPr>
+          <p:cNvCxnSpPr>
+            <a:cxnSpLocks/>
+          </p:cNvCxnSpPr>
+          <p:nvPr/>
+        </p:nvCxnSpPr>
+        <p:spPr>
+          <a:xfrm>
+            <a:off x="8215109" y="3240976"/>
+            <a:ext cx="580643" cy="0"/>
+          </a:xfrm>
+          <a:prstGeom prst="straightConnector1">
+            <a:avLst/>
+          </a:prstGeom>
+          <a:ln>
+            <a:tailEnd type="triangle"/>
+          </a:ln>
+        </p:spPr>
+        <p:style>
+          <a:lnRef idx="1">
+            <a:schemeClr val="accent1"/>
+          </a:lnRef>
+          <a:fillRef idx="0">
+            <a:schemeClr val="accent1"/>
+          </a:fillRef>
+          <a:effectRef idx="0">
+            <a:schemeClr val="accent1"/>
+          </a:effectRef>
+          <a:fontRef idx="minor">
+            <a:schemeClr val="tx1"/>
+          </a:fontRef>
+        </p:style>
+      </p:cxnSp>
+      <p:sp>
+        <p:nvSpPr>
+          <p:cNvPr id="14" name="TextBox 13">
+            <a:extLst>
+              <a:ext uri="{FF2B5EF4-FFF2-40B4-BE49-F238E27FC236}">
+                <a16:creationId xmlns:a16="http://schemas.microsoft.com/office/drawing/2014/main" id="{F2819A1B-7467-5841-9C26-F0EEDEB8EEDF}"/>
+              </a:ext>
+            </a:extLst>
+          </p:cNvPr>
+          <p:cNvSpPr txBox="1"/>
+          <p:nvPr/>
+        </p:nvSpPr>
+        <p:spPr>
+          <a:xfrm>
+            <a:off x="1746206" y="4239656"/>
+            <a:ext cx="1090235" cy="338554"/>
+          </a:xfrm>
+          <a:prstGeom prst="rect">
+            <a:avLst/>
+          </a:prstGeom>
+          <a:noFill/>
+        </p:spPr>
+        <p:txBody>
+          <a:bodyPr wrap="none" rtlCol="0">
+            <a:spAutoFit/>
+          </a:bodyPr>
+          <a:lstStyle/>
+          <a:p>
+            <a:pPr algn="ctr"/>
+            <a:r>
+              <a:rPr lang="fr-FR" sz="1600" dirty="0" err="1">
+                <a:solidFill>
+                  <a:schemeClr val="accent1"/>
+                </a:solidFill>
+              </a:rPr>
+              <a:t>Homepage</a:t>
+            </a:r>
+            <a:endParaRPr lang="fr-FR" sz="1600" dirty="0">
+              <a:solidFill>
+                <a:schemeClr val="accent1"/>
+              </a:solidFill>
+            </a:endParaRPr>
+          </a:p>
+        </p:txBody>
+      </p:sp>
+      <p:sp>
+        <p:nvSpPr>
+          <p:cNvPr id="16" name="TextBox 15">
+            <a:extLst>
+              <a:ext uri="{FF2B5EF4-FFF2-40B4-BE49-F238E27FC236}">
+                <a16:creationId xmlns:a16="http://schemas.microsoft.com/office/drawing/2014/main" id="{231A56A0-1940-C44C-9DA7-E288337F321D}"/>
+              </a:ext>
+            </a:extLst>
+          </p:cNvPr>
+          <p:cNvSpPr txBox="1"/>
+          <p:nvPr/>
+        </p:nvSpPr>
+        <p:spPr>
+          <a:xfrm>
+            <a:off x="4058311" y="4239656"/>
+            <a:ext cx="1437317" cy="338554"/>
+          </a:xfrm>
+          <a:prstGeom prst="rect">
+            <a:avLst/>
+          </a:prstGeom>
+          <a:noFill/>
+        </p:spPr>
+        <p:txBody>
+          <a:bodyPr wrap="none" rtlCol="0">
+            <a:spAutoFit/>
+          </a:bodyPr>
+          <a:lstStyle/>
+          <a:p>
+            <a:pPr algn="ctr"/>
+            <a:r>
+              <a:rPr lang="fr-FR" sz="1600" dirty="0" err="1">
+                <a:solidFill>
+                  <a:schemeClr val="accent1"/>
+                </a:solidFill>
+              </a:rPr>
+              <a:t>Search</a:t>
+            </a:r>
+            <a:r>
+              <a:rPr lang="fr-FR" sz="1600" dirty="0">
+                <a:solidFill>
+                  <a:schemeClr val="accent1"/>
+                </a:solidFill>
+              </a:rPr>
+              <a:t> for user</a:t>
+            </a:r>
+          </a:p>
+        </p:txBody>
+      </p:sp>
+      <p:sp>
+        <p:nvSpPr>
+          <p:cNvPr id="17" name="TextBox 16">
+            <a:extLst>
+              <a:ext uri="{FF2B5EF4-FFF2-40B4-BE49-F238E27FC236}">
+                <a16:creationId xmlns:a16="http://schemas.microsoft.com/office/drawing/2014/main" id="{343D9BD0-E0ED-E04E-B0EF-5D30985B190E}"/>
+              </a:ext>
+            </a:extLst>
+          </p:cNvPr>
+          <p:cNvSpPr txBox="1"/>
+          <p:nvPr/>
+        </p:nvSpPr>
+        <p:spPr>
+          <a:xfrm>
+            <a:off x="6565335" y="4239656"/>
+            <a:ext cx="1402820" cy="338554"/>
+          </a:xfrm>
+          <a:prstGeom prst="rect">
+            <a:avLst/>
+          </a:prstGeom>
+          <a:noFill/>
+        </p:spPr>
+        <p:txBody>
+          <a:bodyPr wrap="none" rtlCol="0">
+            <a:spAutoFit/>
+          </a:bodyPr>
+          <a:lstStyle/>
+          <a:p>
+            <a:pPr algn="ctr"/>
+            <a:r>
+              <a:rPr lang="fr-FR" sz="1600" dirty="0" err="1">
+                <a:solidFill>
+                  <a:schemeClr val="accent1"/>
+                </a:solidFill>
+              </a:rPr>
+              <a:t>Consult</a:t>
+            </a:r>
+            <a:r>
+              <a:rPr lang="fr-FR" sz="1600" dirty="0">
+                <a:solidFill>
+                  <a:schemeClr val="accent1"/>
+                </a:solidFill>
+              </a:rPr>
+              <a:t> profile</a:t>
+            </a:r>
+          </a:p>
+        </p:txBody>
+      </p:sp>
+      <p:sp>
+        <p:nvSpPr>
+          <p:cNvPr id="18" name="TextBox 17">
+            <a:extLst>
+              <a:ext uri="{FF2B5EF4-FFF2-40B4-BE49-F238E27FC236}">
+                <a16:creationId xmlns:a16="http://schemas.microsoft.com/office/drawing/2014/main" id="{7AB3072A-3685-3F48-8410-37FFC152CBF6}"/>
+              </a:ext>
+            </a:extLst>
+          </p:cNvPr>
+          <p:cNvSpPr txBox="1"/>
+          <p:nvPr/>
+        </p:nvSpPr>
+        <p:spPr>
+          <a:xfrm>
+            <a:off x="8805853" y="4239656"/>
+            <a:ext cx="1884811" cy="338554"/>
+          </a:xfrm>
+          <a:prstGeom prst="rect">
+            <a:avLst/>
+          </a:prstGeom>
+          <a:noFill/>
+        </p:spPr>
+        <p:txBody>
+          <a:bodyPr wrap="none" rtlCol="0">
+            <a:spAutoFit/>
+          </a:bodyPr>
+          <a:lstStyle/>
+          <a:p>
+            <a:pPr algn="ctr"/>
+            <a:r>
+              <a:rPr lang="fr-FR" sz="1600" dirty="0" err="1">
+                <a:solidFill>
+                  <a:schemeClr val="accent1"/>
+                </a:solidFill>
+              </a:rPr>
+              <a:t>Initiate</a:t>
+            </a:r>
+            <a:r>
+              <a:rPr lang="fr-FR" sz="1600" dirty="0">
+                <a:solidFill>
+                  <a:schemeClr val="accent1"/>
+                </a:solidFill>
+              </a:rPr>
+              <a:t> conversation</a:t>
+            </a:r>
+          </a:p>
+        </p:txBody>
+      </p:sp>
       <p:pic>
         <p:nvPicPr>
-          <p:cNvPr id="7" name="Graphic 6">
-            <a:extLst>
-              <a:ext uri="{FF2B5EF4-FFF2-40B4-BE49-F238E27FC236}">
-                <a16:creationId xmlns:a16="http://schemas.microsoft.com/office/drawing/2014/main" id="{FE2FD9F5-36E0-3442-9E89-A78DD06FC368}"/>
+          <p:cNvPr id="15" name="Graphic 14">
+            <a:extLst>
+              <a:ext uri="{FF2B5EF4-FFF2-40B4-BE49-F238E27FC236}">
+                <a16:creationId xmlns:a16="http://schemas.microsoft.com/office/drawing/2014/main" id="{2559009F-478E-1F46-8173-0BDEC613486B}"/>
               </a:ext>
             </a:extLst>
           </p:cNvPr>
@@ -3814,7 +4211,7 @@
         </p:blipFill>
         <p:spPr>
           <a:xfrm>
-            <a:off x="5154502" y="3610745"/>
+            <a:off x="1338822" y="2288476"/>
             <a:ext cx="1905000" cy="1905000"/>
           </a:xfrm>
           <a:prstGeom prst="rect">
@@ -3824,10 +4221,10 @@
       </p:pic>
       <p:pic>
         <p:nvPicPr>
-          <p:cNvPr id="27" name="Graphic 26">
-            <a:extLst>
-              <a:ext uri="{FF2B5EF4-FFF2-40B4-BE49-F238E27FC236}">
-                <a16:creationId xmlns:a16="http://schemas.microsoft.com/office/drawing/2014/main" id="{50319191-C023-6D4D-A9BC-0AA674C3DDD0}"/>
+          <p:cNvPr id="19" name="Graphic 18">
+            <a:extLst>
+              <a:ext uri="{FF2B5EF4-FFF2-40B4-BE49-F238E27FC236}">
+                <a16:creationId xmlns:a16="http://schemas.microsoft.com/office/drawing/2014/main" id="{1C0F630A-D294-134C-831C-07D347A758E4}"/>
               </a:ext>
             </a:extLst>
           </p:cNvPr>
@@ -3850,7 +4247,7 @@
         </p:blipFill>
         <p:spPr>
           <a:xfrm>
-            <a:off x="7153772" y="3610745"/>
+            <a:off x="3821680" y="2288476"/>
             <a:ext cx="1905000" cy="1905000"/>
           </a:xfrm>
           <a:prstGeom prst="rect">
@@ -3860,10 +4257,10 @@
       </p:pic>
       <p:pic>
         <p:nvPicPr>
-          <p:cNvPr id="33" name="Graphic 32">
-            <a:extLst>
-              <a:ext uri="{FF2B5EF4-FFF2-40B4-BE49-F238E27FC236}">
-                <a16:creationId xmlns:a16="http://schemas.microsoft.com/office/drawing/2014/main" id="{56CDF75E-E85C-994A-B9D8-8C4748C2F5BE}"/>
+          <p:cNvPr id="20" name="Graphic 19">
+            <a:extLst>
+              <a:ext uri="{FF2B5EF4-FFF2-40B4-BE49-F238E27FC236}">
+                <a16:creationId xmlns:a16="http://schemas.microsoft.com/office/drawing/2014/main" id="{D4691CDC-F729-4F46-891A-48317E73A4D6}"/>
               </a:ext>
             </a:extLst>
           </p:cNvPr>
@@ -3886,7 +4283,7 @@
         </p:blipFill>
         <p:spPr>
           <a:xfrm>
-            <a:off x="9153042" y="3610745"/>
+            <a:off x="6304537" y="2288476"/>
             <a:ext cx="1905000" cy="1905000"/>
           </a:xfrm>
           <a:prstGeom prst="rect">
@@ -3896,10 +4293,10 @@
       </p:pic>
       <p:pic>
         <p:nvPicPr>
-          <p:cNvPr id="41" name="Graphic 40">
-            <a:extLst>
-              <a:ext uri="{FF2B5EF4-FFF2-40B4-BE49-F238E27FC236}">
-                <a16:creationId xmlns:a16="http://schemas.microsoft.com/office/drawing/2014/main" id="{878B9608-D4C2-4447-B7E6-E79410D996D7}"/>
+          <p:cNvPr id="22" name="Graphic 21">
+            <a:extLst>
+              <a:ext uri="{FF2B5EF4-FFF2-40B4-BE49-F238E27FC236}">
+                <a16:creationId xmlns:a16="http://schemas.microsoft.com/office/drawing/2014/main" id="{29CB9674-D1E7-9A40-BD2A-D6CF566D189C}"/>
               </a:ext>
             </a:extLst>
           </p:cNvPr>
@@ -3922,7 +4319,7 @@
         </p:blipFill>
         <p:spPr>
           <a:xfrm>
-            <a:off x="3155232" y="3610745"/>
+            <a:off x="8784608" y="2288476"/>
             <a:ext cx="1905000" cy="1905000"/>
           </a:xfrm>
           <a:prstGeom prst="rect">
@@ -3930,688 +4327,10 @@
           </a:prstGeom>
         </p:spPr>
       </p:pic>
-      <p:pic>
-        <p:nvPicPr>
-          <p:cNvPr id="43" name="Graphic 42">
-            <a:extLst>
-              <a:ext uri="{FF2B5EF4-FFF2-40B4-BE49-F238E27FC236}">
-                <a16:creationId xmlns:a16="http://schemas.microsoft.com/office/drawing/2014/main" id="{EAD52623-D84A-5445-BB1E-54A6C97148DA}"/>
-              </a:ext>
-            </a:extLst>
-          </p:cNvPr>
-          <p:cNvPicPr>
-            <a:picLocks noChangeAspect="1"/>
-          </p:cNvPicPr>
-          <p:nvPr/>
-        </p:nvPicPr>
-        <p:blipFill>
-          <a:blip r:embed="rId10">
-            <a:extLst>
-              <a:ext uri="{96DAC541-7B7A-43D3-8B79-37D633B846F1}">
-                <asvg:svgBlip xmlns:asvg="http://schemas.microsoft.com/office/drawing/2016/SVG/main" r:embed="rId11"/>
-              </a:ext>
-            </a:extLst>
-          </a:blip>
-          <a:stretch>
-            <a:fillRect/>
-          </a:stretch>
-        </p:blipFill>
-        <p:spPr>
-          <a:xfrm>
-            <a:off x="1155962" y="3610745"/>
-            <a:ext cx="1905000" cy="1905000"/>
-          </a:xfrm>
-          <a:prstGeom prst="rect">
-            <a:avLst/>
-          </a:prstGeom>
-        </p:spPr>
-      </p:pic>
-      <p:pic>
-        <p:nvPicPr>
-          <p:cNvPr id="45" name="Graphic 44">
-            <a:extLst>
-              <a:ext uri="{FF2B5EF4-FFF2-40B4-BE49-F238E27FC236}">
-                <a16:creationId xmlns:a16="http://schemas.microsoft.com/office/drawing/2014/main" id="{DAB0D812-0848-1242-8FF9-7E04123C5B11}"/>
-              </a:ext>
-            </a:extLst>
-          </p:cNvPr>
-          <p:cNvPicPr>
-            <a:picLocks noChangeAspect="1"/>
-          </p:cNvPicPr>
-          <p:nvPr/>
-        </p:nvPicPr>
-        <p:blipFill>
-          <a:blip r:embed="rId12">
-            <a:extLst>
-              <a:ext uri="{96DAC541-7B7A-43D3-8B79-37D633B846F1}">
-                <asvg:svgBlip xmlns:asvg="http://schemas.microsoft.com/office/drawing/2016/SVG/main" r:embed="rId13"/>
-              </a:ext>
-            </a:extLst>
-          </a:blip>
-          <a:stretch>
-            <a:fillRect/>
-          </a:stretch>
-        </p:blipFill>
-        <p:spPr>
-          <a:xfrm>
-            <a:off x="9153042" y="449737"/>
-            <a:ext cx="1905000" cy="1905000"/>
-          </a:xfrm>
-          <a:prstGeom prst="rect">
-            <a:avLst/>
-          </a:prstGeom>
-        </p:spPr>
-      </p:pic>
-      <p:pic>
-        <p:nvPicPr>
-          <p:cNvPr id="47" name="Graphic 46">
-            <a:extLst>
-              <a:ext uri="{FF2B5EF4-FFF2-40B4-BE49-F238E27FC236}">
-                <a16:creationId xmlns:a16="http://schemas.microsoft.com/office/drawing/2014/main" id="{F606A3FC-DAE8-1743-8E79-1D8D8630F28C}"/>
-              </a:ext>
-            </a:extLst>
-          </p:cNvPr>
-          <p:cNvPicPr>
-            <a:picLocks noChangeAspect="1"/>
-          </p:cNvPicPr>
-          <p:nvPr/>
-        </p:nvPicPr>
-        <p:blipFill>
-          <a:blip r:embed="rId14">
-            <a:extLst>
-              <a:ext uri="{96DAC541-7B7A-43D3-8B79-37D633B846F1}">
-                <asvg:svgBlip xmlns:asvg="http://schemas.microsoft.com/office/drawing/2016/SVG/main" r:embed="rId15"/>
-              </a:ext>
-            </a:extLst>
-          </a:blip>
-          <a:stretch>
-            <a:fillRect/>
-          </a:stretch>
-        </p:blipFill>
-        <p:spPr>
-          <a:xfrm>
-            <a:off x="7153772" y="449737"/>
-            <a:ext cx="1905000" cy="1905000"/>
-          </a:xfrm>
-          <a:prstGeom prst="rect">
-            <a:avLst/>
-          </a:prstGeom>
-        </p:spPr>
-      </p:pic>
-      <p:pic>
-        <p:nvPicPr>
-          <p:cNvPr id="49" name="Graphic 48">
-            <a:extLst>
-              <a:ext uri="{FF2B5EF4-FFF2-40B4-BE49-F238E27FC236}">
-                <a16:creationId xmlns:a16="http://schemas.microsoft.com/office/drawing/2014/main" id="{38ED027B-0571-EB48-8C3B-74BA23660773}"/>
-              </a:ext>
-            </a:extLst>
-          </p:cNvPr>
-          <p:cNvPicPr>
-            <a:picLocks noChangeAspect="1"/>
-          </p:cNvPicPr>
-          <p:nvPr/>
-        </p:nvPicPr>
-        <p:blipFill>
-          <a:blip r:embed="rId16">
-            <a:extLst>
-              <a:ext uri="{96DAC541-7B7A-43D3-8B79-37D633B846F1}">
-                <asvg:svgBlip xmlns:asvg="http://schemas.microsoft.com/office/drawing/2016/SVG/main" r:embed="rId17"/>
-              </a:ext>
-            </a:extLst>
-          </a:blip>
-          <a:stretch>
-            <a:fillRect/>
-          </a:stretch>
-        </p:blipFill>
-        <p:spPr>
-          <a:xfrm>
-            <a:off x="5154502" y="449737"/>
-            <a:ext cx="1905000" cy="1905000"/>
-          </a:xfrm>
-          <a:prstGeom prst="rect">
-            <a:avLst/>
-          </a:prstGeom>
-        </p:spPr>
-      </p:pic>
-      <p:pic>
-        <p:nvPicPr>
-          <p:cNvPr id="51" name="Graphic 50">
-            <a:extLst>
-              <a:ext uri="{FF2B5EF4-FFF2-40B4-BE49-F238E27FC236}">
-                <a16:creationId xmlns:a16="http://schemas.microsoft.com/office/drawing/2014/main" id="{36DFB4E1-0BBE-DE4A-9AC6-84953953F3E7}"/>
-              </a:ext>
-            </a:extLst>
-          </p:cNvPr>
-          <p:cNvPicPr>
-            <a:picLocks noChangeAspect="1"/>
-          </p:cNvPicPr>
-          <p:nvPr/>
-        </p:nvPicPr>
-        <p:blipFill>
-          <a:blip r:embed="rId18">
-            <a:extLst>
-              <a:ext uri="{96DAC541-7B7A-43D3-8B79-37D633B846F1}">
-                <asvg:svgBlip xmlns:asvg="http://schemas.microsoft.com/office/drawing/2016/SVG/main" r:embed="rId19"/>
-              </a:ext>
-            </a:extLst>
-          </a:blip>
-          <a:stretch>
-            <a:fillRect/>
-          </a:stretch>
-        </p:blipFill>
-        <p:spPr>
-          <a:xfrm>
-            <a:off x="3155232" y="449737"/>
-            <a:ext cx="1905000" cy="1905000"/>
-          </a:xfrm>
-          <a:prstGeom prst="rect">
-            <a:avLst/>
-          </a:prstGeom>
-        </p:spPr>
-      </p:pic>
-      <p:pic>
-        <p:nvPicPr>
-          <p:cNvPr id="53" name="Graphic 52">
-            <a:extLst>
-              <a:ext uri="{FF2B5EF4-FFF2-40B4-BE49-F238E27FC236}">
-                <a16:creationId xmlns:a16="http://schemas.microsoft.com/office/drawing/2014/main" id="{46BF6328-2656-5142-A396-5582B33D0E95}"/>
-              </a:ext>
-            </a:extLst>
-          </p:cNvPr>
-          <p:cNvPicPr>
-            <a:picLocks noChangeAspect="1"/>
-          </p:cNvPicPr>
-          <p:nvPr/>
-        </p:nvPicPr>
-        <p:blipFill>
-          <a:blip r:embed="rId20">
-            <a:extLst>
-              <a:ext uri="{96DAC541-7B7A-43D3-8B79-37D633B846F1}">
-                <asvg:svgBlip xmlns:asvg="http://schemas.microsoft.com/office/drawing/2016/SVG/main" r:embed="rId21"/>
-              </a:ext>
-            </a:extLst>
-          </a:blip>
-          <a:stretch>
-            <a:fillRect/>
-          </a:stretch>
-        </p:blipFill>
-        <p:spPr>
-          <a:xfrm>
-            <a:off x="1155962" y="449737"/>
-            <a:ext cx="1905000" cy="1905000"/>
-          </a:xfrm>
-          <a:prstGeom prst="rect">
-            <a:avLst/>
-          </a:prstGeom>
-        </p:spPr>
-      </p:pic>
-      <p:sp>
-        <p:nvSpPr>
-          <p:cNvPr id="2" name="TextBox 1">
-            <a:extLst>
-              <a:ext uri="{FF2B5EF4-FFF2-40B4-BE49-F238E27FC236}">
-                <a16:creationId xmlns:a16="http://schemas.microsoft.com/office/drawing/2014/main" id="{847C9791-388F-1F45-ABF9-9EB0C5E56426}"/>
-              </a:ext>
-            </a:extLst>
-          </p:cNvPr>
-          <p:cNvSpPr txBox="1"/>
-          <p:nvPr/>
-        </p:nvSpPr>
-        <p:spPr>
-          <a:xfrm>
-            <a:off x="1752435" y="2469891"/>
-            <a:ext cx="712054" cy="307777"/>
-          </a:xfrm>
-          <a:prstGeom prst="rect">
-            <a:avLst/>
-          </a:prstGeom>
-          <a:noFill/>
-        </p:spPr>
-        <p:txBody>
-          <a:bodyPr wrap="none" rtlCol="0">
-            <a:spAutoFit/>
-          </a:bodyPr>
-          <a:lstStyle/>
-          <a:p>
-            <a:pPr algn="ctr"/>
-            <a:r>
-              <a:rPr lang="fr-FR" sz="1400" dirty="0" err="1">
-                <a:solidFill>
-                  <a:schemeClr val="accent1">
-                    <a:lumMod val="75000"/>
-                  </a:schemeClr>
-                </a:solidFill>
-              </a:rPr>
-              <a:t>Upload</a:t>
-            </a:r>
-            <a:endParaRPr lang="fr-FR" sz="1400" dirty="0">
-              <a:solidFill>
-                <a:schemeClr val="accent1">
-                  <a:lumMod val="75000"/>
-                </a:schemeClr>
-              </a:solidFill>
-            </a:endParaRPr>
-          </a:p>
-        </p:txBody>
-      </p:sp>
-      <p:sp>
-        <p:nvSpPr>
-          <p:cNvPr id="18" name="TextBox 17">
-            <a:extLst>
-              <a:ext uri="{FF2B5EF4-FFF2-40B4-BE49-F238E27FC236}">
-                <a16:creationId xmlns:a16="http://schemas.microsoft.com/office/drawing/2014/main" id="{AFA6ED96-7C77-6944-BD61-0A015A75A796}"/>
-              </a:ext>
-            </a:extLst>
-          </p:cNvPr>
-          <p:cNvSpPr txBox="1"/>
-          <p:nvPr/>
-        </p:nvSpPr>
-        <p:spPr>
-          <a:xfrm>
-            <a:off x="3865775" y="2471494"/>
-            <a:ext cx="483915" cy="307777"/>
-          </a:xfrm>
-          <a:prstGeom prst="rect">
-            <a:avLst/>
-          </a:prstGeom>
-          <a:noFill/>
-        </p:spPr>
-        <p:txBody>
-          <a:bodyPr wrap="none" rtlCol="0">
-            <a:spAutoFit/>
-          </a:bodyPr>
-          <a:lstStyle/>
-          <a:p>
-            <a:pPr algn="ctr"/>
-            <a:r>
-              <a:rPr lang="fr-FR" sz="1400" dirty="0" err="1">
-                <a:solidFill>
-                  <a:schemeClr val="accent1">
-                    <a:lumMod val="75000"/>
-                  </a:schemeClr>
-                </a:solidFill>
-              </a:rPr>
-              <a:t>Text</a:t>
-            </a:r>
-            <a:endParaRPr lang="fr-FR" sz="1400" dirty="0">
-              <a:solidFill>
-                <a:schemeClr val="accent1">
-                  <a:lumMod val="75000"/>
-                </a:schemeClr>
-              </a:solidFill>
-            </a:endParaRPr>
-          </a:p>
-        </p:txBody>
-      </p:sp>
-      <p:sp>
-        <p:nvSpPr>
-          <p:cNvPr id="19" name="TextBox 18">
-            <a:extLst>
-              <a:ext uri="{FF2B5EF4-FFF2-40B4-BE49-F238E27FC236}">
-                <a16:creationId xmlns:a16="http://schemas.microsoft.com/office/drawing/2014/main" id="{9A5CBC23-13BD-A944-9992-105A8BB7884F}"/>
-              </a:ext>
-            </a:extLst>
-          </p:cNvPr>
-          <p:cNvSpPr txBox="1"/>
-          <p:nvPr/>
-        </p:nvSpPr>
-        <p:spPr>
-          <a:xfrm>
-            <a:off x="5705003" y="2469891"/>
-            <a:ext cx="575863" cy="307777"/>
-          </a:xfrm>
-          <a:prstGeom prst="rect">
-            <a:avLst/>
-          </a:prstGeom>
-          <a:noFill/>
-        </p:spPr>
-        <p:txBody>
-          <a:bodyPr wrap="none" rtlCol="0">
-            <a:spAutoFit/>
-          </a:bodyPr>
-          <a:lstStyle/>
-          <a:p>
-            <a:pPr algn="ctr"/>
-            <a:r>
-              <a:rPr lang="fr-FR" sz="1400" dirty="0">
-                <a:solidFill>
-                  <a:schemeClr val="accent1">
-                    <a:lumMod val="75000"/>
-                  </a:schemeClr>
-                </a:solidFill>
-              </a:rPr>
-              <a:t>Team</a:t>
-            </a:r>
-          </a:p>
-        </p:txBody>
-      </p:sp>
-      <p:sp>
-        <p:nvSpPr>
-          <p:cNvPr id="20" name="TextBox 19">
-            <a:extLst>
-              <a:ext uri="{FF2B5EF4-FFF2-40B4-BE49-F238E27FC236}">
-                <a16:creationId xmlns:a16="http://schemas.microsoft.com/office/drawing/2014/main" id="{473599F4-04C2-B54B-9BC1-18901CF52D1C}"/>
-              </a:ext>
-            </a:extLst>
-          </p:cNvPr>
-          <p:cNvSpPr txBox="1"/>
-          <p:nvPr/>
-        </p:nvSpPr>
-        <p:spPr>
-          <a:xfrm>
-            <a:off x="7735017" y="2471494"/>
-            <a:ext cx="742511" cy="307777"/>
-          </a:xfrm>
-          <a:prstGeom prst="rect">
-            <a:avLst/>
-          </a:prstGeom>
-          <a:noFill/>
-        </p:spPr>
-        <p:txBody>
-          <a:bodyPr wrap="none" rtlCol="0">
-            <a:spAutoFit/>
-          </a:bodyPr>
-          <a:lstStyle/>
-          <a:p>
-            <a:pPr algn="ctr"/>
-            <a:r>
-              <a:rPr lang="fr-FR" sz="1400" dirty="0" err="1">
-                <a:solidFill>
-                  <a:schemeClr val="accent1">
-                    <a:lumMod val="75000"/>
-                  </a:schemeClr>
-                </a:solidFill>
-              </a:rPr>
-              <a:t>Success</a:t>
-            </a:r>
-            <a:endParaRPr lang="fr-FR" sz="1400" dirty="0">
-              <a:solidFill>
-                <a:schemeClr val="accent1">
-                  <a:lumMod val="75000"/>
-                </a:schemeClr>
-              </a:solidFill>
-            </a:endParaRPr>
-          </a:p>
-        </p:txBody>
-      </p:sp>
-      <p:sp>
-        <p:nvSpPr>
-          <p:cNvPr id="21" name="TextBox 20">
-            <a:extLst>
-              <a:ext uri="{FF2B5EF4-FFF2-40B4-BE49-F238E27FC236}">
-                <a16:creationId xmlns:a16="http://schemas.microsoft.com/office/drawing/2014/main" id="{3247FE19-71D8-A048-A585-84D39B8E5FDA}"/>
-              </a:ext>
-            </a:extLst>
-          </p:cNvPr>
-          <p:cNvSpPr txBox="1"/>
-          <p:nvPr/>
-        </p:nvSpPr>
-        <p:spPr>
-          <a:xfrm>
-            <a:off x="9715210" y="2469890"/>
-            <a:ext cx="780663" cy="307777"/>
-          </a:xfrm>
-          <a:prstGeom prst="rect">
-            <a:avLst/>
-          </a:prstGeom>
-          <a:noFill/>
-        </p:spPr>
-        <p:txBody>
-          <a:bodyPr wrap="none" rtlCol="0">
-            <a:spAutoFit/>
-          </a:bodyPr>
-          <a:lstStyle/>
-          <a:p>
-            <a:pPr algn="ctr"/>
-            <a:r>
-              <a:rPr lang="fr-FR" sz="1400" dirty="0" err="1">
-                <a:solidFill>
-                  <a:schemeClr val="accent1">
-                    <a:lumMod val="75000"/>
-                  </a:schemeClr>
-                </a:solidFill>
-              </a:rPr>
-              <a:t>Sitemap</a:t>
-            </a:r>
-            <a:endParaRPr lang="fr-FR" sz="1400" dirty="0">
-              <a:solidFill>
-                <a:schemeClr val="accent1">
-                  <a:lumMod val="75000"/>
-                </a:schemeClr>
-              </a:solidFill>
-            </a:endParaRPr>
-          </a:p>
-        </p:txBody>
-      </p:sp>
-      <p:sp>
-        <p:nvSpPr>
-          <p:cNvPr id="22" name="TextBox 21">
-            <a:extLst>
-              <a:ext uri="{FF2B5EF4-FFF2-40B4-BE49-F238E27FC236}">
-                <a16:creationId xmlns:a16="http://schemas.microsoft.com/office/drawing/2014/main" id="{A9D8941A-9524-1B48-9476-F71D352ABE73}"/>
-              </a:ext>
-            </a:extLst>
-          </p:cNvPr>
-          <p:cNvSpPr txBox="1"/>
-          <p:nvPr/>
-        </p:nvSpPr>
-        <p:spPr>
-          <a:xfrm>
-            <a:off x="1718131" y="5627819"/>
-            <a:ext cx="780663" cy="307777"/>
-          </a:xfrm>
-          <a:prstGeom prst="rect">
-            <a:avLst/>
-          </a:prstGeom>
-          <a:noFill/>
-        </p:spPr>
-        <p:txBody>
-          <a:bodyPr wrap="none" rtlCol="0">
-            <a:spAutoFit/>
-          </a:bodyPr>
-          <a:lstStyle/>
-          <a:p>
-            <a:pPr algn="ctr"/>
-            <a:r>
-              <a:rPr lang="fr-FR" sz="1400" dirty="0" err="1">
-                <a:solidFill>
-                  <a:schemeClr val="accent1">
-                    <a:lumMod val="75000"/>
-                  </a:schemeClr>
-                </a:solidFill>
-              </a:rPr>
-              <a:t>Sitemap</a:t>
-            </a:r>
-            <a:endParaRPr lang="fr-FR" sz="1400" dirty="0">
-              <a:solidFill>
-                <a:schemeClr val="accent1">
-                  <a:lumMod val="75000"/>
-                </a:schemeClr>
-              </a:solidFill>
-            </a:endParaRPr>
-          </a:p>
-        </p:txBody>
-      </p:sp>
-      <p:sp>
-        <p:nvSpPr>
-          <p:cNvPr id="23" name="TextBox 22">
-            <a:extLst>
-              <a:ext uri="{FF2B5EF4-FFF2-40B4-BE49-F238E27FC236}">
-                <a16:creationId xmlns:a16="http://schemas.microsoft.com/office/drawing/2014/main" id="{F0571261-A8D9-024E-B2FE-B569420B9292}"/>
-              </a:ext>
-            </a:extLst>
-          </p:cNvPr>
-          <p:cNvSpPr txBox="1"/>
-          <p:nvPr/>
-        </p:nvSpPr>
-        <p:spPr>
-          <a:xfrm>
-            <a:off x="3777994" y="5627818"/>
-            <a:ext cx="659476" cy="307777"/>
-          </a:xfrm>
-          <a:prstGeom prst="rect">
-            <a:avLst/>
-          </a:prstGeom>
-          <a:noFill/>
-        </p:spPr>
-        <p:txBody>
-          <a:bodyPr wrap="none" rtlCol="0">
-            <a:spAutoFit/>
-          </a:bodyPr>
-          <a:lstStyle/>
-          <a:p>
-            <a:pPr algn="ctr"/>
-            <a:r>
-              <a:rPr lang="fr-FR" sz="1400" dirty="0">
-                <a:solidFill>
-                  <a:schemeClr val="accent1">
-                    <a:lumMod val="75000"/>
-                  </a:schemeClr>
-                </a:solidFill>
-              </a:rPr>
-              <a:t>Profile</a:t>
-            </a:r>
-          </a:p>
-        </p:txBody>
-      </p:sp>
-      <p:sp>
-        <p:nvSpPr>
-          <p:cNvPr id="24" name="TextBox 23">
-            <a:extLst>
-              <a:ext uri="{FF2B5EF4-FFF2-40B4-BE49-F238E27FC236}">
-                <a16:creationId xmlns:a16="http://schemas.microsoft.com/office/drawing/2014/main" id="{BA4BA2BC-1EBC-454C-B67D-BD1426FF511B}"/>
-              </a:ext>
-            </a:extLst>
-          </p:cNvPr>
-          <p:cNvSpPr txBox="1"/>
-          <p:nvPr/>
-        </p:nvSpPr>
-        <p:spPr>
-          <a:xfrm>
-            <a:off x="5787169" y="5622821"/>
-            <a:ext cx="633508" cy="307777"/>
-          </a:xfrm>
-          <a:prstGeom prst="rect">
-            <a:avLst/>
-          </a:prstGeom>
-          <a:noFill/>
-        </p:spPr>
-        <p:txBody>
-          <a:bodyPr wrap="none" rtlCol="0">
-            <a:spAutoFit/>
-          </a:bodyPr>
-          <a:lstStyle/>
-          <a:p>
-            <a:pPr algn="ctr"/>
-            <a:r>
-              <a:rPr lang="fr-FR" sz="1400" dirty="0">
-                <a:solidFill>
-                  <a:schemeClr val="accent1">
-                    <a:lumMod val="75000"/>
-                  </a:schemeClr>
-                </a:solidFill>
-              </a:rPr>
-              <a:t>About</a:t>
-            </a:r>
-          </a:p>
-        </p:txBody>
-      </p:sp>
-      <p:sp>
-        <p:nvSpPr>
-          <p:cNvPr id="25" name="TextBox 24">
-            <a:extLst>
-              <a:ext uri="{FF2B5EF4-FFF2-40B4-BE49-F238E27FC236}">
-                <a16:creationId xmlns:a16="http://schemas.microsoft.com/office/drawing/2014/main" id="{CB28DD11-67C9-344D-8280-C5DAED40E36E}"/>
-              </a:ext>
-            </a:extLst>
-          </p:cNvPr>
-          <p:cNvSpPr txBox="1"/>
-          <p:nvPr/>
-        </p:nvSpPr>
-        <p:spPr>
-          <a:xfrm>
-            <a:off x="7825747" y="5622820"/>
-            <a:ext cx="561051" cy="307777"/>
-          </a:xfrm>
-          <a:prstGeom prst="rect">
-            <a:avLst/>
-          </a:prstGeom>
-          <a:noFill/>
-        </p:spPr>
-        <p:txBody>
-          <a:bodyPr wrap="none" rtlCol="0">
-            <a:spAutoFit/>
-          </a:bodyPr>
-          <a:lstStyle/>
-          <a:p>
-            <a:pPr algn="ctr"/>
-            <a:r>
-              <a:rPr lang="fr-FR" sz="1400" dirty="0" err="1">
-                <a:solidFill>
-                  <a:schemeClr val="accent1">
-                    <a:lumMod val="75000"/>
-                  </a:schemeClr>
-                </a:solidFill>
-              </a:rPr>
-              <a:t>Filter</a:t>
-            </a:r>
-            <a:endParaRPr lang="fr-FR" sz="1400" dirty="0">
-              <a:solidFill>
-                <a:schemeClr val="accent1">
-                  <a:lumMod val="75000"/>
-                </a:schemeClr>
-              </a:solidFill>
-            </a:endParaRPr>
-          </a:p>
-        </p:txBody>
-      </p:sp>
-      <p:sp>
-        <p:nvSpPr>
-          <p:cNvPr id="26" name="TextBox 25">
-            <a:extLst>
-              <a:ext uri="{FF2B5EF4-FFF2-40B4-BE49-F238E27FC236}">
-                <a16:creationId xmlns:a16="http://schemas.microsoft.com/office/drawing/2014/main" id="{630BC3D6-E713-E942-99DE-437E7D0B54F0}"/>
-              </a:ext>
-            </a:extLst>
-          </p:cNvPr>
-          <p:cNvSpPr txBox="1"/>
-          <p:nvPr/>
-        </p:nvSpPr>
-        <p:spPr>
-          <a:xfrm>
-            <a:off x="9657455" y="5635810"/>
-            <a:ext cx="906017" cy="307777"/>
-          </a:xfrm>
-          <a:prstGeom prst="rect">
-            <a:avLst/>
-          </a:prstGeom>
-          <a:noFill/>
-        </p:spPr>
-        <p:txBody>
-          <a:bodyPr wrap="none" rtlCol="0">
-            <a:spAutoFit/>
-          </a:bodyPr>
-          <a:lstStyle/>
-          <a:p>
-            <a:pPr algn="ctr"/>
-            <a:r>
-              <a:rPr lang="fr-FR" sz="1400" dirty="0">
-                <a:solidFill>
-                  <a:schemeClr val="accent1">
-                    <a:lumMod val="75000"/>
-                  </a:schemeClr>
-                </a:solidFill>
-              </a:rPr>
-              <a:t>Line chart</a:t>
-            </a:r>
-          </a:p>
-        </p:txBody>
-      </p:sp>
     </p:spTree>
     <p:extLst>
       <p:ext uri="{BB962C8B-B14F-4D97-AF65-F5344CB8AC3E}">
-        <p14:creationId xmlns:p14="http://schemas.microsoft.com/office/powerpoint/2010/main" val="545793087"/>
+        <p14:creationId xmlns:p14="http://schemas.microsoft.com/office/powerpoint/2010/main" val="1408053291"/>
       </p:ext>
     </p:extLst>
   </p:cSld>
@@ -4643,7 +4362,7 @@
           <p:cNvPr id="4" name="Graphic 3">
             <a:extLst>
               <a:ext uri="{FF2B5EF4-FFF2-40B4-BE49-F238E27FC236}">
-                <a16:creationId xmlns:a16="http://schemas.microsoft.com/office/drawing/2014/main" id="{4C84D24E-BF6A-1041-B796-3857A1549D8B}"/>
+                <a16:creationId xmlns:a16="http://schemas.microsoft.com/office/drawing/2014/main" id="{A5D604A4-04F7-D54F-9857-F30EDB4700BB}"/>
               </a:ext>
             </a:extLst>
           </p:cNvPr>
@@ -4653,10 +4372,10 @@
           <p:nvPr/>
         </p:nvPicPr>
         <p:blipFill>
-          <a:blip r:embed="rId3">
+          <a:blip r:embed="rId2">
             <a:extLst>
               <a:ext uri="{96DAC541-7B7A-43D3-8B79-37D633B846F1}">
-                <asvg:svgBlip xmlns:asvg="http://schemas.microsoft.com/office/drawing/2016/SVG/main" r:embed="rId4"/>
+                <asvg:svgBlip xmlns:asvg="http://schemas.microsoft.com/office/drawing/2016/SVG/main" r:embed="rId3"/>
               </a:ext>
             </a:extLst>
           </a:blip>
@@ -4666,8 +4385,8 @@
         </p:blipFill>
         <p:spPr>
           <a:xfrm>
-            <a:off x="1155600" y="3628589"/>
-            <a:ext cx="1905000" cy="1905000"/>
+            <a:off x="1403477" y="2346035"/>
+            <a:ext cx="1468749" cy="1468749"/>
           </a:xfrm>
           <a:prstGeom prst="rect">
             <a:avLst/>
@@ -4679,7 +4398,7 @@
           <p:cNvPr id="5" name="Graphic 4">
             <a:extLst>
               <a:ext uri="{FF2B5EF4-FFF2-40B4-BE49-F238E27FC236}">
-                <a16:creationId xmlns:a16="http://schemas.microsoft.com/office/drawing/2014/main" id="{E9A53560-3139-8C40-8308-19452E4C0DED}"/>
+                <a16:creationId xmlns:a16="http://schemas.microsoft.com/office/drawing/2014/main" id="{CE991841-A0F1-5944-948A-5FDB3B2C02F7}"/>
               </a:ext>
             </a:extLst>
           </p:cNvPr>
@@ -4689,10 +4408,10 @@
           <p:nvPr/>
         </p:nvPicPr>
         <p:blipFill>
-          <a:blip r:embed="rId5">
+          <a:blip r:embed="rId4">
             <a:extLst>
               <a:ext uri="{96DAC541-7B7A-43D3-8B79-37D633B846F1}">
-                <asvg:svgBlip xmlns:asvg="http://schemas.microsoft.com/office/drawing/2016/SVG/main" r:embed="rId6"/>
+                <asvg:svgBlip xmlns:asvg="http://schemas.microsoft.com/office/drawing/2016/SVG/main" r:embed="rId5"/>
               </a:ext>
             </a:extLst>
           </a:blip>
@@ -4702,8 +4421,8 @@
         </p:blipFill>
         <p:spPr>
           <a:xfrm>
-            <a:off x="5157376" y="450000"/>
-            <a:ext cx="1905000" cy="1905000"/>
+            <a:off x="3353411" y="2346035"/>
+            <a:ext cx="1468749" cy="1468749"/>
           </a:xfrm>
           <a:prstGeom prst="rect">
             <a:avLst/>
@@ -4715,7 +4434,7 @@
           <p:cNvPr id="6" name="Graphic 5">
             <a:extLst>
               <a:ext uri="{FF2B5EF4-FFF2-40B4-BE49-F238E27FC236}">
-                <a16:creationId xmlns:a16="http://schemas.microsoft.com/office/drawing/2014/main" id="{5F13DA21-9CC1-6347-9572-E0D3F1E2A271}"/>
+                <a16:creationId xmlns:a16="http://schemas.microsoft.com/office/drawing/2014/main" id="{357EA41C-5B6E-7C41-B263-1582F254CD1D}"/>
               </a:ext>
             </a:extLst>
           </p:cNvPr>
@@ -4725,10 +4444,10 @@
           <p:nvPr/>
         </p:nvPicPr>
         <p:blipFill>
-          <a:blip r:embed="rId7">
+          <a:blip r:embed="rId6">
             <a:extLst>
               <a:ext uri="{96DAC541-7B7A-43D3-8B79-37D633B846F1}">
-                <asvg:svgBlip xmlns:asvg="http://schemas.microsoft.com/office/drawing/2016/SVG/main" r:embed="rId8"/>
+                <asvg:svgBlip xmlns:asvg="http://schemas.microsoft.com/office/drawing/2016/SVG/main" r:embed="rId7"/>
               </a:ext>
             </a:extLst>
           </a:blip>
@@ -4738,8 +4457,8 @@
         </p:blipFill>
         <p:spPr>
           <a:xfrm>
-            <a:off x="7150769" y="3628589"/>
-            <a:ext cx="1905000" cy="1905000"/>
+            <a:off x="5303345" y="2346034"/>
+            <a:ext cx="1468749" cy="1468749"/>
           </a:xfrm>
           <a:prstGeom prst="rect">
             <a:avLst/>
@@ -4751,7 +4470,7 @@
           <p:cNvPr id="7" name="Graphic 6">
             <a:extLst>
               <a:ext uri="{FF2B5EF4-FFF2-40B4-BE49-F238E27FC236}">
-                <a16:creationId xmlns:a16="http://schemas.microsoft.com/office/drawing/2014/main" id="{B3312EF9-FD14-6D41-B3B7-B733C5B02982}"/>
+                <a16:creationId xmlns:a16="http://schemas.microsoft.com/office/drawing/2014/main" id="{9DC468B8-FCC1-E144-9357-EABAE739CFAD}"/>
               </a:ext>
             </a:extLst>
           </p:cNvPr>
@@ -4761,10 +4480,10 @@
           <p:nvPr/>
         </p:nvPicPr>
         <p:blipFill>
-          <a:blip r:embed="rId9">
+          <a:blip r:embed="rId8">
             <a:extLst>
               <a:ext uri="{96DAC541-7B7A-43D3-8B79-37D633B846F1}">
-                <asvg:svgBlip xmlns:asvg="http://schemas.microsoft.com/office/drawing/2016/SVG/main" r:embed="rId10"/>
+                <asvg:svgBlip xmlns:asvg="http://schemas.microsoft.com/office/drawing/2016/SVG/main" r:embed="rId9"/>
               </a:ext>
             </a:extLst>
           </a:blip>
@@ -4774,20 +4493,395 @@
         </p:blipFill>
         <p:spPr>
           <a:xfrm>
-            <a:off x="3156488" y="450000"/>
-            <a:ext cx="1905000" cy="1905000"/>
+            <a:off x="7253279" y="2346033"/>
+            <a:ext cx="1468749" cy="1468749"/>
           </a:xfrm>
           <a:prstGeom prst="rect">
             <a:avLst/>
           </a:prstGeom>
         </p:spPr>
       </p:pic>
+      <p:cxnSp>
+        <p:nvCxnSpPr>
+          <p:cNvPr id="9" name="Straight Arrow Connector 8">
+            <a:extLst>
+              <a:ext uri="{FF2B5EF4-FFF2-40B4-BE49-F238E27FC236}">
+                <a16:creationId xmlns:a16="http://schemas.microsoft.com/office/drawing/2014/main" id="{B11C0ACC-2C32-3444-8CB6-948A8B7302D1}"/>
+              </a:ext>
+            </a:extLst>
+          </p:cNvPr>
+          <p:cNvCxnSpPr>
+            <a:stCxn id="4" idx="3"/>
+            <a:endCxn id="5" idx="1"/>
+          </p:cNvCxnSpPr>
+          <p:nvPr/>
+        </p:nvCxnSpPr>
+        <p:spPr>
+          <a:xfrm>
+            <a:off x="2872226" y="3080410"/>
+            <a:ext cx="481185" cy="0"/>
+          </a:xfrm>
+          <a:prstGeom prst="straightConnector1">
+            <a:avLst/>
+          </a:prstGeom>
+          <a:ln>
+            <a:tailEnd type="triangle"/>
+          </a:ln>
+        </p:spPr>
+        <p:style>
+          <a:lnRef idx="1">
+            <a:schemeClr val="accent1"/>
+          </a:lnRef>
+          <a:fillRef idx="0">
+            <a:schemeClr val="accent1"/>
+          </a:fillRef>
+          <a:effectRef idx="0">
+            <a:schemeClr val="accent1"/>
+          </a:effectRef>
+          <a:fontRef idx="minor">
+            <a:schemeClr val="tx1"/>
+          </a:fontRef>
+        </p:style>
+      </p:cxnSp>
+      <p:cxnSp>
+        <p:nvCxnSpPr>
+          <p:cNvPr id="11" name="Straight Arrow Connector 10">
+            <a:extLst>
+              <a:ext uri="{FF2B5EF4-FFF2-40B4-BE49-F238E27FC236}">
+                <a16:creationId xmlns:a16="http://schemas.microsoft.com/office/drawing/2014/main" id="{76E05711-5EE0-EA4A-A249-1E5CF45DB502}"/>
+              </a:ext>
+            </a:extLst>
+          </p:cNvPr>
+          <p:cNvCxnSpPr>
+            <a:stCxn id="5" idx="3"/>
+            <a:endCxn id="6" idx="1"/>
+          </p:cNvCxnSpPr>
+          <p:nvPr/>
+        </p:nvCxnSpPr>
+        <p:spPr>
+          <a:xfrm flipV="1">
+            <a:off x="4822160" y="3080409"/>
+            <a:ext cx="481185" cy="1"/>
+          </a:xfrm>
+          <a:prstGeom prst="straightConnector1">
+            <a:avLst/>
+          </a:prstGeom>
+          <a:ln>
+            <a:tailEnd type="triangle"/>
+          </a:ln>
+        </p:spPr>
+        <p:style>
+          <a:lnRef idx="1">
+            <a:schemeClr val="accent1"/>
+          </a:lnRef>
+          <a:fillRef idx="0">
+            <a:schemeClr val="accent1"/>
+          </a:fillRef>
+          <a:effectRef idx="0">
+            <a:schemeClr val="accent1"/>
+          </a:effectRef>
+          <a:fontRef idx="minor">
+            <a:schemeClr val="tx1"/>
+          </a:fontRef>
+        </p:style>
+      </p:cxnSp>
+      <p:cxnSp>
+        <p:nvCxnSpPr>
+          <p:cNvPr id="13" name="Straight Arrow Connector 12">
+            <a:extLst>
+              <a:ext uri="{FF2B5EF4-FFF2-40B4-BE49-F238E27FC236}">
+                <a16:creationId xmlns:a16="http://schemas.microsoft.com/office/drawing/2014/main" id="{266D0019-F0EB-404A-A80C-2E4C55441CB5}"/>
+              </a:ext>
+            </a:extLst>
+          </p:cNvPr>
+          <p:cNvCxnSpPr>
+            <a:stCxn id="6" idx="3"/>
+            <a:endCxn id="7" idx="1"/>
+          </p:cNvCxnSpPr>
+          <p:nvPr/>
+        </p:nvCxnSpPr>
+        <p:spPr>
+          <a:xfrm flipV="1">
+            <a:off x="6772094" y="3080408"/>
+            <a:ext cx="481185" cy="1"/>
+          </a:xfrm>
+          <a:prstGeom prst="straightConnector1">
+            <a:avLst/>
+          </a:prstGeom>
+          <a:ln>
+            <a:tailEnd type="triangle"/>
+          </a:ln>
+        </p:spPr>
+        <p:style>
+          <a:lnRef idx="1">
+            <a:schemeClr val="accent1"/>
+          </a:lnRef>
+          <a:fillRef idx="0">
+            <a:schemeClr val="accent1"/>
+          </a:fillRef>
+          <a:effectRef idx="0">
+            <a:schemeClr val="accent1"/>
+          </a:effectRef>
+          <a:fontRef idx="minor">
+            <a:schemeClr val="tx1"/>
+          </a:fontRef>
+        </p:style>
+      </p:cxnSp>
+      <p:sp>
+        <p:nvSpPr>
+          <p:cNvPr id="14" name="TextBox 13">
+            <a:extLst>
+              <a:ext uri="{FF2B5EF4-FFF2-40B4-BE49-F238E27FC236}">
+                <a16:creationId xmlns:a16="http://schemas.microsoft.com/office/drawing/2014/main" id="{F2819A1B-7467-5841-9C26-F0EEDEB8EEDF}"/>
+              </a:ext>
+            </a:extLst>
+          </p:cNvPr>
+          <p:cNvSpPr txBox="1"/>
+          <p:nvPr/>
+        </p:nvSpPr>
+        <p:spPr>
+          <a:xfrm>
+            <a:off x="1615219" y="3899363"/>
+            <a:ext cx="1045264" cy="276999"/>
+          </a:xfrm>
+          <a:prstGeom prst="rect">
+            <a:avLst/>
+          </a:prstGeom>
+          <a:noFill/>
+        </p:spPr>
+        <p:txBody>
+          <a:bodyPr wrap="square" rtlCol="0">
+            <a:spAutoFit/>
+          </a:bodyPr>
+          <a:lstStyle/>
+          <a:p>
+            <a:pPr algn="ctr"/>
+            <a:r>
+              <a:rPr lang="fr-FR" sz="1200" dirty="0">
+                <a:solidFill>
+                  <a:schemeClr val="accent1"/>
+                </a:solidFill>
+              </a:rPr>
+              <a:t>Login</a:t>
+            </a:r>
+          </a:p>
+        </p:txBody>
+      </p:sp>
+      <p:sp>
+        <p:nvSpPr>
+          <p:cNvPr id="16" name="TextBox 15">
+            <a:extLst>
+              <a:ext uri="{FF2B5EF4-FFF2-40B4-BE49-F238E27FC236}">
+                <a16:creationId xmlns:a16="http://schemas.microsoft.com/office/drawing/2014/main" id="{231A56A0-1940-C44C-9DA7-E288337F321D}"/>
+              </a:ext>
+            </a:extLst>
+          </p:cNvPr>
+          <p:cNvSpPr txBox="1"/>
+          <p:nvPr/>
+        </p:nvSpPr>
+        <p:spPr>
+          <a:xfrm>
+            <a:off x="3252283" y="3899363"/>
+            <a:ext cx="1671003" cy="276999"/>
+          </a:xfrm>
+          <a:prstGeom prst="rect">
+            <a:avLst/>
+          </a:prstGeom>
+          <a:noFill/>
+        </p:spPr>
+        <p:txBody>
+          <a:bodyPr wrap="square" rtlCol="0">
+            <a:spAutoFit/>
+          </a:bodyPr>
+          <a:lstStyle/>
+          <a:p>
+            <a:pPr algn="ctr"/>
+            <a:r>
+              <a:rPr lang="fr-FR" sz="1200" dirty="0" err="1">
+                <a:solidFill>
+                  <a:schemeClr val="accent1"/>
+                </a:solidFill>
+              </a:rPr>
+              <a:t>Homepage</a:t>
+            </a:r>
+            <a:endParaRPr lang="fr-FR" sz="1200" dirty="0">
+              <a:solidFill>
+                <a:schemeClr val="accent1"/>
+              </a:solidFill>
+            </a:endParaRPr>
+          </a:p>
+        </p:txBody>
+      </p:sp>
+      <p:sp>
+        <p:nvSpPr>
+          <p:cNvPr id="17" name="TextBox 16">
+            <a:extLst>
+              <a:ext uri="{FF2B5EF4-FFF2-40B4-BE49-F238E27FC236}">
+                <a16:creationId xmlns:a16="http://schemas.microsoft.com/office/drawing/2014/main" id="{343D9BD0-E0ED-E04E-B0EF-5D30985B190E}"/>
+              </a:ext>
+            </a:extLst>
+          </p:cNvPr>
+          <p:cNvSpPr txBox="1"/>
+          <p:nvPr/>
+        </p:nvSpPr>
+        <p:spPr>
+          <a:xfrm>
+            <a:off x="5303345" y="3900981"/>
+            <a:ext cx="1468749" cy="461665"/>
+          </a:xfrm>
+          <a:prstGeom prst="rect">
+            <a:avLst/>
+          </a:prstGeom>
+          <a:noFill/>
+        </p:spPr>
+        <p:txBody>
+          <a:bodyPr wrap="square" rtlCol="0">
+            <a:spAutoFit/>
+          </a:bodyPr>
+          <a:lstStyle/>
+          <a:p>
+            <a:pPr algn="ctr"/>
+            <a:r>
+              <a:rPr lang="fr-FR" sz="1200" dirty="0" err="1">
+                <a:solidFill>
+                  <a:schemeClr val="accent1"/>
+                </a:solidFill>
+              </a:rPr>
+              <a:t>Navigate</a:t>
+            </a:r>
+            <a:r>
+              <a:rPr lang="fr-FR" sz="1200" dirty="0">
+                <a:solidFill>
+                  <a:schemeClr val="accent1"/>
+                </a:solidFill>
+              </a:rPr>
+              <a:t> to </a:t>
+            </a:r>
+            <a:r>
+              <a:rPr lang="fr-FR" sz="1200" dirty="0" err="1">
+                <a:solidFill>
+                  <a:schemeClr val="accent1"/>
+                </a:solidFill>
+              </a:rPr>
+              <a:t>product</a:t>
+            </a:r>
+            <a:r>
+              <a:rPr lang="fr-FR" sz="1200" dirty="0">
+                <a:solidFill>
+                  <a:schemeClr val="accent1"/>
+                </a:solidFill>
+              </a:rPr>
+              <a:t> page</a:t>
+            </a:r>
+          </a:p>
+        </p:txBody>
+      </p:sp>
+      <p:sp>
+        <p:nvSpPr>
+          <p:cNvPr id="18" name="TextBox 17">
+            <a:extLst>
+              <a:ext uri="{FF2B5EF4-FFF2-40B4-BE49-F238E27FC236}">
+                <a16:creationId xmlns:a16="http://schemas.microsoft.com/office/drawing/2014/main" id="{7AB3072A-3685-3F48-8410-37FFC152CBF6}"/>
+              </a:ext>
+            </a:extLst>
+          </p:cNvPr>
+          <p:cNvSpPr txBox="1"/>
+          <p:nvPr/>
+        </p:nvSpPr>
+        <p:spPr>
+          <a:xfrm>
+            <a:off x="7253278" y="3899363"/>
+            <a:ext cx="1468749" cy="276999"/>
+          </a:xfrm>
+          <a:prstGeom prst="rect">
+            <a:avLst/>
+          </a:prstGeom>
+          <a:noFill/>
+        </p:spPr>
+        <p:txBody>
+          <a:bodyPr wrap="square" rtlCol="0">
+            <a:spAutoFit/>
+          </a:bodyPr>
+          <a:lstStyle/>
+          <a:p>
+            <a:pPr algn="ctr"/>
+            <a:r>
+              <a:rPr lang="fr-FR" sz="1200" dirty="0" err="1">
+                <a:solidFill>
+                  <a:schemeClr val="accent1"/>
+                </a:solidFill>
+              </a:rPr>
+              <a:t>Download</a:t>
+            </a:r>
+            <a:r>
+              <a:rPr lang="fr-FR" sz="1200" dirty="0">
+                <a:solidFill>
+                  <a:schemeClr val="accent1"/>
+                </a:solidFill>
+              </a:rPr>
+              <a:t> </a:t>
+            </a:r>
+            <a:r>
+              <a:rPr lang="fr-FR" sz="1200" dirty="0" err="1">
+                <a:solidFill>
+                  <a:schemeClr val="accent1"/>
+                </a:solidFill>
+              </a:rPr>
+              <a:t>product</a:t>
+            </a:r>
+            <a:endParaRPr lang="fr-FR" sz="1200" dirty="0">
+              <a:solidFill>
+                <a:schemeClr val="accent1"/>
+              </a:solidFill>
+            </a:endParaRPr>
+          </a:p>
+        </p:txBody>
+      </p:sp>
+      <p:cxnSp>
+        <p:nvCxnSpPr>
+          <p:cNvPr id="24" name="Straight Arrow Connector 23">
+            <a:extLst>
+              <a:ext uri="{FF2B5EF4-FFF2-40B4-BE49-F238E27FC236}">
+                <a16:creationId xmlns:a16="http://schemas.microsoft.com/office/drawing/2014/main" id="{A5784088-32B2-504B-9F1A-5B72304E455C}"/>
+              </a:ext>
+            </a:extLst>
+          </p:cNvPr>
+          <p:cNvCxnSpPr/>
+          <p:nvPr/>
+        </p:nvCxnSpPr>
+        <p:spPr>
+          <a:xfrm flipV="1">
+            <a:off x="8722028" y="3080407"/>
+            <a:ext cx="481185" cy="1"/>
+          </a:xfrm>
+          <a:prstGeom prst="straightConnector1">
+            <a:avLst/>
+          </a:prstGeom>
+          <a:ln>
+            <a:tailEnd type="triangle"/>
+          </a:ln>
+        </p:spPr>
+        <p:style>
+          <a:lnRef idx="1">
+            <a:schemeClr val="accent1"/>
+          </a:lnRef>
+          <a:fillRef idx="0">
+            <a:schemeClr val="accent1"/>
+          </a:fillRef>
+          <a:effectRef idx="0">
+            <a:schemeClr val="accent1"/>
+          </a:effectRef>
+          <a:fontRef idx="minor">
+            <a:schemeClr val="tx1"/>
+          </a:fontRef>
+        </p:style>
+      </p:cxnSp>
       <p:pic>
         <p:nvPicPr>
-          <p:cNvPr id="8" name="Graphic 7">
-            <a:extLst>
-              <a:ext uri="{FF2B5EF4-FFF2-40B4-BE49-F238E27FC236}">
-                <a16:creationId xmlns:a16="http://schemas.microsoft.com/office/drawing/2014/main" id="{E082757D-A67B-B947-99D8-7A9A61FA749F}"/>
+          <p:cNvPr id="25" name="Graphic 24">
+            <a:extLst>
+              <a:ext uri="{FF2B5EF4-FFF2-40B4-BE49-F238E27FC236}">
+                <a16:creationId xmlns:a16="http://schemas.microsoft.com/office/drawing/2014/main" id="{86D97A8B-195B-B04D-945E-9E75F894DB58}"/>
               </a:ext>
             </a:extLst>
           </p:cNvPr>
@@ -4797,10 +4891,10 @@
           <p:nvPr/>
         </p:nvPicPr>
         <p:blipFill>
-          <a:blip r:embed="rId11">
+          <a:blip r:embed="rId10">
             <a:extLst>
               <a:ext uri="{96DAC541-7B7A-43D3-8B79-37D633B846F1}">
-                <asvg:svgBlip xmlns:asvg="http://schemas.microsoft.com/office/drawing/2016/SVG/main" r:embed="rId12"/>
+                <asvg:svgBlip xmlns:asvg="http://schemas.microsoft.com/office/drawing/2016/SVG/main" r:embed="rId11"/>
               </a:ext>
             </a:extLst>
           </a:blip>
@@ -4810,200 +4904,20 @@
         </p:blipFill>
         <p:spPr>
           <a:xfrm>
-            <a:off x="3156488" y="3628589"/>
-            <a:ext cx="1905000" cy="1905000"/>
+            <a:off x="9203213" y="2346033"/>
+            <a:ext cx="1468749" cy="1468749"/>
           </a:xfrm>
           <a:prstGeom prst="rect">
             <a:avLst/>
           </a:prstGeom>
         </p:spPr>
       </p:pic>
-      <p:pic>
-        <p:nvPicPr>
-          <p:cNvPr id="9" name="Graphic 8">
-            <a:extLst>
-              <a:ext uri="{FF2B5EF4-FFF2-40B4-BE49-F238E27FC236}">
-                <a16:creationId xmlns:a16="http://schemas.microsoft.com/office/drawing/2014/main" id="{4454A942-AC10-EB47-9524-4DC17E8CEAF1}"/>
-              </a:ext>
-            </a:extLst>
-          </p:cNvPr>
-          <p:cNvPicPr>
-            <a:picLocks noChangeAspect="1"/>
-          </p:cNvPicPr>
-          <p:nvPr/>
-        </p:nvPicPr>
-        <p:blipFill>
-          <a:blip r:embed="rId13">
-            <a:extLst>
-              <a:ext uri="{96DAC541-7B7A-43D3-8B79-37D633B846F1}">
-                <asvg:svgBlip xmlns:asvg="http://schemas.microsoft.com/office/drawing/2016/SVG/main" r:embed="rId14"/>
-              </a:ext>
-            </a:extLst>
-          </a:blip>
-          <a:stretch>
-            <a:fillRect/>
-          </a:stretch>
-        </p:blipFill>
-        <p:spPr>
-          <a:xfrm>
-            <a:off x="9151657" y="450000"/>
-            <a:ext cx="1905000" cy="1905000"/>
-          </a:xfrm>
-          <a:prstGeom prst="rect">
-            <a:avLst/>
-          </a:prstGeom>
-        </p:spPr>
-      </p:pic>
-      <p:pic>
-        <p:nvPicPr>
-          <p:cNvPr id="10" name="Graphic 9">
-            <a:extLst>
-              <a:ext uri="{FF2B5EF4-FFF2-40B4-BE49-F238E27FC236}">
-                <a16:creationId xmlns:a16="http://schemas.microsoft.com/office/drawing/2014/main" id="{ABFE6B6C-9C2D-F94B-9E0C-0344734EF802}"/>
-              </a:ext>
-            </a:extLst>
-          </p:cNvPr>
-          <p:cNvPicPr>
-            <a:picLocks noChangeAspect="1"/>
-          </p:cNvPicPr>
-          <p:nvPr/>
-        </p:nvPicPr>
-        <p:blipFill>
-          <a:blip r:embed="rId15">
-            <a:extLst>
-              <a:ext uri="{96DAC541-7B7A-43D3-8B79-37D633B846F1}">
-                <asvg:svgBlip xmlns:asvg="http://schemas.microsoft.com/office/drawing/2016/SVG/main" r:embed="rId16"/>
-              </a:ext>
-            </a:extLst>
-          </a:blip>
-          <a:stretch>
-            <a:fillRect/>
-          </a:stretch>
-        </p:blipFill>
-        <p:spPr>
-          <a:xfrm>
-            <a:off x="7150769" y="450000"/>
-            <a:ext cx="1905000" cy="1905000"/>
-          </a:xfrm>
-          <a:prstGeom prst="rect">
-            <a:avLst/>
-          </a:prstGeom>
-        </p:spPr>
-      </p:pic>
-      <p:pic>
-        <p:nvPicPr>
-          <p:cNvPr id="11" name="Graphic 10">
-            <a:extLst>
-              <a:ext uri="{FF2B5EF4-FFF2-40B4-BE49-F238E27FC236}">
-                <a16:creationId xmlns:a16="http://schemas.microsoft.com/office/drawing/2014/main" id="{B339A4AF-BD5B-C642-BB39-EA92186C2911}"/>
-              </a:ext>
-            </a:extLst>
-          </p:cNvPr>
-          <p:cNvPicPr>
-            <a:picLocks noChangeAspect="1"/>
-          </p:cNvPicPr>
-          <p:nvPr/>
-        </p:nvPicPr>
-        <p:blipFill>
-          <a:blip r:embed="rId17">
-            <a:extLst>
-              <a:ext uri="{96DAC541-7B7A-43D3-8B79-37D633B846F1}">
-                <asvg:svgBlip xmlns:asvg="http://schemas.microsoft.com/office/drawing/2016/SVG/main" r:embed="rId18"/>
-              </a:ext>
-            </a:extLst>
-          </a:blip>
-          <a:stretch>
-            <a:fillRect/>
-          </a:stretch>
-        </p:blipFill>
-        <p:spPr>
-          <a:xfrm>
-            <a:off x="5157376" y="3636084"/>
-            <a:ext cx="1905000" cy="1905000"/>
-          </a:xfrm>
-          <a:prstGeom prst="rect">
-            <a:avLst/>
-          </a:prstGeom>
-        </p:spPr>
-      </p:pic>
-      <p:pic>
-        <p:nvPicPr>
-          <p:cNvPr id="12" name="Graphic 11">
-            <a:extLst>
-              <a:ext uri="{FF2B5EF4-FFF2-40B4-BE49-F238E27FC236}">
-                <a16:creationId xmlns:a16="http://schemas.microsoft.com/office/drawing/2014/main" id="{B8F1A618-10CE-0E40-ABD6-15B1718E2487}"/>
-              </a:ext>
-            </a:extLst>
-          </p:cNvPr>
-          <p:cNvPicPr>
-            <a:picLocks noChangeAspect="1"/>
-          </p:cNvPicPr>
-          <p:nvPr/>
-        </p:nvPicPr>
-        <p:blipFill>
-          <a:blip r:embed="rId19">
-            <a:extLst>
-              <a:ext uri="{96DAC541-7B7A-43D3-8B79-37D633B846F1}">
-                <asvg:svgBlip xmlns:asvg="http://schemas.microsoft.com/office/drawing/2016/SVG/main" r:embed="rId20"/>
-              </a:ext>
-            </a:extLst>
-          </a:blip>
-          <a:stretch>
-            <a:fillRect/>
-          </a:stretch>
-        </p:blipFill>
-        <p:spPr>
-          <a:xfrm>
-            <a:off x="1155600" y="450000"/>
-            <a:ext cx="1905000" cy="1905000"/>
-          </a:xfrm>
-          <a:prstGeom prst="rect">
-            <a:avLst/>
-          </a:prstGeom>
-        </p:spPr>
-      </p:pic>
-      <p:pic>
-        <p:nvPicPr>
-          <p:cNvPr id="13" name="Graphic 12">
-            <a:extLst>
-              <a:ext uri="{FF2B5EF4-FFF2-40B4-BE49-F238E27FC236}">
-                <a16:creationId xmlns:a16="http://schemas.microsoft.com/office/drawing/2014/main" id="{FAA924D3-BEA6-9D4F-B513-31089DF99F0D}"/>
-              </a:ext>
-            </a:extLst>
-          </p:cNvPr>
-          <p:cNvPicPr>
-            <a:picLocks noChangeAspect="1"/>
-          </p:cNvPicPr>
-          <p:nvPr/>
-        </p:nvPicPr>
-        <p:blipFill>
-          <a:blip r:embed="rId21">
-            <a:extLst>
-              <a:ext uri="{96DAC541-7B7A-43D3-8B79-37D633B846F1}">
-                <asvg:svgBlip xmlns:asvg="http://schemas.microsoft.com/office/drawing/2016/SVG/main" r:embed="rId22"/>
-              </a:ext>
-            </a:extLst>
-          </a:blip>
-          <a:stretch>
-            <a:fillRect/>
-          </a:stretch>
-        </p:blipFill>
-        <p:spPr>
-          <a:xfrm>
-            <a:off x="9151657" y="3636084"/>
-            <a:ext cx="1905000" cy="1905000"/>
-          </a:xfrm>
-          <a:prstGeom prst="rect">
-            <a:avLst/>
-          </a:prstGeom>
-        </p:spPr>
-      </p:pic>
-      <p:sp>
-        <p:nvSpPr>
-          <p:cNvPr id="14" name="TextBox 13">
-            <a:extLst>
-              <a:ext uri="{FF2B5EF4-FFF2-40B4-BE49-F238E27FC236}">
-                <a16:creationId xmlns:a16="http://schemas.microsoft.com/office/drawing/2014/main" id="{617B0F92-03AA-AB46-80CB-5BD38F844017}"/>
+      <p:sp>
+        <p:nvSpPr>
+          <p:cNvPr id="26" name="TextBox 25">
+            <a:extLst>
+              <a:ext uri="{FF2B5EF4-FFF2-40B4-BE49-F238E27FC236}">
+                <a16:creationId xmlns:a16="http://schemas.microsoft.com/office/drawing/2014/main" id="{AC7AC880-9094-0A4B-8490-B34C2B416D18}"/>
               </a:ext>
             </a:extLst>
           </p:cNvPr>
@@ -5012,8 +4926,8 @@
         </p:nvSpPr>
         <p:spPr>
           <a:xfrm>
-            <a:off x="1836593" y="2469891"/>
-            <a:ext cx="543739" cy="307777"/>
+            <a:off x="9273330" y="3899363"/>
+            <a:ext cx="1333912" cy="276999"/>
           </a:xfrm>
           <a:prstGeom prst="rect">
             <a:avLst/>
@@ -5021,433 +4935,23 @@
           <a:noFill/>
         </p:spPr>
         <p:txBody>
-          <a:bodyPr wrap="none" rtlCol="0">
+          <a:bodyPr wrap="square" rtlCol="0">
             <a:spAutoFit/>
           </a:bodyPr>
           <a:lstStyle/>
           <a:p>
             <a:pPr algn="ctr"/>
             <a:r>
-              <a:rPr lang="fr-FR" sz="1400" dirty="0" err="1">
+              <a:rPr lang="fr-FR" sz="1200" dirty="0" err="1">
                 <a:solidFill>
-                  <a:schemeClr val="accent1">
-                    <a:lumMod val="75000"/>
-                  </a:schemeClr>
+                  <a:schemeClr val="accent1"/>
                 </a:solidFill>
               </a:rPr>
-              <a:t>Alert</a:t>
-            </a:r>
-            <a:endParaRPr lang="fr-FR" sz="1400" dirty="0">
+              <a:t>Success</a:t>
+            </a:r>
+            <a:endParaRPr lang="fr-FR" sz="1200" dirty="0">
               <a:solidFill>
-                <a:schemeClr val="accent1">
-                  <a:lumMod val="75000"/>
-                </a:schemeClr>
-              </a:solidFill>
-            </a:endParaRPr>
-          </a:p>
-        </p:txBody>
-      </p:sp>
-      <p:sp>
-        <p:nvSpPr>
-          <p:cNvPr id="15" name="TextBox 14">
-            <a:extLst>
-              <a:ext uri="{FF2B5EF4-FFF2-40B4-BE49-F238E27FC236}">
-                <a16:creationId xmlns:a16="http://schemas.microsoft.com/office/drawing/2014/main" id="{E2342A43-7EEC-1245-A2CC-EB625711D423}"/>
-              </a:ext>
-            </a:extLst>
-          </p:cNvPr>
-          <p:cNvSpPr txBox="1"/>
-          <p:nvPr/>
-        </p:nvSpPr>
-        <p:spPr>
-          <a:xfrm>
-            <a:off x="3684416" y="2469890"/>
-            <a:ext cx="849143" cy="307777"/>
-          </a:xfrm>
-          <a:prstGeom prst="rect">
-            <a:avLst/>
-          </a:prstGeom>
-          <a:noFill/>
-        </p:spPr>
-        <p:txBody>
-          <a:bodyPr wrap="none" rtlCol="0">
-            <a:spAutoFit/>
-          </a:bodyPr>
-          <a:lstStyle/>
-          <a:p>
-            <a:pPr algn="ctr"/>
-            <a:r>
-              <a:rPr lang="fr-FR" sz="1400" dirty="0">
-                <a:solidFill>
-                  <a:schemeClr val="accent1">
-                    <a:lumMod val="75000"/>
-                  </a:schemeClr>
-                </a:solidFill>
-              </a:rPr>
-              <a:t>Compare</a:t>
-            </a:r>
-          </a:p>
-        </p:txBody>
-      </p:sp>
-      <p:sp>
-        <p:nvSpPr>
-          <p:cNvPr id="16" name="TextBox 15">
-            <a:extLst>
-              <a:ext uri="{FF2B5EF4-FFF2-40B4-BE49-F238E27FC236}">
-                <a16:creationId xmlns:a16="http://schemas.microsoft.com/office/drawing/2014/main" id="{6FAD20E2-8C57-1F40-92F9-6577A26F917E}"/>
-              </a:ext>
-            </a:extLst>
-          </p:cNvPr>
-          <p:cNvSpPr txBox="1"/>
-          <p:nvPr/>
-        </p:nvSpPr>
-        <p:spPr>
-          <a:xfrm>
-            <a:off x="5890103" y="2469889"/>
-            <a:ext cx="439544" cy="307777"/>
-          </a:xfrm>
-          <a:prstGeom prst="rect">
-            <a:avLst/>
-          </a:prstGeom>
-          <a:noFill/>
-        </p:spPr>
-        <p:txBody>
-          <a:bodyPr wrap="none" rtlCol="0">
-            <a:spAutoFit/>
-          </a:bodyPr>
-          <a:lstStyle/>
-          <a:p>
-            <a:pPr algn="ctr"/>
-            <a:r>
-              <a:rPr lang="fr-FR" sz="1400" dirty="0">
-                <a:solidFill>
-                  <a:schemeClr val="accent1">
-                    <a:lumMod val="75000"/>
-                  </a:schemeClr>
-                </a:solidFill>
-              </a:rPr>
-              <a:t>File</a:t>
-            </a:r>
-          </a:p>
-        </p:txBody>
-      </p:sp>
-      <p:sp>
-        <p:nvSpPr>
-          <p:cNvPr id="17" name="TextBox 16">
-            <a:extLst>
-              <a:ext uri="{FF2B5EF4-FFF2-40B4-BE49-F238E27FC236}">
-                <a16:creationId xmlns:a16="http://schemas.microsoft.com/office/drawing/2014/main" id="{6433CB0F-65B0-C74C-819F-732F88D3A950}"/>
-              </a:ext>
-            </a:extLst>
-          </p:cNvPr>
-          <p:cNvSpPr txBox="1"/>
-          <p:nvPr/>
-        </p:nvSpPr>
-        <p:spPr>
-          <a:xfrm>
-            <a:off x="7684726" y="2469889"/>
-            <a:ext cx="837089" cy="307777"/>
-          </a:xfrm>
-          <a:prstGeom prst="rect">
-            <a:avLst/>
-          </a:prstGeom>
-          <a:noFill/>
-        </p:spPr>
-        <p:txBody>
-          <a:bodyPr wrap="none" rtlCol="0">
-            <a:spAutoFit/>
-          </a:bodyPr>
-          <a:lstStyle/>
-          <a:p>
-            <a:pPr algn="ctr"/>
-            <a:r>
-              <a:rPr lang="fr-FR" sz="1400" dirty="0" err="1">
-                <a:solidFill>
-                  <a:schemeClr val="accent1">
-                    <a:lumMod val="75000"/>
-                  </a:schemeClr>
-                </a:solidFill>
-              </a:rPr>
-              <a:t>Calendar</a:t>
-            </a:r>
-            <a:endParaRPr lang="fr-FR" sz="1400" dirty="0">
-              <a:solidFill>
-                <a:schemeClr val="accent1">
-                  <a:lumMod val="75000"/>
-                </a:schemeClr>
-              </a:solidFill>
-            </a:endParaRPr>
-          </a:p>
-        </p:txBody>
-      </p:sp>
-      <p:sp>
-        <p:nvSpPr>
-          <p:cNvPr id="18" name="TextBox 17">
-            <a:extLst>
-              <a:ext uri="{FF2B5EF4-FFF2-40B4-BE49-F238E27FC236}">
-                <a16:creationId xmlns:a16="http://schemas.microsoft.com/office/drawing/2014/main" id="{8D6FE483-0AB4-F742-A86B-794812901167}"/>
-              </a:ext>
-            </a:extLst>
-          </p:cNvPr>
-          <p:cNvSpPr txBox="1"/>
-          <p:nvPr/>
-        </p:nvSpPr>
-        <p:spPr>
-          <a:xfrm>
-            <a:off x="9843540" y="2469888"/>
-            <a:ext cx="521233" cy="307777"/>
-          </a:xfrm>
-          <a:prstGeom prst="rect">
-            <a:avLst/>
-          </a:prstGeom>
-          <a:noFill/>
-        </p:spPr>
-        <p:txBody>
-          <a:bodyPr wrap="none" rtlCol="0">
-            <a:spAutoFit/>
-          </a:bodyPr>
-          <a:lstStyle/>
-          <a:p>
-            <a:pPr algn="ctr"/>
-            <a:r>
-              <a:rPr lang="fr-FR" sz="1400" dirty="0">
-                <a:solidFill>
-                  <a:schemeClr val="accent1">
-                    <a:lumMod val="75000"/>
-                  </a:schemeClr>
-                </a:solidFill>
-              </a:rPr>
-              <a:t>Chat</a:t>
-            </a:r>
-          </a:p>
-        </p:txBody>
-      </p:sp>
-      <p:sp>
-        <p:nvSpPr>
-          <p:cNvPr id="19" name="TextBox 18">
-            <a:extLst>
-              <a:ext uri="{FF2B5EF4-FFF2-40B4-BE49-F238E27FC236}">
-                <a16:creationId xmlns:a16="http://schemas.microsoft.com/office/drawing/2014/main" id="{7733BD9F-DF98-2E41-A0C0-793B343E9163}"/>
-              </a:ext>
-            </a:extLst>
-          </p:cNvPr>
-          <p:cNvSpPr txBox="1"/>
-          <p:nvPr/>
-        </p:nvSpPr>
-        <p:spPr>
-          <a:xfrm>
-            <a:off x="1855164" y="5642809"/>
-            <a:ext cx="510076" cy="307777"/>
-          </a:xfrm>
-          <a:prstGeom prst="rect">
-            <a:avLst/>
-          </a:prstGeom>
-          <a:noFill/>
-        </p:spPr>
-        <p:txBody>
-          <a:bodyPr wrap="none" rtlCol="0">
-            <a:spAutoFit/>
-          </a:bodyPr>
-          <a:lstStyle/>
-          <a:p>
-            <a:pPr algn="ctr"/>
-            <a:r>
-              <a:rPr lang="fr-FR" sz="1400" dirty="0">
-                <a:solidFill>
-                  <a:schemeClr val="accent1">
-                    <a:lumMod val="75000"/>
-                  </a:schemeClr>
-                </a:solidFill>
-              </a:rPr>
-              <a:t>Files</a:t>
-            </a:r>
-          </a:p>
-        </p:txBody>
-      </p:sp>
-      <p:sp>
-        <p:nvSpPr>
-          <p:cNvPr id="20" name="TextBox 19">
-            <a:extLst>
-              <a:ext uri="{FF2B5EF4-FFF2-40B4-BE49-F238E27FC236}">
-                <a16:creationId xmlns:a16="http://schemas.microsoft.com/office/drawing/2014/main" id="{20DF800E-B7DD-2C40-ADE9-122724345E5A}"/>
-              </a:ext>
-            </a:extLst>
-          </p:cNvPr>
-          <p:cNvSpPr txBox="1"/>
-          <p:nvPr/>
-        </p:nvSpPr>
-        <p:spPr>
-          <a:xfrm>
-            <a:off x="3621546" y="5642808"/>
-            <a:ext cx="974883" cy="307777"/>
-          </a:xfrm>
-          <a:prstGeom prst="rect">
-            <a:avLst/>
-          </a:prstGeom>
-          <a:noFill/>
-        </p:spPr>
-        <p:txBody>
-          <a:bodyPr wrap="none" rtlCol="0">
-            <a:spAutoFit/>
-          </a:bodyPr>
-          <a:lstStyle/>
-          <a:p>
-            <a:pPr algn="ctr"/>
-            <a:r>
-              <a:rPr lang="fr-FR" sz="1400" dirty="0" err="1">
-                <a:solidFill>
-                  <a:schemeClr val="accent1">
-                    <a:lumMod val="75000"/>
-                  </a:schemeClr>
-                </a:solidFill>
-              </a:rPr>
-              <a:t>Comments</a:t>
-            </a:r>
-            <a:endParaRPr lang="fr-FR" sz="1400" dirty="0">
-              <a:solidFill>
-                <a:schemeClr val="accent1">
-                  <a:lumMod val="75000"/>
-                </a:schemeClr>
-              </a:solidFill>
-            </a:endParaRPr>
-          </a:p>
-        </p:txBody>
-      </p:sp>
-      <p:sp>
-        <p:nvSpPr>
-          <p:cNvPr id="21" name="TextBox 20">
-            <a:extLst>
-              <a:ext uri="{FF2B5EF4-FFF2-40B4-BE49-F238E27FC236}">
-                <a16:creationId xmlns:a16="http://schemas.microsoft.com/office/drawing/2014/main" id="{B9C0ED87-E3EE-4741-9115-69FC53BE37FA}"/>
-              </a:ext>
-            </a:extLst>
-          </p:cNvPr>
-          <p:cNvSpPr txBox="1"/>
-          <p:nvPr/>
-        </p:nvSpPr>
-        <p:spPr>
-          <a:xfrm>
-            <a:off x="5779496" y="5642807"/>
-            <a:ext cx="660758" cy="307777"/>
-          </a:xfrm>
-          <a:prstGeom prst="rect">
-            <a:avLst/>
-          </a:prstGeom>
-          <a:noFill/>
-        </p:spPr>
-        <p:txBody>
-          <a:bodyPr wrap="none" rtlCol="0">
-            <a:spAutoFit/>
-          </a:bodyPr>
-          <a:lstStyle/>
-          <a:p>
-            <a:pPr algn="ctr"/>
-            <a:r>
-              <a:rPr lang="fr-FR" sz="1400" dirty="0">
-                <a:solidFill>
-                  <a:schemeClr val="accent1">
-                    <a:lumMod val="75000"/>
-                  </a:schemeClr>
-                </a:solidFill>
-              </a:rPr>
-              <a:t>Article</a:t>
-            </a:r>
-          </a:p>
-        </p:txBody>
-      </p:sp>
-      <p:sp>
-        <p:nvSpPr>
-          <p:cNvPr id="22" name="TextBox 21">
-            <a:extLst>
-              <a:ext uri="{FF2B5EF4-FFF2-40B4-BE49-F238E27FC236}">
-                <a16:creationId xmlns:a16="http://schemas.microsoft.com/office/drawing/2014/main" id="{BD5E71D1-F8BB-3143-8863-5C5BCC7F8C64}"/>
-              </a:ext>
-            </a:extLst>
-          </p:cNvPr>
-          <p:cNvSpPr txBox="1"/>
-          <p:nvPr/>
-        </p:nvSpPr>
-        <p:spPr>
-          <a:xfrm>
-            <a:off x="7638593" y="5642807"/>
-            <a:ext cx="929357" cy="307777"/>
-          </a:xfrm>
-          <a:prstGeom prst="rect">
-            <a:avLst/>
-          </a:prstGeom>
-          <a:noFill/>
-        </p:spPr>
-        <p:txBody>
-          <a:bodyPr wrap="none" rtlCol="0">
-            <a:spAutoFit/>
-          </a:bodyPr>
-          <a:lstStyle/>
-          <a:p>
-            <a:pPr algn="ctr"/>
-            <a:r>
-              <a:rPr lang="fr-FR" sz="1400" dirty="0" err="1">
-                <a:solidFill>
-                  <a:schemeClr val="accent1">
-                    <a:lumMod val="75000"/>
-                  </a:schemeClr>
-                </a:solidFill>
-              </a:rPr>
-              <a:t>Download</a:t>
-            </a:r>
-            <a:endParaRPr lang="fr-FR" sz="1400" dirty="0">
-              <a:solidFill>
-                <a:schemeClr val="accent1">
-                  <a:lumMod val="75000"/>
-                </a:schemeClr>
-              </a:solidFill>
-            </a:endParaRPr>
-          </a:p>
-        </p:txBody>
-      </p:sp>
-      <p:sp>
-        <p:nvSpPr>
-          <p:cNvPr id="23" name="TextBox 22">
-            <a:extLst>
-              <a:ext uri="{FF2B5EF4-FFF2-40B4-BE49-F238E27FC236}">
-                <a16:creationId xmlns:a16="http://schemas.microsoft.com/office/drawing/2014/main" id="{CE34D9DA-EC08-204A-9D4B-D407F6A7BE5C}"/>
-              </a:ext>
-            </a:extLst>
-          </p:cNvPr>
-          <p:cNvSpPr txBox="1"/>
-          <p:nvPr/>
-        </p:nvSpPr>
-        <p:spPr>
-          <a:xfrm>
-            <a:off x="9752490" y="5642806"/>
-            <a:ext cx="703334" cy="307777"/>
-          </a:xfrm>
-          <a:prstGeom prst="rect">
-            <a:avLst/>
-          </a:prstGeom>
-          <a:noFill/>
-        </p:spPr>
-        <p:txBody>
-          <a:bodyPr wrap="none" rtlCol="0">
-            <a:spAutoFit/>
-          </a:bodyPr>
-          <a:lstStyle/>
-          <a:p>
-            <a:pPr algn="ctr"/>
-            <a:r>
-              <a:rPr lang="fr-FR" sz="1400" dirty="0" err="1">
-                <a:solidFill>
-                  <a:schemeClr val="accent1">
-                    <a:lumMod val="75000"/>
-                  </a:schemeClr>
-                </a:solidFill>
-              </a:rPr>
-              <a:t>Gallery</a:t>
-            </a:r>
-            <a:endParaRPr lang="fr-FR" sz="1400" dirty="0">
-              <a:solidFill>
-                <a:schemeClr val="accent1">
-                  <a:lumMod val="75000"/>
-                </a:schemeClr>
+                <a:schemeClr val="accent1"/>
               </a:solidFill>
             </a:endParaRPr>
           </a:p>
@@ -5456,7 +4960,7 @@
     </p:spTree>
     <p:extLst>
       <p:ext uri="{BB962C8B-B14F-4D97-AF65-F5344CB8AC3E}">
-        <p14:creationId xmlns:p14="http://schemas.microsoft.com/office/powerpoint/2010/main" val="1367573051"/>
+        <p14:creationId xmlns:p14="http://schemas.microsoft.com/office/powerpoint/2010/main" val="2371011679"/>
       </p:ext>
     </p:extLst>
   </p:cSld>
@@ -5485,10 +4989,10 @@
       </p:grpSpPr>
       <p:pic>
         <p:nvPicPr>
-          <p:cNvPr id="4" name="Graphic 3">
-            <a:extLst>
-              <a:ext uri="{FF2B5EF4-FFF2-40B4-BE49-F238E27FC236}">
-                <a16:creationId xmlns:a16="http://schemas.microsoft.com/office/drawing/2014/main" id="{0021A144-F509-3D43-8E3A-85DDEABC66BD}"/>
+          <p:cNvPr id="7" name="Graphic 6">
+            <a:extLst>
+              <a:ext uri="{FF2B5EF4-FFF2-40B4-BE49-F238E27FC236}">
+                <a16:creationId xmlns:a16="http://schemas.microsoft.com/office/drawing/2014/main" id="{FE2FD9F5-36E0-3442-9E89-A78DD06FC368}"/>
               </a:ext>
             </a:extLst>
           </p:cNvPr>
@@ -5498,10 +5002,10 @@
           <p:nvPr/>
         </p:nvPicPr>
         <p:blipFill>
-          <a:blip r:embed="rId2">
+          <a:blip r:embed="rId3">
             <a:extLst>
               <a:ext uri="{96DAC541-7B7A-43D3-8B79-37D633B846F1}">
-                <asvg:svgBlip xmlns:asvg="http://schemas.microsoft.com/office/drawing/2016/SVG/main" r:embed="rId3"/>
+                <asvg:svgBlip xmlns:asvg="http://schemas.microsoft.com/office/drawing/2016/SVG/main" r:embed="rId4"/>
               </a:ext>
             </a:extLst>
           </a:blip>
@@ -5511,8 +5015,8 @@
         </p:blipFill>
         <p:spPr>
           <a:xfrm>
-            <a:off x="7078820" y="505864"/>
-            <a:ext cx="1905000" cy="1905000"/>
+            <a:off x="5154502" y="2598211"/>
+            <a:ext cx="1258998" cy="1258998"/>
           </a:xfrm>
           <a:prstGeom prst="rect">
             <a:avLst/>
@@ -5521,10 +5025,10 @@
       </p:pic>
       <p:pic>
         <p:nvPicPr>
-          <p:cNvPr id="6" name="Graphic 5">
-            <a:extLst>
-              <a:ext uri="{FF2B5EF4-FFF2-40B4-BE49-F238E27FC236}">
-                <a16:creationId xmlns:a16="http://schemas.microsoft.com/office/drawing/2014/main" id="{005AC345-FB08-5246-869E-FA9C40FD6FC2}"/>
+          <p:cNvPr id="27" name="Graphic 26">
+            <a:extLst>
+              <a:ext uri="{FF2B5EF4-FFF2-40B4-BE49-F238E27FC236}">
+                <a16:creationId xmlns:a16="http://schemas.microsoft.com/office/drawing/2014/main" id="{50319191-C023-6D4D-A9BC-0AA674C3DDD0}"/>
               </a:ext>
             </a:extLst>
           </p:cNvPr>
@@ -5534,10 +5038,10 @@
           <p:nvPr/>
         </p:nvPicPr>
         <p:blipFill>
-          <a:blip r:embed="rId4">
+          <a:blip r:embed="rId5">
             <a:extLst>
               <a:ext uri="{96DAC541-7B7A-43D3-8B79-37D633B846F1}">
-                <asvg:svgBlip xmlns:asvg="http://schemas.microsoft.com/office/drawing/2016/SVG/main" r:embed="rId5"/>
+                <asvg:svgBlip xmlns:asvg="http://schemas.microsoft.com/office/drawing/2016/SVG/main" r:embed="rId6"/>
               </a:ext>
             </a:extLst>
           </a:blip>
@@ -5547,8 +5051,8 @@
         </p:blipFill>
         <p:spPr>
           <a:xfrm>
-            <a:off x="5079550" y="505864"/>
-            <a:ext cx="1905000" cy="1905000"/>
+            <a:off x="7153772" y="2598211"/>
+            <a:ext cx="1258998" cy="1258998"/>
           </a:xfrm>
           <a:prstGeom prst="rect">
             <a:avLst/>
@@ -5557,10 +5061,10 @@
       </p:pic>
       <p:pic>
         <p:nvPicPr>
-          <p:cNvPr id="7" name="Graphic 6">
-            <a:extLst>
-              <a:ext uri="{FF2B5EF4-FFF2-40B4-BE49-F238E27FC236}">
-                <a16:creationId xmlns:a16="http://schemas.microsoft.com/office/drawing/2014/main" id="{B322F60D-A582-7E41-977B-6D6DBAB17186}"/>
+          <p:cNvPr id="33" name="Graphic 32">
+            <a:extLst>
+              <a:ext uri="{FF2B5EF4-FFF2-40B4-BE49-F238E27FC236}">
+                <a16:creationId xmlns:a16="http://schemas.microsoft.com/office/drawing/2014/main" id="{56CDF75E-E85C-994A-B9D8-8C4748C2F5BE}"/>
               </a:ext>
             </a:extLst>
           </p:cNvPr>
@@ -5570,10 +5074,10 @@
           <p:nvPr/>
         </p:nvPicPr>
         <p:blipFill>
-          <a:blip r:embed="rId6">
+          <a:blip r:embed="rId7">
             <a:extLst>
               <a:ext uri="{96DAC541-7B7A-43D3-8B79-37D633B846F1}">
-                <asvg:svgBlip xmlns:asvg="http://schemas.microsoft.com/office/drawing/2016/SVG/main" r:embed="rId7"/>
+                <asvg:svgBlip xmlns:asvg="http://schemas.microsoft.com/office/drawing/2016/SVG/main" r:embed="rId8"/>
               </a:ext>
             </a:extLst>
           </a:blip>
@@ -5583,8 +5087,8 @@
         </p:blipFill>
         <p:spPr>
           <a:xfrm>
-            <a:off x="3080280" y="505864"/>
-            <a:ext cx="1905000" cy="1905000"/>
+            <a:off x="9153042" y="2598211"/>
+            <a:ext cx="1258998" cy="1258998"/>
           </a:xfrm>
           <a:prstGeom prst="rect">
             <a:avLst/>
@@ -5593,10 +5097,10 @@
       </p:pic>
       <p:pic>
         <p:nvPicPr>
-          <p:cNvPr id="8" name="Graphic 7">
-            <a:extLst>
-              <a:ext uri="{FF2B5EF4-FFF2-40B4-BE49-F238E27FC236}">
-                <a16:creationId xmlns:a16="http://schemas.microsoft.com/office/drawing/2014/main" id="{E9F74BE5-3B62-7B4C-831B-171FE16E92B7}"/>
+          <p:cNvPr id="41" name="Graphic 40">
+            <a:extLst>
+              <a:ext uri="{FF2B5EF4-FFF2-40B4-BE49-F238E27FC236}">
+                <a16:creationId xmlns:a16="http://schemas.microsoft.com/office/drawing/2014/main" id="{878B9608-D4C2-4447-B7E6-E79410D996D7}"/>
               </a:ext>
             </a:extLst>
           </p:cNvPr>
@@ -5606,10 +5110,10 @@
           <p:nvPr/>
         </p:nvPicPr>
         <p:blipFill>
-          <a:blip r:embed="rId8">
+          <a:blip r:embed="rId9">
             <a:extLst>
               <a:ext uri="{96DAC541-7B7A-43D3-8B79-37D633B846F1}">
-                <asvg:svgBlip xmlns:asvg="http://schemas.microsoft.com/office/drawing/2016/SVG/main" r:embed="rId9"/>
+                <asvg:svgBlip xmlns:asvg="http://schemas.microsoft.com/office/drawing/2016/SVG/main" r:embed="rId10"/>
               </a:ext>
             </a:extLst>
           </a:blip>
@@ -5619,20 +5123,236 @@
         </p:blipFill>
         <p:spPr>
           <a:xfrm>
-            <a:off x="1081010" y="505864"/>
-            <a:ext cx="1905000" cy="1905000"/>
+            <a:off x="3155232" y="2598211"/>
+            <a:ext cx="1258998" cy="1258998"/>
           </a:xfrm>
           <a:prstGeom prst="rect">
             <a:avLst/>
           </a:prstGeom>
         </p:spPr>
       </p:pic>
-      <p:sp>
-        <p:nvSpPr>
-          <p:cNvPr id="9" name="TextBox 8">
-            <a:extLst>
-              <a:ext uri="{FF2B5EF4-FFF2-40B4-BE49-F238E27FC236}">
-                <a16:creationId xmlns:a16="http://schemas.microsoft.com/office/drawing/2014/main" id="{1142DF87-6F2A-A746-86D8-08454857805F}"/>
+      <p:pic>
+        <p:nvPicPr>
+          <p:cNvPr id="43" name="Graphic 42">
+            <a:extLst>
+              <a:ext uri="{FF2B5EF4-FFF2-40B4-BE49-F238E27FC236}">
+                <a16:creationId xmlns:a16="http://schemas.microsoft.com/office/drawing/2014/main" id="{EAD52623-D84A-5445-BB1E-54A6C97148DA}"/>
+              </a:ext>
+            </a:extLst>
+          </p:cNvPr>
+          <p:cNvPicPr>
+            <a:picLocks noChangeAspect="1"/>
+          </p:cNvPicPr>
+          <p:nvPr/>
+        </p:nvPicPr>
+        <p:blipFill>
+          <a:blip r:embed="rId11">
+            <a:extLst>
+              <a:ext uri="{96DAC541-7B7A-43D3-8B79-37D633B846F1}">
+                <asvg:svgBlip xmlns:asvg="http://schemas.microsoft.com/office/drawing/2016/SVG/main" r:embed="rId12"/>
+              </a:ext>
+            </a:extLst>
+          </a:blip>
+          <a:stretch>
+            <a:fillRect/>
+          </a:stretch>
+        </p:blipFill>
+        <p:spPr>
+          <a:xfrm>
+            <a:off x="1166112" y="2598211"/>
+            <a:ext cx="1248848" cy="1248848"/>
+          </a:xfrm>
+          <a:prstGeom prst="rect">
+            <a:avLst/>
+          </a:prstGeom>
+        </p:spPr>
+      </p:pic>
+      <p:pic>
+        <p:nvPicPr>
+          <p:cNvPr id="45" name="Graphic 44">
+            <a:extLst>
+              <a:ext uri="{FF2B5EF4-FFF2-40B4-BE49-F238E27FC236}">
+                <a16:creationId xmlns:a16="http://schemas.microsoft.com/office/drawing/2014/main" id="{DAB0D812-0848-1242-8FF9-7E04123C5B11}"/>
+              </a:ext>
+            </a:extLst>
+          </p:cNvPr>
+          <p:cNvPicPr>
+            <a:picLocks noChangeAspect="1"/>
+          </p:cNvPicPr>
+          <p:nvPr/>
+        </p:nvPicPr>
+        <p:blipFill>
+          <a:blip r:embed="rId13">
+            <a:extLst>
+              <a:ext uri="{96DAC541-7B7A-43D3-8B79-37D633B846F1}">
+                <asvg:svgBlip xmlns:asvg="http://schemas.microsoft.com/office/drawing/2016/SVG/main" r:embed="rId14"/>
+              </a:ext>
+            </a:extLst>
+          </a:blip>
+          <a:stretch>
+            <a:fillRect/>
+          </a:stretch>
+        </p:blipFill>
+        <p:spPr>
+          <a:xfrm>
+            <a:off x="9153042" y="634457"/>
+            <a:ext cx="1258998" cy="1258998"/>
+          </a:xfrm>
+          <a:prstGeom prst="rect">
+            <a:avLst/>
+          </a:prstGeom>
+        </p:spPr>
+      </p:pic>
+      <p:pic>
+        <p:nvPicPr>
+          <p:cNvPr id="47" name="Graphic 46">
+            <a:extLst>
+              <a:ext uri="{FF2B5EF4-FFF2-40B4-BE49-F238E27FC236}">
+                <a16:creationId xmlns:a16="http://schemas.microsoft.com/office/drawing/2014/main" id="{F606A3FC-DAE8-1743-8E79-1D8D8630F28C}"/>
+              </a:ext>
+            </a:extLst>
+          </p:cNvPr>
+          <p:cNvPicPr>
+            <a:picLocks noChangeAspect="1"/>
+          </p:cNvPicPr>
+          <p:nvPr/>
+        </p:nvPicPr>
+        <p:blipFill>
+          <a:blip r:embed="rId15">
+            <a:extLst>
+              <a:ext uri="{96DAC541-7B7A-43D3-8B79-37D633B846F1}">
+                <asvg:svgBlip xmlns:asvg="http://schemas.microsoft.com/office/drawing/2016/SVG/main" r:embed="rId16"/>
+              </a:ext>
+            </a:extLst>
+          </a:blip>
+          <a:stretch>
+            <a:fillRect/>
+          </a:stretch>
+        </p:blipFill>
+        <p:spPr>
+          <a:xfrm>
+            <a:off x="7153772" y="634457"/>
+            <a:ext cx="1258998" cy="1258998"/>
+          </a:xfrm>
+          <a:prstGeom prst="rect">
+            <a:avLst/>
+          </a:prstGeom>
+        </p:spPr>
+      </p:pic>
+      <p:pic>
+        <p:nvPicPr>
+          <p:cNvPr id="49" name="Graphic 48">
+            <a:extLst>
+              <a:ext uri="{FF2B5EF4-FFF2-40B4-BE49-F238E27FC236}">
+                <a16:creationId xmlns:a16="http://schemas.microsoft.com/office/drawing/2014/main" id="{38ED027B-0571-EB48-8C3B-74BA23660773}"/>
+              </a:ext>
+            </a:extLst>
+          </p:cNvPr>
+          <p:cNvPicPr>
+            <a:picLocks noChangeAspect="1"/>
+          </p:cNvPicPr>
+          <p:nvPr/>
+        </p:nvPicPr>
+        <p:blipFill>
+          <a:blip r:embed="rId17">
+            <a:extLst>
+              <a:ext uri="{96DAC541-7B7A-43D3-8B79-37D633B846F1}">
+                <asvg:svgBlip xmlns:asvg="http://schemas.microsoft.com/office/drawing/2016/SVG/main" r:embed="rId18"/>
+              </a:ext>
+            </a:extLst>
+          </a:blip>
+          <a:stretch>
+            <a:fillRect/>
+          </a:stretch>
+        </p:blipFill>
+        <p:spPr>
+          <a:xfrm>
+            <a:off x="5154502" y="634457"/>
+            <a:ext cx="1258998" cy="1258998"/>
+          </a:xfrm>
+          <a:prstGeom prst="rect">
+            <a:avLst/>
+          </a:prstGeom>
+        </p:spPr>
+      </p:pic>
+      <p:pic>
+        <p:nvPicPr>
+          <p:cNvPr id="51" name="Graphic 50">
+            <a:extLst>
+              <a:ext uri="{FF2B5EF4-FFF2-40B4-BE49-F238E27FC236}">
+                <a16:creationId xmlns:a16="http://schemas.microsoft.com/office/drawing/2014/main" id="{36DFB4E1-0BBE-DE4A-9AC6-84953953F3E7}"/>
+              </a:ext>
+            </a:extLst>
+          </p:cNvPr>
+          <p:cNvPicPr>
+            <a:picLocks noChangeAspect="1"/>
+          </p:cNvPicPr>
+          <p:nvPr/>
+        </p:nvPicPr>
+        <p:blipFill>
+          <a:blip r:embed="rId19">
+            <a:extLst>
+              <a:ext uri="{96DAC541-7B7A-43D3-8B79-37D633B846F1}">
+                <asvg:svgBlip xmlns:asvg="http://schemas.microsoft.com/office/drawing/2016/SVG/main" r:embed="rId20"/>
+              </a:ext>
+            </a:extLst>
+          </a:blip>
+          <a:stretch>
+            <a:fillRect/>
+          </a:stretch>
+        </p:blipFill>
+        <p:spPr>
+          <a:xfrm>
+            <a:off x="3155232" y="634457"/>
+            <a:ext cx="1258998" cy="1258998"/>
+          </a:xfrm>
+          <a:prstGeom prst="rect">
+            <a:avLst/>
+          </a:prstGeom>
+        </p:spPr>
+      </p:pic>
+      <p:pic>
+        <p:nvPicPr>
+          <p:cNvPr id="53" name="Graphic 52">
+            <a:extLst>
+              <a:ext uri="{FF2B5EF4-FFF2-40B4-BE49-F238E27FC236}">
+                <a16:creationId xmlns:a16="http://schemas.microsoft.com/office/drawing/2014/main" id="{46BF6328-2656-5142-A396-5582B33D0E95}"/>
+              </a:ext>
+            </a:extLst>
+          </p:cNvPr>
+          <p:cNvPicPr>
+            <a:picLocks noChangeAspect="1"/>
+          </p:cNvPicPr>
+          <p:nvPr/>
+        </p:nvPicPr>
+        <p:blipFill>
+          <a:blip r:embed="rId21">
+            <a:extLst>
+              <a:ext uri="{96DAC541-7B7A-43D3-8B79-37D633B846F1}">
+                <asvg:svgBlip xmlns:asvg="http://schemas.microsoft.com/office/drawing/2016/SVG/main" r:embed="rId22"/>
+              </a:ext>
+            </a:extLst>
+          </a:blip>
+          <a:stretch>
+            <a:fillRect/>
+          </a:stretch>
+        </p:blipFill>
+        <p:spPr>
+          <a:xfrm>
+            <a:off x="1155962" y="633600"/>
+            <a:ext cx="1258998" cy="1258998"/>
+          </a:xfrm>
+          <a:prstGeom prst="rect">
+            <a:avLst/>
+          </a:prstGeom>
+        </p:spPr>
+      </p:pic>
+      <p:sp>
+        <p:nvSpPr>
+          <p:cNvPr id="2" name="TextBox 1">
+            <a:extLst>
+              <a:ext uri="{FF2B5EF4-FFF2-40B4-BE49-F238E27FC236}">
+                <a16:creationId xmlns:a16="http://schemas.microsoft.com/office/drawing/2014/main" id="{847C9791-388F-1F45-ABF9-9EB0C5E56426}"/>
               </a:ext>
             </a:extLst>
           </p:cNvPr>
@@ -5641,7 +5361,1458 @@
         </p:nvSpPr>
         <p:spPr>
           <a:xfrm>
-            <a:off x="1693927" y="2488179"/>
+            <a:off x="1166112" y="2005529"/>
+            <a:ext cx="1238698" cy="307777"/>
+          </a:xfrm>
+          <a:prstGeom prst="rect">
+            <a:avLst/>
+          </a:prstGeom>
+          <a:noFill/>
+        </p:spPr>
+        <p:txBody>
+          <a:bodyPr wrap="square" rtlCol="0">
+            <a:spAutoFit/>
+          </a:bodyPr>
+          <a:lstStyle/>
+          <a:p>
+            <a:pPr algn="ctr"/>
+            <a:r>
+              <a:rPr lang="fr-FR" sz="1400" dirty="0" err="1">
+                <a:solidFill>
+                  <a:schemeClr val="accent1">
+                    <a:lumMod val="75000"/>
+                  </a:schemeClr>
+                </a:solidFill>
+              </a:rPr>
+              <a:t>Upload</a:t>
+            </a:r>
+            <a:endParaRPr lang="fr-FR" sz="1400" dirty="0">
+              <a:solidFill>
+                <a:schemeClr val="accent1">
+                  <a:lumMod val="75000"/>
+                </a:schemeClr>
+              </a:solidFill>
+            </a:endParaRPr>
+          </a:p>
+        </p:txBody>
+      </p:sp>
+      <p:sp>
+        <p:nvSpPr>
+          <p:cNvPr id="18" name="TextBox 17">
+            <a:extLst>
+              <a:ext uri="{FF2B5EF4-FFF2-40B4-BE49-F238E27FC236}">
+                <a16:creationId xmlns:a16="http://schemas.microsoft.com/office/drawing/2014/main" id="{AFA6ED96-7C77-6944-BD61-0A015A75A796}"/>
+              </a:ext>
+            </a:extLst>
+          </p:cNvPr>
+          <p:cNvSpPr txBox="1"/>
+          <p:nvPr/>
+        </p:nvSpPr>
+        <p:spPr>
+          <a:xfrm>
+            <a:off x="3048309" y="2005528"/>
+            <a:ext cx="1472843" cy="307777"/>
+          </a:xfrm>
+          <a:prstGeom prst="rect">
+            <a:avLst/>
+          </a:prstGeom>
+          <a:noFill/>
+        </p:spPr>
+        <p:txBody>
+          <a:bodyPr wrap="square" rtlCol="0">
+            <a:spAutoFit/>
+          </a:bodyPr>
+          <a:lstStyle/>
+          <a:p>
+            <a:pPr algn="ctr"/>
+            <a:r>
+              <a:rPr lang="fr-FR" sz="1400" dirty="0" err="1">
+                <a:solidFill>
+                  <a:schemeClr val="accent1">
+                    <a:lumMod val="75000"/>
+                  </a:schemeClr>
+                </a:solidFill>
+              </a:rPr>
+              <a:t>Text</a:t>
+            </a:r>
+            <a:endParaRPr lang="fr-FR" sz="1400" dirty="0">
+              <a:solidFill>
+                <a:schemeClr val="accent1">
+                  <a:lumMod val="75000"/>
+                </a:schemeClr>
+              </a:solidFill>
+            </a:endParaRPr>
+          </a:p>
+        </p:txBody>
+      </p:sp>
+      <p:sp>
+        <p:nvSpPr>
+          <p:cNvPr id="19" name="TextBox 18">
+            <a:extLst>
+              <a:ext uri="{FF2B5EF4-FFF2-40B4-BE49-F238E27FC236}">
+                <a16:creationId xmlns:a16="http://schemas.microsoft.com/office/drawing/2014/main" id="{9A5CBC23-13BD-A944-9992-105A8BB7884F}"/>
+              </a:ext>
+            </a:extLst>
+          </p:cNvPr>
+          <p:cNvSpPr txBox="1"/>
+          <p:nvPr/>
+        </p:nvSpPr>
+        <p:spPr>
+          <a:xfrm>
+            <a:off x="4969666" y="2000531"/>
+            <a:ext cx="1628670" cy="307777"/>
+          </a:xfrm>
+          <a:prstGeom prst="rect">
+            <a:avLst/>
+          </a:prstGeom>
+          <a:noFill/>
+        </p:spPr>
+        <p:txBody>
+          <a:bodyPr wrap="square" rtlCol="0">
+            <a:spAutoFit/>
+          </a:bodyPr>
+          <a:lstStyle/>
+          <a:p>
+            <a:pPr algn="ctr"/>
+            <a:r>
+              <a:rPr lang="fr-FR" sz="1400" dirty="0">
+                <a:solidFill>
+                  <a:schemeClr val="accent1">
+                    <a:lumMod val="75000"/>
+                  </a:schemeClr>
+                </a:solidFill>
+              </a:rPr>
+              <a:t>Team</a:t>
+            </a:r>
+          </a:p>
+        </p:txBody>
+      </p:sp>
+      <p:sp>
+        <p:nvSpPr>
+          <p:cNvPr id="20" name="TextBox 19">
+            <a:extLst>
+              <a:ext uri="{FF2B5EF4-FFF2-40B4-BE49-F238E27FC236}">
+                <a16:creationId xmlns:a16="http://schemas.microsoft.com/office/drawing/2014/main" id="{473599F4-04C2-B54B-9BC1-18901CF52D1C}"/>
+              </a:ext>
+            </a:extLst>
+          </p:cNvPr>
+          <p:cNvSpPr txBox="1"/>
+          <p:nvPr/>
+        </p:nvSpPr>
+        <p:spPr>
+          <a:xfrm>
+            <a:off x="6967943" y="2000531"/>
+            <a:ext cx="1630656" cy="307777"/>
+          </a:xfrm>
+          <a:prstGeom prst="rect">
+            <a:avLst/>
+          </a:prstGeom>
+          <a:noFill/>
+        </p:spPr>
+        <p:txBody>
+          <a:bodyPr wrap="square" rtlCol="0">
+            <a:spAutoFit/>
+          </a:bodyPr>
+          <a:lstStyle/>
+          <a:p>
+            <a:pPr algn="ctr"/>
+            <a:r>
+              <a:rPr lang="fr-FR" sz="1400" dirty="0" err="1">
+                <a:solidFill>
+                  <a:schemeClr val="accent1">
+                    <a:lumMod val="75000"/>
+                  </a:schemeClr>
+                </a:solidFill>
+              </a:rPr>
+              <a:t>Success</a:t>
+            </a:r>
+            <a:endParaRPr lang="fr-FR" sz="1400" dirty="0">
+              <a:solidFill>
+                <a:schemeClr val="accent1">
+                  <a:lumMod val="75000"/>
+                </a:schemeClr>
+              </a:solidFill>
+            </a:endParaRPr>
+          </a:p>
+        </p:txBody>
+      </p:sp>
+      <p:sp>
+        <p:nvSpPr>
+          <p:cNvPr id="21" name="TextBox 20">
+            <a:extLst>
+              <a:ext uri="{FF2B5EF4-FFF2-40B4-BE49-F238E27FC236}">
+                <a16:creationId xmlns:a16="http://schemas.microsoft.com/office/drawing/2014/main" id="{3247FE19-71D8-A048-A585-84D39B8E5FDA}"/>
+              </a:ext>
+            </a:extLst>
+          </p:cNvPr>
+          <p:cNvSpPr txBox="1"/>
+          <p:nvPr/>
+        </p:nvSpPr>
+        <p:spPr>
+          <a:xfrm>
+            <a:off x="9111125" y="2018996"/>
+            <a:ext cx="1342832" cy="307777"/>
+          </a:xfrm>
+          <a:prstGeom prst="rect">
+            <a:avLst/>
+          </a:prstGeom>
+          <a:noFill/>
+        </p:spPr>
+        <p:txBody>
+          <a:bodyPr wrap="square" rtlCol="0">
+            <a:spAutoFit/>
+          </a:bodyPr>
+          <a:lstStyle/>
+          <a:p>
+            <a:pPr algn="ctr"/>
+            <a:r>
+              <a:rPr lang="fr-FR" sz="1400" dirty="0" err="1">
+                <a:solidFill>
+                  <a:schemeClr val="accent1">
+                    <a:lumMod val="75000"/>
+                  </a:schemeClr>
+                </a:solidFill>
+              </a:rPr>
+              <a:t>Sitemap</a:t>
+            </a:r>
+            <a:endParaRPr lang="fr-FR" sz="1400" dirty="0">
+              <a:solidFill>
+                <a:schemeClr val="accent1">
+                  <a:lumMod val="75000"/>
+                </a:schemeClr>
+              </a:solidFill>
+            </a:endParaRPr>
+          </a:p>
+        </p:txBody>
+      </p:sp>
+      <p:sp>
+        <p:nvSpPr>
+          <p:cNvPr id="22" name="TextBox 21">
+            <a:extLst>
+              <a:ext uri="{FF2B5EF4-FFF2-40B4-BE49-F238E27FC236}">
+                <a16:creationId xmlns:a16="http://schemas.microsoft.com/office/drawing/2014/main" id="{A9D8941A-9524-1B48-9476-F71D352ABE73}"/>
+              </a:ext>
+            </a:extLst>
+          </p:cNvPr>
+          <p:cNvSpPr txBox="1"/>
+          <p:nvPr/>
+        </p:nvSpPr>
+        <p:spPr>
+          <a:xfrm>
+            <a:off x="1449183" y="3978075"/>
+            <a:ext cx="672556" cy="307777"/>
+          </a:xfrm>
+          <a:prstGeom prst="rect">
+            <a:avLst/>
+          </a:prstGeom>
+          <a:noFill/>
+        </p:spPr>
+        <p:txBody>
+          <a:bodyPr wrap="none" rtlCol="0">
+            <a:spAutoFit/>
+          </a:bodyPr>
+          <a:lstStyle/>
+          <a:p>
+            <a:pPr algn="ctr"/>
+            <a:r>
+              <a:rPr lang="fr-FR" sz="1400" dirty="0" err="1">
+                <a:solidFill>
+                  <a:schemeClr val="accent1">
+                    <a:lumMod val="75000"/>
+                  </a:schemeClr>
+                </a:solidFill>
+              </a:rPr>
+              <a:t>Search</a:t>
+            </a:r>
+            <a:endParaRPr lang="fr-FR" sz="1400" dirty="0">
+              <a:solidFill>
+                <a:schemeClr val="accent1">
+                  <a:lumMod val="75000"/>
+                </a:schemeClr>
+              </a:solidFill>
+            </a:endParaRPr>
+          </a:p>
+        </p:txBody>
+      </p:sp>
+      <p:sp>
+        <p:nvSpPr>
+          <p:cNvPr id="23" name="TextBox 22">
+            <a:extLst>
+              <a:ext uri="{FF2B5EF4-FFF2-40B4-BE49-F238E27FC236}">
+                <a16:creationId xmlns:a16="http://schemas.microsoft.com/office/drawing/2014/main" id="{F0571261-A8D9-024E-B2FE-B569420B9292}"/>
+              </a:ext>
+            </a:extLst>
+          </p:cNvPr>
+          <p:cNvSpPr txBox="1"/>
+          <p:nvPr/>
+        </p:nvSpPr>
+        <p:spPr>
+          <a:xfrm>
+            <a:off x="3454992" y="3978074"/>
+            <a:ext cx="659476" cy="307777"/>
+          </a:xfrm>
+          <a:prstGeom prst="rect">
+            <a:avLst/>
+          </a:prstGeom>
+          <a:noFill/>
+        </p:spPr>
+        <p:txBody>
+          <a:bodyPr wrap="none" rtlCol="0">
+            <a:spAutoFit/>
+          </a:bodyPr>
+          <a:lstStyle/>
+          <a:p>
+            <a:pPr algn="ctr"/>
+            <a:r>
+              <a:rPr lang="fr-FR" sz="1400" dirty="0">
+                <a:solidFill>
+                  <a:schemeClr val="accent1">
+                    <a:lumMod val="75000"/>
+                  </a:schemeClr>
+                </a:solidFill>
+              </a:rPr>
+              <a:t>Profile</a:t>
+            </a:r>
+          </a:p>
+        </p:txBody>
+      </p:sp>
+      <p:sp>
+        <p:nvSpPr>
+          <p:cNvPr id="24" name="TextBox 23">
+            <a:extLst>
+              <a:ext uri="{FF2B5EF4-FFF2-40B4-BE49-F238E27FC236}">
+                <a16:creationId xmlns:a16="http://schemas.microsoft.com/office/drawing/2014/main" id="{BA4BA2BC-1EBC-454C-B67D-BD1426FF511B}"/>
+              </a:ext>
+            </a:extLst>
+          </p:cNvPr>
+          <p:cNvSpPr txBox="1"/>
+          <p:nvPr/>
+        </p:nvSpPr>
+        <p:spPr>
+          <a:xfrm>
+            <a:off x="5467247" y="3978073"/>
+            <a:ext cx="633508" cy="307777"/>
+          </a:xfrm>
+          <a:prstGeom prst="rect">
+            <a:avLst/>
+          </a:prstGeom>
+          <a:noFill/>
+        </p:spPr>
+        <p:txBody>
+          <a:bodyPr wrap="none" rtlCol="0">
+            <a:spAutoFit/>
+          </a:bodyPr>
+          <a:lstStyle/>
+          <a:p>
+            <a:pPr algn="ctr"/>
+            <a:r>
+              <a:rPr lang="fr-FR" sz="1400" dirty="0">
+                <a:solidFill>
+                  <a:schemeClr val="accent1">
+                    <a:lumMod val="75000"/>
+                  </a:schemeClr>
+                </a:solidFill>
+              </a:rPr>
+              <a:t>About</a:t>
+            </a:r>
+          </a:p>
+        </p:txBody>
+      </p:sp>
+      <p:sp>
+        <p:nvSpPr>
+          <p:cNvPr id="25" name="TextBox 24">
+            <a:extLst>
+              <a:ext uri="{FF2B5EF4-FFF2-40B4-BE49-F238E27FC236}">
+                <a16:creationId xmlns:a16="http://schemas.microsoft.com/office/drawing/2014/main" id="{CB28DD11-67C9-344D-8280-C5DAED40E36E}"/>
+              </a:ext>
+            </a:extLst>
+          </p:cNvPr>
+          <p:cNvSpPr txBox="1"/>
+          <p:nvPr/>
+        </p:nvSpPr>
+        <p:spPr>
+          <a:xfrm>
+            <a:off x="7502745" y="3978073"/>
+            <a:ext cx="561051" cy="307777"/>
+          </a:xfrm>
+          <a:prstGeom prst="rect">
+            <a:avLst/>
+          </a:prstGeom>
+          <a:noFill/>
+        </p:spPr>
+        <p:txBody>
+          <a:bodyPr wrap="none" rtlCol="0">
+            <a:spAutoFit/>
+          </a:bodyPr>
+          <a:lstStyle/>
+          <a:p>
+            <a:pPr algn="ctr"/>
+            <a:r>
+              <a:rPr lang="fr-FR" sz="1400" dirty="0" err="1">
+                <a:solidFill>
+                  <a:schemeClr val="accent1">
+                    <a:lumMod val="75000"/>
+                  </a:schemeClr>
+                </a:solidFill>
+              </a:rPr>
+              <a:t>Filter</a:t>
+            </a:r>
+            <a:endParaRPr lang="fr-FR" sz="1400" dirty="0">
+              <a:solidFill>
+                <a:schemeClr val="accent1">
+                  <a:lumMod val="75000"/>
+                </a:schemeClr>
+              </a:solidFill>
+            </a:endParaRPr>
+          </a:p>
+        </p:txBody>
+      </p:sp>
+      <p:sp>
+        <p:nvSpPr>
+          <p:cNvPr id="26" name="TextBox 25">
+            <a:extLst>
+              <a:ext uri="{FF2B5EF4-FFF2-40B4-BE49-F238E27FC236}">
+                <a16:creationId xmlns:a16="http://schemas.microsoft.com/office/drawing/2014/main" id="{630BC3D6-E713-E942-99DE-437E7D0B54F0}"/>
+              </a:ext>
+            </a:extLst>
+          </p:cNvPr>
+          <p:cNvSpPr txBox="1"/>
+          <p:nvPr/>
+        </p:nvSpPr>
+        <p:spPr>
+          <a:xfrm>
+            <a:off x="9329532" y="3974758"/>
+            <a:ext cx="906017" cy="307777"/>
+          </a:xfrm>
+          <a:prstGeom prst="rect">
+            <a:avLst/>
+          </a:prstGeom>
+          <a:noFill/>
+        </p:spPr>
+        <p:txBody>
+          <a:bodyPr wrap="none" rtlCol="0">
+            <a:spAutoFit/>
+          </a:bodyPr>
+          <a:lstStyle/>
+          <a:p>
+            <a:pPr algn="ctr"/>
+            <a:r>
+              <a:rPr lang="fr-FR" sz="1400" dirty="0">
+                <a:solidFill>
+                  <a:schemeClr val="accent1">
+                    <a:lumMod val="75000"/>
+                  </a:schemeClr>
+                </a:solidFill>
+              </a:rPr>
+              <a:t>Line chart</a:t>
+            </a:r>
+          </a:p>
+        </p:txBody>
+      </p:sp>
+      <p:pic>
+        <p:nvPicPr>
+          <p:cNvPr id="28" name="Graphic 27">
+            <a:extLst>
+              <a:ext uri="{FF2B5EF4-FFF2-40B4-BE49-F238E27FC236}">
+                <a16:creationId xmlns:a16="http://schemas.microsoft.com/office/drawing/2014/main" id="{C6DB8EA2-1C0D-194F-B4BF-B4671DB36AE4}"/>
+              </a:ext>
+            </a:extLst>
+          </p:cNvPr>
+          <p:cNvPicPr>
+            <a:picLocks noChangeAspect="1"/>
+          </p:cNvPicPr>
+          <p:nvPr/>
+        </p:nvPicPr>
+        <p:blipFill>
+          <a:blip r:embed="rId23">
+            <a:extLst>
+              <a:ext uri="{96DAC541-7B7A-43D3-8B79-37D633B846F1}">
+                <asvg:svgBlip xmlns:asvg="http://schemas.microsoft.com/office/drawing/2016/SVG/main" r:embed="rId24"/>
+              </a:ext>
+            </a:extLst>
+          </a:blip>
+          <a:stretch>
+            <a:fillRect/>
+          </a:stretch>
+        </p:blipFill>
+        <p:spPr>
+          <a:xfrm>
+            <a:off x="5167888" y="4561965"/>
+            <a:ext cx="1245612" cy="1245612"/>
+          </a:xfrm>
+          <a:prstGeom prst="rect">
+            <a:avLst/>
+          </a:prstGeom>
+        </p:spPr>
+      </p:pic>
+      <p:pic>
+        <p:nvPicPr>
+          <p:cNvPr id="29" name="Graphic 28">
+            <a:extLst>
+              <a:ext uri="{FF2B5EF4-FFF2-40B4-BE49-F238E27FC236}">
+                <a16:creationId xmlns:a16="http://schemas.microsoft.com/office/drawing/2014/main" id="{9C8D1853-A578-834E-9278-9CD095F03AD6}"/>
+              </a:ext>
+            </a:extLst>
+          </p:cNvPr>
+          <p:cNvPicPr>
+            <a:picLocks noChangeAspect="1"/>
+          </p:cNvPicPr>
+          <p:nvPr/>
+        </p:nvPicPr>
+        <p:blipFill>
+          <a:blip r:embed="rId25">
+            <a:extLst>
+              <a:ext uri="{96DAC541-7B7A-43D3-8B79-37D633B846F1}">
+                <asvg:svgBlip xmlns:asvg="http://schemas.microsoft.com/office/drawing/2016/SVG/main" r:embed="rId26"/>
+              </a:ext>
+            </a:extLst>
+          </a:blip>
+          <a:stretch>
+            <a:fillRect/>
+          </a:stretch>
+        </p:blipFill>
+        <p:spPr>
+          <a:xfrm>
+            <a:off x="3167000" y="4561965"/>
+            <a:ext cx="1247230" cy="1247230"/>
+          </a:xfrm>
+          <a:prstGeom prst="rect">
+            <a:avLst/>
+          </a:prstGeom>
+        </p:spPr>
+      </p:pic>
+      <p:pic>
+        <p:nvPicPr>
+          <p:cNvPr id="30" name="Graphic 29">
+            <a:extLst>
+              <a:ext uri="{FF2B5EF4-FFF2-40B4-BE49-F238E27FC236}">
+                <a16:creationId xmlns:a16="http://schemas.microsoft.com/office/drawing/2014/main" id="{1639FD50-A56E-4444-B68B-28EDCCB6AA58}"/>
+              </a:ext>
+            </a:extLst>
+          </p:cNvPr>
+          <p:cNvPicPr>
+            <a:picLocks noChangeAspect="1"/>
+          </p:cNvPicPr>
+          <p:nvPr/>
+        </p:nvPicPr>
+        <p:blipFill>
+          <a:blip r:embed="rId27">
+            <a:extLst>
+              <a:ext uri="{96DAC541-7B7A-43D3-8B79-37D633B846F1}">
+                <asvg:svgBlip xmlns:asvg="http://schemas.microsoft.com/office/drawing/2016/SVG/main" r:embed="rId28"/>
+              </a:ext>
+            </a:extLst>
+          </a:blip>
+          <a:stretch>
+            <a:fillRect/>
+          </a:stretch>
+        </p:blipFill>
+        <p:spPr>
+          <a:xfrm>
+            <a:off x="9153042" y="4561965"/>
+            <a:ext cx="1258998" cy="1258998"/>
+          </a:xfrm>
+          <a:prstGeom prst="rect">
+            <a:avLst/>
+          </a:prstGeom>
+        </p:spPr>
+      </p:pic>
+      <p:pic>
+        <p:nvPicPr>
+          <p:cNvPr id="31" name="Graphic 30">
+            <a:extLst>
+              <a:ext uri="{FF2B5EF4-FFF2-40B4-BE49-F238E27FC236}">
+                <a16:creationId xmlns:a16="http://schemas.microsoft.com/office/drawing/2014/main" id="{C26231CC-858E-914C-9130-9A8CE15795B4}"/>
+              </a:ext>
+            </a:extLst>
+          </p:cNvPr>
+          <p:cNvPicPr>
+            <a:picLocks noChangeAspect="1"/>
+          </p:cNvPicPr>
+          <p:nvPr/>
+        </p:nvPicPr>
+        <p:blipFill>
+          <a:blip r:embed="rId29">
+            <a:extLst>
+              <a:ext uri="{96DAC541-7B7A-43D3-8B79-37D633B846F1}">
+                <asvg:svgBlip xmlns:asvg="http://schemas.microsoft.com/office/drawing/2016/SVG/main" r:embed="rId30"/>
+              </a:ext>
+            </a:extLst>
+          </a:blip>
+          <a:stretch>
+            <a:fillRect/>
+          </a:stretch>
+        </p:blipFill>
+        <p:spPr>
+          <a:xfrm>
+            <a:off x="7153773" y="4561966"/>
+            <a:ext cx="1258997" cy="1258997"/>
+          </a:xfrm>
+          <a:prstGeom prst="rect">
+            <a:avLst/>
+          </a:prstGeom>
+        </p:spPr>
+      </p:pic>
+      <p:pic>
+        <p:nvPicPr>
+          <p:cNvPr id="32" name="Graphic 31">
+            <a:extLst>
+              <a:ext uri="{FF2B5EF4-FFF2-40B4-BE49-F238E27FC236}">
+                <a16:creationId xmlns:a16="http://schemas.microsoft.com/office/drawing/2014/main" id="{B61497BF-4A87-9B4D-811B-AC869572FA68}"/>
+              </a:ext>
+            </a:extLst>
+          </p:cNvPr>
+          <p:cNvPicPr>
+            <a:picLocks noChangeAspect="1"/>
+          </p:cNvPicPr>
+          <p:nvPr/>
+        </p:nvPicPr>
+        <p:blipFill>
+          <a:blip r:embed="rId31">
+            <a:extLst>
+              <a:ext uri="{96DAC541-7B7A-43D3-8B79-37D633B846F1}">
+                <asvg:svgBlip xmlns:asvg="http://schemas.microsoft.com/office/drawing/2016/SVG/main" r:embed="rId32"/>
+              </a:ext>
+            </a:extLst>
+          </a:blip>
+          <a:stretch>
+            <a:fillRect/>
+          </a:stretch>
+        </p:blipFill>
+        <p:spPr>
+          <a:xfrm>
+            <a:off x="1166112" y="4561965"/>
+            <a:ext cx="1248848" cy="1248848"/>
+          </a:xfrm>
+          <a:prstGeom prst="rect">
+            <a:avLst/>
+          </a:prstGeom>
+        </p:spPr>
+      </p:pic>
+      <p:sp>
+        <p:nvSpPr>
+          <p:cNvPr id="34" name="TextBox 33">
+            <a:extLst>
+              <a:ext uri="{FF2B5EF4-FFF2-40B4-BE49-F238E27FC236}">
+                <a16:creationId xmlns:a16="http://schemas.microsoft.com/office/drawing/2014/main" id="{3A6553EF-FECC-3A48-805B-E5C5311FB5BA}"/>
+              </a:ext>
+            </a:extLst>
+          </p:cNvPr>
+          <p:cNvSpPr txBox="1"/>
+          <p:nvPr/>
+        </p:nvSpPr>
+        <p:spPr>
+          <a:xfrm>
+            <a:off x="1513591" y="5933037"/>
+            <a:ext cx="543739" cy="307777"/>
+          </a:xfrm>
+          <a:prstGeom prst="rect">
+            <a:avLst/>
+          </a:prstGeom>
+          <a:noFill/>
+        </p:spPr>
+        <p:txBody>
+          <a:bodyPr wrap="none" rtlCol="0">
+            <a:spAutoFit/>
+          </a:bodyPr>
+          <a:lstStyle/>
+          <a:p>
+            <a:pPr algn="ctr"/>
+            <a:r>
+              <a:rPr lang="fr-FR" sz="1400" dirty="0" err="1">
+                <a:solidFill>
+                  <a:schemeClr val="accent1">
+                    <a:lumMod val="75000"/>
+                  </a:schemeClr>
+                </a:solidFill>
+              </a:rPr>
+              <a:t>Alert</a:t>
+            </a:r>
+            <a:endParaRPr lang="fr-FR" sz="1400" dirty="0">
+              <a:solidFill>
+                <a:schemeClr val="accent1">
+                  <a:lumMod val="75000"/>
+                </a:schemeClr>
+              </a:solidFill>
+            </a:endParaRPr>
+          </a:p>
+        </p:txBody>
+      </p:sp>
+      <p:sp>
+        <p:nvSpPr>
+          <p:cNvPr id="35" name="TextBox 34">
+            <a:extLst>
+              <a:ext uri="{FF2B5EF4-FFF2-40B4-BE49-F238E27FC236}">
+                <a16:creationId xmlns:a16="http://schemas.microsoft.com/office/drawing/2014/main" id="{EEDE4A63-A620-1942-A71E-52946E937B95}"/>
+              </a:ext>
+            </a:extLst>
+          </p:cNvPr>
+          <p:cNvSpPr txBox="1"/>
+          <p:nvPr/>
+        </p:nvSpPr>
+        <p:spPr>
+          <a:xfrm>
+            <a:off x="3360158" y="5933037"/>
+            <a:ext cx="849143" cy="307777"/>
+          </a:xfrm>
+          <a:prstGeom prst="rect">
+            <a:avLst/>
+          </a:prstGeom>
+          <a:noFill/>
+        </p:spPr>
+        <p:txBody>
+          <a:bodyPr wrap="none" rtlCol="0">
+            <a:spAutoFit/>
+          </a:bodyPr>
+          <a:lstStyle/>
+          <a:p>
+            <a:pPr algn="ctr"/>
+            <a:r>
+              <a:rPr lang="fr-FR" sz="1400" dirty="0">
+                <a:solidFill>
+                  <a:schemeClr val="accent1">
+                    <a:lumMod val="75000"/>
+                  </a:schemeClr>
+                </a:solidFill>
+              </a:rPr>
+              <a:t>Compare</a:t>
+            </a:r>
+          </a:p>
+        </p:txBody>
+      </p:sp>
+      <p:sp>
+        <p:nvSpPr>
+          <p:cNvPr id="36" name="TextBox 35">
+            <a:extLst>
+              <a:ext uri="{FF2B5EF4-FFF2-40B4-BE49-F238E27FC236}">
+                <a16:creationId xmlns:a16="http://schemas.microsoft.com/office/drawing/2014/main" id="{203DFECF-41C1-2740-9445-B8D8AD554BEE}"/>
+              </a:ext>
+            </a:extLst>
+          </p:cNvPr>
+          <p:cNvSpPr txBox="1"/>
+          <p:nvPr/>
+        </p:nvSpPr>
+        <p:spPr>
+          <a:xfrm>
+            <a:off x="5564229" y="5929803"/>
+            <a:ext cx="439544" cy="307777"/>
+          </a:xfrm>
+          <a:prstGeom prst="rect">
+            <a:avLst/>
+          </a:prstGeom>
+          <a:noFill/>
+        </p:spPr>
+        <p:txBody>
+          <a:bodyPr wrap="none" rtlCol="0">
+            <a:spAutoFit/>
+          </a:bodyPr>
+          <a:lstStyle/>
+          <a:p>
+            <a:pPr algn="ctr"/>
+            <a:r>
+              <a:rPr lang="fr-FR" sz="1400" dirty="0">
+                <a:solidFill>
+                  <a:schemeClr val="accent1">
+                    <a:lumMod val="75000"/>
+                  </a:schemeClr>
+                </a:solidFill>
+              </a:rPr>
+              <a:t>File</a:t>
+            </a:r>
+          </a:p>
+        </p:txBody>
+      </p:sp>
+      <p:sp>
+        <p:nvSpPr>
+          <p:cNvPr id="37" name="TextBox 36">
+            <a:extLst>
+              <a:ext uri="{FF2B5EF4-FFF2-40B4-BE49-F238E27FC236}">
+                <a16:creationId xmlns:a16="http://schemas.microsoft.com/office/drawing/2014/main" id="{A63A925D-14B8-3D4B-B9E6-CFB9674633C5}"/>
+              </a:ext>
+            </a:extLst>
+          </p:cNvPr>
+          <p:cNvSpPr txBox="1"/>
+          <p:nvPr/>
+        </p:nvSpPr>
+        <p:spPr>
+          <a:xfrm>
+            <a:off x="7358701" y="5929802"/>
+            <a:ext cx="837089" cy="307777"/>
+          </a:xfrm>
+          <a:prstGeom prst="rect">
+            <a:avLst/>
+          </a:prstGeom>
+          <a:noFill/>
+        </p:spPr>
+        <p:txBody>
+          <a:bodyPr wrap="none" rtlCol="0">
+            <a:spAutoFit/>
+          </a:bodyPr>
+          <a:lstStyle/>
+          <a:p>
+            <a:pPr algn="ctr"/>
+            <a:r>
+              <a:rPr lang="fr-FR" sz="1400" dirty="0" err="1">
+                <a:solidFill>
+                  <a:schemeClr val="accent1">
+                    <a:lumMod val="75000"/>
+                  </a:schemeClr>
+                </a:solidFill>
+              </a:rPr>
+              <a:t>Calendar</a:t>
+            </a:r>
+            <a:endParaRPr lang="fr-FR" sz="1400" dirty="0">
+              <a:solidFill>
+                <a:schemeClr val="accent1">
+                  <a:lumMod val="75000"/>
+                </a:schemeClr>
+              </a:solidFill>
+            </a:endParaRPr>
+          </a:p>
+        </p:txBody>
+      </p:sp>
+      <p:sp>
+        <p:nvSpPr>
+          <p:cNvPr id="38" name="TextBox 37">
+            <a:extLst>
+              <a:ext uri="{FF2B5EF4-FFF2-40B4-BE49-F238E27FC236}">
+                <a16:creationId xmlns:a16="http://schemas.microsoft.com/office/drawing/2014/main" id="{16618CCD-48F6-234F-A157-92DFD2E5E4D9}"/>
+              </a:ext>
+            </a:extLst>
+          </p:cNvPr>
+          <p:cNvSpPr txBox="1"/>
+          <p:nvPr/>
+        </p:nvSpPr>
+        <p:spPr>
+          <a:xfrm>
+            <a:off x="9521923" y="5929801"/>
+            <a:ext cx="521233" cy="307777"/>
+          </a:xfrm>
+          <a:prstGeom prst="rect">
+            <a:avLst/>
+          </a:prstGeom>
+          <a:noFill/>
+        </p:spPr>
+        <p:txBody>
+          <a:bodyPr wrap="none" rtlCol="0">
+            <a:spAutoFit/>
+          </a:bodyPr>
+          <a:lstStyle/>
+          <a:p>
+            <a:pPr algn="ctr"/>
+            <a:r>
+              <a:rPr lang="fr-FR" sz="1400" dirty="0">
+                <a:solidFill>
+                  <a:schemeClr val="accent1">
+                    <a:lumMod val="75000"/>
+                  </a:schemeClr>
+                </a:solidFill>
+              </a:rPr>
+              <a:t>Chat</a:t>
+            </a:r>
+          </a:p>
+        </p:txBody>
+      </p:sp>
+    </p:spTree>
+    <p:extLst>
+      <p:ext uri="{BB962C8B-B14F-4D97-AF65-F5344CB8AC3E}">
+        <p14:creationId xmlns:p14="http://schemas.microsoft.com/office/powerpoint/2010/main" val="545793087"/>
+      </p:ext>
+    </p:extLst>
+  </p:cSld>
+  <p:clrMapOvr>
+    <a:masterClrMapping/>
+  </p:clrMapOvr>
+</p:sld>
+</file>
+
+<file path=ppt/slides/slide4.xml><?xml version="1.0" encoding="utf-8"?>
+<p:sld xmlns:a="http://schemas.openxmlformats.org/drawingml/2006/main" xmlns:r="http://schemas.openxmlformats.org/officeDocument/2006/relationships" xmlns:p="http://schemas.openxmlformats.org/presentationml/2006/main">
+  <p:cSld>
+    <p:spTree>
+      <p:nvGrpSpPr>
+        <p:cNvPr id="1" name=""/>
+        <p:cNvGrpSpPr/>
+        <p:nvPr/>
+      </p:nvGrpSpPr>
+      <p:grpSpPr>
+        <a:xfrm>
+          <a:off x="0" y="0"/>
+          <a:ext cx="0" cy="0"/>
+          <a:chOff x="0" y="0"/>
+          <a:chExt cx="0" cy="0"/>
+        </a:xfrm>
+      </p:grpSpPr>
+      <p:pic>
+        <p:nvPicPr>
+          <p:cNvPr id="4" name="Graphic 3">
+            <a:extLst>
+              <a:ext uri="{FF2B5EF4-FFF2-40B4-BE49-F238E27FC236}">
+                <a16:creationId xmlns:a16="http://schemas.microsoft.com/office/drawing/2014/main" id="{4C84D24E-BF6A-1041-B796-3857A1549D8B}"/>
+              </a:ext>
+            </a:extLst>
+          </p:cNvPr>
+          <p:cNvPicPr>
+            <a:picLocks noChangeAspect="1"/>
+          </p:cNvPicPr>
+          <p:nvPr/>
+        </p:nvPicPr>
+        <p:blipFill>
+          <a:blip r:embed="rId3">
+            <a:extLst>
+              <a:ext uri="{96DAC541-7B7A-43D3-8B79-37D633B846F1}">
+                <asvg:svgBlip xmlns:asvg="http://schemas.microsoft.com/office/drawing/2016/SVG/main" r:embed="rId4"/>
+              </a:ext>
+            </a:extLst>
+          </a:blip>
+          <a:stretch>
+            <a:fillRect/>
+          </a:stretch>
+        </p:blipFill>
+        <p:spPr>
+          <a:xfrm>
+            <a:off x="1169239" y="633600"/>
+            <a:ext cx="1245721" cy="1245721"/>
+          </a:xfrm>
+          <a:prstGeom prst="rect">
+            <a:avLst/>
+          </a:prstGeom>
+        </p:spPr>
+      </p:pic>
+      <p:pic>
+        <p:nvPicPr>
+          <p:cNvPr id="6" name="Graphic 5">
+            <a:extLst>
+              <a:ext uri="{FF2B5EF4-FFF2-40B4-BE49-F238E27FC236}">
+                <a16:creationId xmlns:a16="http://schemas.microsoft.com/office/drawing/2014/main" id="{5F13DA21-9CC1-6347-9572-E0D3F1E2A271}"/>
+              </a:ext>
+            </a:extLst>
+          </p:cNvPr>
+          <p:cNvPicPr>
+            <a:picLocks noChangeAspect="1"/>
+          </p:cNvPicPr>
+          <p:nvPr/>
+        </p:nvPicPr>
+        <p:blipFill>
+          <a:blip r:embed="rId5">
+            <a:extLst>
+              <a:ext uri="{96DAC541-7B7A-43D3-8B79-37D633B846F1}">
+                <asvg:svgBlip xmlns:asvg="http://schemas.microsoft.com/office/drawing/2016/SVG/main" r:embed="rId6"/>
+              </a:ext>
+            </a:extLst>
+          </a:blip>
+          <a:stretch>
+            <a:fillRect/>
+          </a:stretch>
+        </p:blipFill>
+        <p:spPr>
+          <a:xfrm>
+            <a:off x="7150771" y="633600"/>
+            <a:ext cx="1245721" cy="1245721"/>
+          </a:xfrm>
+          <a:prstGeom prst="rect">
+            <a:avLst/>
+          </a:prstGeom>
+        </p:spPr>
+      </p:pic>
+      <p:pic>
+        <p:nvPicPr>
+          <p:cNvPr id="8" name="Graphic 7">
+            <a:extLst>
+              <a:ext uri="{FF2B5EF4-FFF2-40B4-BE49-F238E27FC236}">
+                <a16:creationId xmlns:a16="http://schemas.microsoft.com/office/drawing/2014/main" id="{E082757D-A67B-B947-99D8-7A9A61FA749F}"/>
+              </a:ext>
+            </a:extLst>
+          </p:cNvPr>
+          <p:cNvPicPr>
+            <a:picLocks noChangeAspect="1"/>
+          </p:cNvPicPr>
+          <p:nvPr/>
+        </p:nvPicPr>
+        <p:blipFill>
+          <a:blip r:embed="rId7">
+            <a:extLst>
+              <a:ext uri="{96DAC541-7B7A-43D3-8B79-37D633B846F1}">
+                <asvg:svgBlip xmlns:asvg="http://schemas.microsoft.com/office/drawing/2016/SVG/main" r:embed="rId8"/>
+              </a:ext>
+            </a:extLst>
+          </a:blip>
+          <a:stretch>
+            <a:fillRect/>
+          </a:stretch>
+        </p:blipFill>
+        <p:spPr>
+          <a:xfrm>
+            <a:off x="3156487" y="633600"/>
+            <a:ext cx="1245721" cy="1245721"/>
+          </a:xfrm>
+          <a:prstGeom prst="rect">
+            <a:avLst/>
+          </a:prstGeom>
+        </p:spPr>
+      </p:pic>
+      <p:pic>
+        <p:nvPicPr>
+          <p:cNvPr id="11" name="Graphic 10">
+            <a:extLst>
+              <a:ext uri="{FF2B5EF4-FFF2-40B4-BE49-F238E27FC236}">
+                <a16:creationId xmlns:a16="http://schemas.microsoft.com/office/drawing/2014/main" id="{B339A4AF-BD5B-C642-BB39-EA92186C2911}"/>
+              </a:ext>
+            </a:extLst>
+          </p:cNvPr>
+          <p:cNvPicPr>
+            <a:picLocks noChangeAspect="1"/>
+          </p:cNvPicPr>
+          <p:nvPr/>
+        </p:nvPicPr>
+        <p:blipFill>
+          <a:blip r:embed="rId9">
+            <a:extLst>
+              <a:ext uri="{96DAC541-7B7A-43D3-8B79-37D633B846F1}">
+                <asvg:svgBlip xmlns:asvg="http://schemas.microsoft.com/office/drawing/2016/SVG/main" r:embed="rId10"/>
+              </a:ext>
+            </a:extLst>
+          </a:blip>
+          <a:stretch>
+            <a:fillRect/>
+          </a:stretch>
+        </p:blipFill>
+        <p:spPr>
+          <a:xfrm>
+            <a:off x="5160350" y="633600"/>
+            <a:ext cx="1245721" cy="1245721"/>
+          </a:xfrm>
+          <a:prstGeom prst="rect">
+            <a:avLst/>
+          </a:prstGeom>
+        </p:spPr>
+      </p:pic>
+      <p:pic>
+        <p:nvPicPr>
+          <p:cNvPr id="13" name="Graphic 12">
+            <a:extLst>
+              <a:ext uri="{FF2B5EF4-FFF2-40B4-BE49-F238E27FC236}">
+                <a16:creationId xmlns:a16="http://schemas.microsoft.com/office/drawing/2014/main" id="{FAA924D3-BEA6-9D4F-B513-31089DF99F0D}"/>
+              </a:ext>
+            </a:extLst>
+          </p:cNvPr>
+          <p:cNvPicPr>
+            <a:picLocks noChangeAspect="1"/>
+          </p:cNvPicPr>
+          <p:nvPr/>
+        </p:nvPicPr>
+        <p:blipFill>
+          <a:blip r:embed="rId11">
+            <a:extLst>
+              <a:ext uri="{96DAC541-7B7A-43D3-8B79-37D633B846F1}">
+                <asvg:svgBlip xmlns:asvg="http://schemas.microsoft.com/office/drawing/2016/SVG/main" r:embed="rId12"/>
+              </a:ext>
+            </a:extLst>
+          </a:blip>
+          <a:stretch>
+            <a:fillRect/>
+          </a:stretch>
+        </p:blipFill>
+        <p:spPr>
+          <a:xfrm>
+            <a:off x="9153042" y="633600"/>
+            <a:ext cx="1245721" cy="1245721"/>
+          </a:xfrm>
+          <a:prstGeom prst="rect">
+            <a:avLst/>
+          </a:prstGeom>
+        </p:spPr>
+      </p:pic>
+      <p:sp>
+        <p:nvSpPr>
+          <p:cNvPr id="19" name="TextBox 18">
+            <a:extLst>
+              <a:ext uri="{FF2B5EF4-FFF2-40B4-BE49-F238E27FC236}">
+                <a16:creationId xmlns:a16="http://schemas.microsoft.com/office/drawing/2014/main" id="{7733BD9F-DF98-2E41-A0C0-793B343E9163}"/>
+              </a:ext>
+            </a:extLst>
+          </p:cNvPr>
+          <p:cNvSpPr txBox="1"/>
+          <p:nvPr/>
+        </p:nvSpPr>
+        <p:spPr>
+          <a:xfrm>
+            <a:off x="1530423" y="2005200"/>
+            <a:ext cx="510076" cy="307777"/>
+          </a:xfrm>
+          <a:prstGeom prst="rect">
+            <a:avLst/>
+          </a:prstGeom>
+          <a:noFill/>
+        </p:spPr>
+        <p:txBody>
+          <a:bodyPr wrap="none" rtlCol="0">
+            <a:spAutoFit/>
+          </a:bodyPr>
+          <a:lstStyle/>
+          <a:p>
+            <a:pPr algn="ctr"/>
+            <a:r>
+              <a:rPr lang="fr-FR" sz="1400" dirty="0">
+                <a:solidFill>
+                  <a:schemeClr val="accent1">
+                    <a:lumMod val="75000"/>
+                  </a:schemeClr>
+                </a:solidFill>
+              </a:rPr>
+              <a:t>Files</a:t>
+            </a:r>
+          </a:p>
+        </p:txBody>
+      </p:sp>
+      <p:sp>
+        <p:nvSpPr>
+          <p:cNvPr id="20" name="TextBox 19">
+            <a:extLst>
+              <a:ext uri="{FF2B5EF4-FFF2-40B4-BE49-F238E27FC236}">
+                <a16:creationId xmlns:a16="http://schemas.microsoft.com/office/drawing/2014/main" id="{20DF800E-B7DD-2C40-ADE9-122724345E5A}"/>
+              </a:ext>
+            </a:extLst>
+          </p:cNvPr>
+          <p:cNvSpPr txBox="1"/>
+          <p:nvPr/>
+        </p:nvSpPr>
+        <p:spPr>
+          <a:xfrm>
+            <a:off x="3291905" y="2005200"/>
+            <a:ext cx="974883" cy="307777"/>
+          </a:xfrm>
+          <a:prstGeom prst="rect">
+            <a:avLst/>
+          </a:prstGeom>
+          <a:noFill/>
+        </p:spPr>
+        <p:txBody>
+          <a:bodyPr wrap="none" rtlCol="0">
+            <a:spAutoFit/>
+          </a:bodyPr>
+          <a:lstStyle/>
+          <a:p>
+            <a:pPr algn="ctr"/>
+            <a:r>
+              <a:rPr lang="fr-FR" sz="1400" dirty="0" err="1">
+                <a:solidFill>
+                  <a:schemeClr val="accent1">
+                    <a:lumMod val="75000"/>
+                  </a:schemeClr>
+                </a:solidFill>
+              </a:rPr>
+              <a:t>Comments</a:t>
+            </a:r>
+            <a:endParaRPr lang="fr-FR" sz="1400" dirty="0">
+              <a:solidFill>
+                <a:schemeClr val="accent1">
+                  <a:lumMod val="75000"/>
+                </a:schemeClr>
+              </a:solidFill>
+            </a:endParaRPr>
+          </a:p>
+        </p:txBody>
+      </p:sp>
+      <p:sp>
+        <p:nvSpPr>
+          <p:cNvPr id="21" name="TextBox 20">
+            <a:extLst>
+              <a:ext uri="{FF2B5EF4-FFF2-40B4-BE49-F238E27FC236}">
+                <a16:creationId xmlns:a16="http://schemas.microsoft.com/office/drawing/2014/main" id="{B9C0ED87-E3EE-4741-9115-69FC53BE37FA}"/>
+              </a:ext>
+            </a:extLst>
+          </p:cNvPr>
+          <p:cNvSpPr txBox="1"/>
+          <p:nvPr/>
+        </p:nvSpPr>
+        <p:spPr>
+          <a:xfrm>
+            <a:off x="5452831" y="2005200"/>
+            <a:ext cx="660758" cy="307777"/>
+          </a:xfrm>
+          <a:prstGeom prst="rect">
+            <a:avLst/>
+          </a:prstGeom>
+          <a:noFill/>
+        </p:spPr>
+        <p:txBody>
+          <a:bodyPr wrap="none" rtlCol="0">
+            <a:spAutoFit/>
+          </a:bodyPr>
+          <a:lstStyle/>
+          <a:p>
+            <a:pPr algn="ctr"/>
+            <a:r>
+              <a:rPr lang="fr-FR" sz="1400" dirty="0">
+                <a:solidFill>
+                  <a:schemeClr val="accent1">
+                    <a:lumMod val="75000"/>
+                  </a:schemeClr>
+                </a:solidFill>
+              </a:rPr>
+              <a:t>Article</a:t>
+            </a:r>
+          </a:p>
+        </p:txBody>
+      </p:sp>
+      <p:sp>
+        <p:nvSpPr>
+          <p:cNvPr id="22" name="TextBox 21">
+            <a:extLst>
+              <a:ext uri="{FF2B5EF4-FFF2-40B4-BE49-F238E27FC236}">
+                <a16:creationId xmlns:a16="http://schemas.microsoft.com/office/drawing/2014/main" id="{BD5E71D1-F8BB-3143-8863-5C5BCC7F8C64}"/>
+              </a:ext>
+            </a:extLst>
+          </p:cNvPr>
+          <p:cNvSpPr txBox="1"/>
+          <p:nvPr/>
+        </p:nvSpPr>
+        <p:spPr>
+          <a:xfrm>
+            <a:off x="7318591" y="2005200"/>
+            <a:ext cx="929357" cy="307777"/>
+          </a:xfrm>
+          <a:prstGeom prst="rect">
+            <a:avLst/>
+          </a:prstGeom>
+          <a:noFill/>
+        </p:spPr>
+        <p:txBody>
+          <a:bodyPr wrap="none" rtlCol="0">
+            <a:spAutoFit/>
+          </a:bodyPr>
+          <a:lstStyle/>
+          <a:p>
+            <a:pPr algn="ctr"/>
+            <a:r>
+              <a:rPr lang="fr-FR" sz="1400" dirty="0" err="1">
+                <a:solidFill>
+                  <a:schemeClr val="accent1">
+                    <a:lumMod val="75000"/>
+                  </a:schemeClr>
+                </a:solidFill>
+              </a:rPr>
+              <a:t>Download</a:t>
+            </a:r>
+            <a:endParaRPr lang="fr-FR" sz="1400" dirty="0">
+              <a:solidFill>
+                <a:schemeClr val="accent1">
+                  <a:lumMod val="75000"/>
+                </a:schemeClr>
+              </a:solidFill>
+            </a:endParaRPr>
+          </a:p>
+        </p:txBody>
+      </p:sp>
+      <p:sp>
+        <p:nvSpPr>
+          <p:cNvPr id="23" name="TextBox 22">
+            <a:extLst>
+              <a:ext uri="{FF2B5EF4-FFF2-40B4-BE49-F238E27FC236}">
+                <a16:creationId xmlns:a16="http://schemas.microsoft.com/office/drawing/2014/main" id="{CE34D9DA-EC08-204A-9D4B-D407F6A7BE5C}"/>
+              </a:ext>
+            </a:extLst>
+          </p:cNvPr>
+          <p:cNvSpPr txBox="1"/>
+          <p:nvPr/>
+        </p:nvSpPr>
+        <p:spPr>
+          <a:xfrm>
+            <a:off x="9424235" y="2005200"/>
+            <a:ext cx="703334" cy="307777"/>
+          </a:xfrm>
+          <a:prstGeom prst="rect">
+            <a:avLst/>
+          </a:prstGeom>
+          <a:noFill/>
+        </p:spPr>
+        <p:txBody>
+          <a:bodyPr wrap="none" rtlCol="0">
+            <a:spAutoFit/>
+          </a:bodyPr>
+          <a:lstStyle/>
+          <a:p>
+            <a:pPr algn="ctr"/>
+            <a:r>
+              <a:rPr lang="fr-FR" sz="1400" dirty="0" err="1">
+                <a:solidFill>
+                  <a:schemeClr val="accent1">
+                    <a:lumMod val="75000"/>
+                  </a:schemeClr>
+                </a:solidFill>
+              </a:rPr>
+              <a:t>Gallery</a:t>
+            </a:r>
+            <a:endParaRPr lang="fr-FR" sz="1400" dirty="0">
+              <a:solidFill>
+                <a:schemeClr val="accent1">
+                  <a:lumMod val="75000"/>
+                </a:schemeClr>
+              </a:solidFill>
+            </a:endParaRPr>
+          </a:p>
+        </p:txBody>
+      </p:sp>
+      <p:pic>
+        <p:nvPicPr>
+          <p:cNvPr id="34" name="Graphic 33">
+            <a:extLst>
+              <a:ext uri="{FF2B5EF4-FFF2-40B4-BE49-F238E27FC236}">
+                <a16:creationId xmlns:a16="http://schemas.microsoft.com/office/drawing/2014/main" id="{EF68D21D-2E98-EF46-ABDE-F44FB3CBEAC1}"/>
+              </a:ext>
+            </a:extLst>
+          </p:cNvPr>
+          <p:cNvPicPr>
+            <a:picLocks noChangeAspect="1"/>
+          </p:cNvPicPr>
+          <p:nvPr/>
+        </p:nvPicPr>
+        <p:blipFill>
+          <a:blip r:embed="rId13">
+            <a:extLst>
+              <a:ext uri="{96DAC541-7B7A-43D3-8B79-37D633B846F1}">
+                <asvg:svgBlip xmlns:asvg="http://schemas.microsoft.com/office/drawing/2016/SVG/main" r:embed="rId14"/>
+              </a:ext>
+            </a:extLst>
+          </a:blip>
+          <a:stretch>
+            <a:fillRect/>
+          </a:stretch>
+        </p:blipFill>
+        <p:spPr>
+          <a:xfrm>
+            <a:off x="7167049" y="2599200"/>
+            <a:ext cx="1238292" cy="1238292"/>
+          </a:xfrm>
+          <a:prstGeom prst="rect">
+            <a:avLst/>
+          </a:prstGeom>
+        </p:spPr>
+      </p:pic>
+      <p:pic>
+        <p:nvPicPr>
+          <p:cNvPr id="35" name="Graphic 34">
+            <a:extLst>
+              <a:ext uri="{FF2B5EF4-FFF2-40B4-BE49-F238E27FC236}">
+                <a16:creationId xmlns:a16="http://schemas.microsoft.com/office/drawing/2014/main" id="{582A8106-DE4F-4742-AA0E-BF31BBE61558}"/>
+              </a:ext>
+            </a:extLst>
+          </p:cNvPr>
+          <p:cNvPicPr>
+            <a:picLocks noChangeAspect="1"/>
+          </p:cNvPicPr>
+          <p:nvPr/>
+        </p:nvPicPr>
+        <p:blipFill>
+          <a:blip r:embed="rId15">
+            <a:extLst>
+              <a:ext uri="{96DAC541-7B7A-43D3-8B79-37D633B846F1}">
+                <asvg:svgBlip xmlns:asvg="http://schemas.microsoft.com/office/drawing/2016/SVG/main" r:embed="rId16"/>
+              </a:ext>
+            </a:extLst>
+          </a:blip>
+          <a:stretch>
+            <a:fillRect/>
+          </a:stretch>
+        </p:blipFill>
+        <p:spPr>
+          <a:xfrm>
+            <a:off x="5167779" y="2599200"/>
+            <a:ext cx="1238292" cy="1238292"/>
+          </a:xfrm>
+          <a:prstGeom prst="rect">
+            <a:avLst/>
+          </a:prstGeom>
+        </p:spPr>
+      </p:pic>
+      <p:pic>
+        <p:nvPicPr>
+          <p:cNvPr id="36" name="Graphic 35">
+            <a:extLst>
+              <a:ext uri="{FF2B5EF4-FFF2-40B4-BE49-F238E27FC236}">
+                <a16:creationId xmlns:a16="http://schemas.microsoft.com/office/drawing/2014/main" id="{2DF953B7-5775-0343-8362-062D37A34BAE}"/>
+              </a:ext>
+            </a:extLst>
+          </p:cNvPr>
+          <p:cNvPicPr>
+            <a:picLocks noChangeAspect="1"/>
+          </p:cNvPicPr>
+          <p:nvPr/>
+        </p:nvPicPr>
+        <p:blipFill>
+          <a:blip r:embed="rId17">
+            <a:extLst>
+              <a:ext uri="{96DAC541-7B7A-43D3-8B79-37D633B846F1}">
+                <asvg:svgBlip xmlns:asvg="http://schemas.microsoft.com/office/drawing/2016/SVG/main" r:embed="rId18"/>
+              </a:ext>
+            </a:extLst>
+          </a:blip>
+          <a:stretch>
+            <a:fillRect/>
+          </a:stretch>
+        </p:blipFill>
+        <p:spPr>
+          <a:xfrm>
+            <a:off x="3168509" y="2599200"/>
+            <a:ext cx="1245721" cy="1245721"/>
+          </a:xfrm>
+          <a:prstGeom prst="rect">
+            <a:avLst/>
+          </a:prstGeom>
+        </p:spPr>
+      </p:pic>
+      <p:pic>
+        <p:nvPicPr>
+          <p:cNvPr id="37" name="Graphic 36">
+            <a:extLst>
+              <a:ext uri="{FF2B5EF4-FFF2-40B4-BE49-F238E27FC236}">
+                <a16:creationId xmlns:a16="http://schemas.microsoft.com/office/drawing/2014/main" id="{700D8677-4D36-7249-A276-563F99A653CA}"/>
+              </a:ext>
+            </a:extLst>
+          </p:cNvPr>
+          <p:cNvPicPr>
+            <a:picLocks noChangeAspect="1"/>
+          </p:cNvPicPr>
+          <p:nvPr/>
+        </p:nvPicPr>
+        <p:blipFill>
+          <a:blip r:embed="rId19">
+            <a:extLst>
+              <a:ext uri="{96DAC541-7B7A-43D3-8B79-37D633B846F1}">
+                <asvg:svgBlip xmlns:asvg="http://schemas.microsoft.com/office/drawing/2016/SVG/main" r:embed="rId20"/>
+              </a:ext>
+            </a:extLst>
+          </a:blip>
+          <a:stretch>
+            <a:fillRect/>
+          </a:stretch>
+        </p:blipFill>
+        <p:spPr>
+          <a:xfrm>
+            <a:off x="1169239" y="2599200"/>
+            <a:ext cx="1245721" cy="1245721"/>
+          </a:xfrm>
+          <a:prstGeom prst="rect">
+            <a:avLst/>
+          </a:prstGeom>
+        </p:spPr>
+      </p:pic>
+      <p:sp>
+        <p:nvSpPr>
+          <p:cNvPr id="38" name="TextBox 37">
+            <a:extLst>
+              <a:ext uri="{FF2B5EF4-FFF2-40B4-BE49-F238E27FC236}">
+                <a16:creationId xmlns:a16="http://schemas.microsoft.com/office/drawing/2014/main" id="{5A005909-89BF-0141-B9F8-0DBCCCF5F6E8}"/>
+              </a:ext>
+            </a:extLst>
+          </p:cNvPr>
+          <p:cNvSpPr txBox="1"/>
+          <p:nvPr/>
+        </p:nvSpPr>
+        <p:spPr>
+          <a:xfrm>
+            <a:off x="1370924" y="3978000"/>
             <a:ext cx="829074" cy="307777"/>
           </a:xfrm>
           <a:prstGeom prst="rect">
@@ -5671,10 +6842,10 @@
       </p:sp>
       <p:sp>
         <p:nvSpPr>
-          <p:cNvPr id="10" name="TextBox 9">
-            <a:extLst>
-              <a:ext uri="{FF2B5EF4-FFF2-40B4-BE49-F238E27FC236}">
-                <a16:creationId xmlns:a16="http://schemas.microsoft.com/office/drawing/2014/main" id="{EFABDB1B-028D-0049-907D-D94E74C7F741}"/>
+          <p:cNvPr id="39" name="TextBox 38">
+            <a:extLst>
+              <a:ext uri="{FF2B5EF4-FFF2-40B4-BE49-F238E27FC236}">
+                <a16:creationId xmlns:a16="http://schemas.microsoft.com/office/drawing/2014/main" id="{C5D4BB9B-7AAD-B642-A2F9-05751452F1CA}"/>
               </a:ext>
             </a:extLst>
           </p:cNvPr>
@@ -5683,7 +6854,7 @@
         </p:nvSpPr>
         <p:spPr>
           <a:xfrm>
-            <a:off x="3704807" y="2488179"/>
+            <a:off x="3451371" y="3978000"/>
             <a:ext cx="655950" cy="307777"/>
           </a:xfrm>
           <a:prstGeom prst="rect">
@@ -5713,10 +6884,10 @@
       </p:sp>
       <p:sp>
         <p:nvSpPr>
-          <p:cNvPr id="11" name="TextBox 10">
-            <a:extLst>
-              <a:ext uri="{FF2B5EF4-FFF2-40B4-BE49-F238E27FC236}">
-                <a16:creationId xmlns:a16="http://schemas.microsoft.com/office/drawing/2014/main" id="{B6118184-9F69-F846-A15C-AC247B5BE93A}"/>
+          <p:cNvPr id="40" name="TextBox 39">
+            <a:extLst>
+              <a:ext uri="{FF2B5EF4-FFF2-40B4-BE49-F238E27FC236}">
+                <a16:creationId xmlns:a16="http://schemas.microsoft.com/office/drawing/2014/main" id="{64D74631-9333-3342-A087-7F84C3EDD3EE}"/>
               </a:ext>
             </a:extLst>
           </p:cNvPr>
@@ -5725,7 +6896,7 @@
         </p:nvSpPr>
         <p:spPr>
           <a:xfrm>
-            <a:off x="5744151" y="2488179"/>
+            <a:off x="5495310" y="3978000"/>
             <a:ext cx="575799" cy="307777"/>
           </a:xfrm>
           <a:prstGeom prst="rect">
@@ -5755,10 +6926,10 @@
       </p:sp>
       <p:sp>
         <p:nvSpPr>
-          <p:cNvPr id="12" name="TextBox 11">
-            <a:extLst>
-              <a:ext uri="{FF2B5EF4-FFF2-40B4-BE49-F238E27FC236}">
-                <a16:creationId xmlns:a16="http://schemas.microsoft.com/office/drawing/2014/main" id="{6E6A8B6F-9B8F-9D4D-8E5A-F684C5106E7D}"/>
+          <p:cNvPr id="41" name="TextBox 40">
+            <a:extLst>
+              <a:ext uri="{FF2B5EF4-FFF2-40B4-BE49-F238E27FC236}">
+                <a16:creationId xmlns:a16="http://schemas.microsoft.com/office/drawing/2014/main" id="{2DD7D0F8-DAA6-AA44-81E4-4F6976CEC196}"/>
               </a:ext>
             </a:extLst>
           </p:cNvPr>
@@ -5767,7 +6938,7 @@
         </p:nvSpPr>
         <p:spPr>
           <a:xfrm>
-            <a:off x="7749447" y="2488179"/>
+            <a:off x="7501396" y="3978000"/>
             <a:ext cx="563745" cy="307777"/>
           </a:xfrm>
           <a:prstGeom prst="rect">
@@ -5805,7 +6976,7 @@
     </p:spTree>
     <p:extLst>
       <p:ext uri="{BB962C8B-B14F-4D97-AF65-F5344CB8AC3E}">
-        <p14:creationId xmlns:p14="http://schemas.microsoft.com/office/powerpoint/2010/main" val="2055295497"/>
+        <p14:creationId xmlns:p14="http://schemas.microsoft.com/office/powerpoint/2010/main" val="1367573051"/>
       </p:ext>
     </p:extLst>
   </p:cSld>

</xml_diff>